<commit_message>
Add more speaker notes, add cheatsheet slide
</commit_message>
<xml_diff>
--- a/LearningAsWeGo-DecomposingDevEnvironmentsWithLando.pptx
+++ b/LearningAsWeGo-DecomposingDevEnvironmentsWithLando.pptx
@@ -5,7 +5,7 @@
     <p:sldMasterId id="2147483648" r:id="rId1"/>
   </p:sldMasterIdLst>
   <p:notesMasterIdLst>
-    <p:notesMasterId r:id="rId33"/>
+    <p:notesMasterId r:id="rId34"/>
   </p:notesMasterIdLst>
   <p:sldIdLst>
     <p:sldId id="256" r:id="rId2"/>
@@ -26,19 +26,20 @@
     <p:sldId id="272" r:id="rId17"/>
     <p:sldId id="273" r:id="rId18"/>
     <p:sldId id="274" r:id="rId19"/>
-    <p:sldId id="282" r:id="rId20"/>
-    <p:sldId id="275" r:id="rId21"/>
-    <p:sldId id="283" r:id="rId22"/>
-    <p:sldId id="277" r:id="rId23"/>
-    <p:sldId id="284" r:id="rId24"/>
-    <p:sldId id="278" r:id="rId25"/>
-    <p:sldId id="285" r:id="rId26"/>
-    <p:sldId id="279" r:id="rId27"/>
-    <p:sldId id="286" r:id="rId28"/>
-    <p:sldId id="280" r:id="rId29"/>
-    <p:sldId id="276" r:id="rId30"/>
-    <p:sldId id="287" r:id="rId31"/>
-    <p:sldId id="260" r:id="rId32"/>
+    <p:sldId id="288" r:id="rId20"/>
+    <p:sldId id="282" r:id="rId21"/>
+    <p:sldId id="275" r:id="rId22"/>
+    <p:sldId id="283" r:id="rId23"/>
+    <p:sldId id="277" r:id="rId24"/>
+    <p:sldId id="284" r:id="rId25"/>
+    <p:sldId id="278" r:id="rId26"/>
+    <p:sldId id="285" r:id="rId27"/>
+    <p:sldId id="279" r:id="rId28"/>
+    <p:sldId id="286" r:id="rId29"/>
+    <p:sldId id="280" r:id="rId30"/>
+    <p:sldId id="276" r:id="rId31"/>
+    <p:sldId id="287" r:id="rId32"/>
+    <p:sldId id="260" r:id="rId33"/>
   </p:sldIdLst>
   <p:sldSz cx="12192000" cy="6858000"/>
   <p:notesSz cx="6858000" cy="9144000"/>
@@ -283,7 +284,7 @@
           <a:p>
             <a:fld id="{1D896817-C553-DC40-BD68-E09EA78F3436}" type="datetimeFigureOut">
               <a:rPr lang="en-US" smtClean="0"/>
-              <a:t>3/1/21</a:t>
+              <a:t>3/8/21</a:t>
             </a:fld>
             <a:endParaRPr lang="en-US"/>
           </a:p>
@@ -683,7 +684,39 @@
           <a:p>
             <a:r>
               <a:rPr lang="en-US" dirty="0"/>
-              <a:t>A database is often the heart of our applications, and this is a great way to get a feel for how Lando works. You also end up with something you can use: a copy of your production data, running locally on your notebook. Where you can run whatever unsafe query or update your heart might desire.</a:t>
+              <a:t>This is a sketch of a .</a:t>
+            </a:r>
+            <a:r>
+              <a:rPr lang="en-US" dirty="0" err="1"/>
+              <a:t>lando.yml</a:t>
+            </a:r>
+            <a:r>
+              <a:rPr lang="en-US" dirty="0"/>
+              <a:t> file, it’s not complete, but gives you an idea of what one looks like. It’s </a:t>
+            </a:r>
+            <a:r>
+              <a:rPr lang="en-US" dirty="0" err="1"/>
+              <a:t>yaml</a:t>
+            </a:r>
+            <a:r>
+              <a:rPr lang="en-US" dirty="0"/>
+              <a:t>, so, you know, </a:t>
+            </a:r>
+            <a:r>
+              <a:rPr lang="en-US" dirty="0" err="1"/>
+              <a:t>gotta</a:t>
+            </a:r>
+            <a:r>
+              <a:rPr lang="en-US" dirty="0"/>
+              <a:t> start with three dashes. We’ll dig into the details through the rest of this workshop, but some things I want you to remember: you can specify environment variables in env files, you can provide as many as you need. SSH key management is mostly automatic with Lando (it copies your SSH keys for you), but you can control which key gets used by specifying it in the </a:t>
+            </a:r>
+            <a:r>
+              <a:rPr lang="en-US" dirty="0" err="1"/>
+              <a:t>Landofile</a:t>
+            </a:r>
+            <a:r>
+              <a:rPr lang="en-US" dirty="0"/>
+              <a:t>. Then you have SERVICES and TOOLING. Services are the pieces you need to develop your application. Tooling defines how you’ll interact with those services on the command line. Tooling is probably the most fun aspect of working with Lando, as the feedback loop is instantaneous. As soon as you add a new tooling config, you can use it, no reboot, no rebuild. Just dream it, write it, use it. Oh, if you’ve used Lando before or you’ve been keeping notes, you’ll probably be wondering if I’ve missed something here, and you’d be right, I’m intentionally skipping RECIPES for now. Mostly because as a library developer, none of the recipes will be a good fit. And recipes are too much magic. I’ve skipped other things as well, we’ll talk about them later, if we have time.</a:t>
             </a:r>
           </a:p>
         </p:txBody>
@@ -705,7 +738,7 @@
           <a:p>
             <a:fld id="{07F65287-0258-BC43-8221-F86E5F96768A}" type="slidenum">
               <a:rPr lang="en-US" smtClean="0"/>
-              <a:t>22</a:t>
+              <a:t>17</a:t>
             </a:fld>
             <a:endParaRPr lang="en-US"/>
           </a:p>
@@ -714,7 +747,7 @@
     </p:spTree>
     <p:extLst>
       <p:ext uri="{BB962C8B-B14F-4D97-AF65-F5344CB8AC3E}">
-        <p14:creationId xmlns:p14="http://schemas.microsoft.com/office/powerpoint/2010/main" val="1904307631"/>
+        <p14:creationId xmlns:p14="http://schemas.microsoft.com/office/powerpoint/2010/main" val="2212794323"/>
       </p:ext>
     </p:extLst>
   </p:cSld>
@@ -768,7 +801,18 @@
           <a:bodyPr/>
           <a:lstStyle/>
           <a:p>
-            <a:endParaRPr lang="en-US" dirty="0"/>
+            <a:r>
+              <a:rPr lang="en-US" dirty="0"/>
+              <a:t>Here’s a quick look at a </a:t>
+            </a:r>
+            <a:r>
+              <a:rPr lang="en-US" dirty="0" err="1"/>
+              <a:t>Landofile</a:t>
+            </a:r>
+            <a:r>
+              <a:rPr lang="en-US" dirty="0"/>
+              <a:t> that uses a recipe: this uses the Lamp recipe, so you specify what version of PHP you want to use, and what DB you want to use, and everything is auto-configured by convention. If a Lamp stack is what your app needs, this will get you going.</a:t>
+            </a:r>
           </a:p>
         </p:txBody>
       </p:sp>
@@ -789,7 +833,7 @@
           <a:p>
             <a:fld id="{07F65287-0258-BC43-8221-F86E5F96768A}" type="slidenum">
               <a:rPr lang="en-US" smtClean="0"/>
-              <a:t>27</a:t>
+              <a:t>18</a:t>
             </a:fld>
             <a:endParaRPr lang="en-US"/>
           </a:p>
@@ -798,7 +842,7 @@
     </p:spTree>
     <p:extLst>
       <p:ext uri="{BB962C8B-B14F-4D97-AF65-F5344CB8AC3E}">
-        <p14:creationId xmlns:p14="http://schemas.microsoft.com/office/powerpoint/2010/main" val="925748264"/>
+        <p14:creationId xmlns:p14="http://schemas.microsoft.com/office/powerpoint/2010/main" val="3778597517"/>
       </p:ext>
     </p:extLst>
   </p:cSld>
@@ -873,7 +917,7 @@
           <a:p>
             <a:fld id="{07F65287-0258-BC43-8221-F86E5F96768A}" type="slidenum">
               <a:rPr lang="en-US" smtClean="0"/>
-              <a:t>28</a:t>
+              <a:t>19</a:t>
             </a:fld>
             <a:endParaRPr lang="en-US"/>
           </a:p>
@@ -882,7 +926,7 @@
     </p:spTree>
     <p:extLst>
       <p:ext uri="{BB962C8B-B14F-4D97-AF65-F5344CB8AC3E}">
-        <p14:creationId xmlns:p14="http://schemas.microsoft.com/office/powerpoint/2010/main" val="3304442387"/>
+        <p14:creationId xmlns:p14="http://schemas.microsoft.com/office/powerpoint/2010/main" val="1022956409"/>
       </p:ext>
     </p:extLst>
   </p:cSld>
@@ -936,7 +980,10 @@
           <a:bodyPr/>
           <a:lstStyle/>
           <a:p>
-            <a:endParaRPr lang="en-US" dirty="0"/>
+            <a:r>
+              <a:rPr lang="en-US" dirty="0"/>
+              <a:t>A database is often the heart of our applications, and this is a great way to get a feel for how Lando works. You also end up with something you can use: a copy of your production data, running locally on your notebook. Where you can run whatever unsafe query or update your heart might desire.</a:t>
+            </a:r>
           </a:p>
         </p:txBody>
       </p:sp>
@@ -957,7 +1004,7 @@
           <a:p>
             <a:fld id="{07F65287-0258-BC43-8221-F86E5F96768A}" type="slidenum">
               <a:rPr lang="en-US" smtClean="0"/>
-              <a:t>29</a:t>
+              <a:t>23</a:t>
             </a:fld>
             <a:endParaRPr lang="en-US"/>
           </a:p>
@@ -966,7 +1013,7 @@
     </p:spTree>
     <p:extLst>
       <p:ext uri="{BB962C8B-B14F-4D97-AF65-F5344CB8AC3E}">
-        <p14:creationId xmlns:p14="http://schemas.microsoft.com/office/powerpoint/2010/main" val="1309255926"/>
+        <p14:creationId xmlns:p14="http://schemas.microsoft.com/office/powerpoint/2010/main" val="1904307631"/>
       </p:ext>
     </p:extLst>
   </p:cSld>
@@ -1041,7 +1088,7 @@
           <a:p>
             <a:fld id="{07F65287-0258-BC43-8221-F86E5F96768A}" type="slidenum">
               <a:rPr lang="en-US" smtClean="0"/>
-              <a:t>30</a:t>
+              <a:t>28</a:t>
             </a:fld>
             <a:endParaRPr lang="en-US"/>
           </a:p>
@@ -1050,7 +1097,7 @@
     </p:spTree>
     <p:extLst>
       <p:ext uri="{BB962C8B-B14F-4D97-AF65-F5344CB8AC3E}">
-        <p14:creationId xmlns:p14="http://schemas.microsoft.com/office/powerpoint/2010/main" val="380505923"/>
+        <p14:creationId xmlns:p14="http://schemas.microsoft.com/office/powerpoint/2010/main" val="925748264"/>
       </p:ext>
     </p:extLst>
   </p:cSld>
@@ -1125,7 +1172,259 @@
           <a:p>
             <a:fld id="{07F65287-0258-BC43-8221-F86E5F96768A}" type="slidenum">
               <a:rPr lang="en-US" smtClean="0"/>
+              <a:t>29</a:t>
+            </a:fld>
+            <a:endParaRPr lang="en-US"/>
+          </a:p>
+        </p:txBody>
+      </p:sp>
+    </p:spTree>
+    <p:extLst>
+      <p:ext uri="{BB962C8B-B14F-4D97-AF65-F5344CB8AC3E}">
+        <p14:creationId xmlns:p14="http://schemas.microsoft.com/office/powerpoint/2010/main" val="3304442387"/>
+      </p:ext>
+    </p:extLst>
+  </p:cSld>
+  <p:clrMapOvr>
+    <a:masterClrMapping/>
+  </p:clrMapOvr>
+</p:notes>
+</file>
+
+<file path=ppt/notesSlides/notesSlide16.xml><?xml version="1.0" encoding="utf-8"?>
+<p:notes xmlns:a="http://schemas.openxmlformats.org/drawingml/2006/main" xmlns:r="http://schemas.openxmlformats.org/officeDocument/2006/relationships" xmlns:p="http://schemas.openxmlformats.org/presentationml/2006/main">
+  <p:cSld>
+    <p:spTree>
+      <p:nvGrpSpPr>
+        <p:cNvPr id="1" name=""/>
+        <p:cNvGrpSpPr/>
+        <p:nvPr/>
+      </p:nvGrpSpPr>
+      <p:grpSpPr>
+        <a:xfrm>
+          <a:off x="0" y="0"/>
+          <a:ext cx="0" cy="0"/>
+          <a:chOff x="0" y="0"/>
+          <a:chExt cx="0" cy="0"/>
+        </a:xfrm>
+      </p:grpSpPr>
+      <p:sp>
+        <p:nvSpPr>
+          <p:cNvPr id="2" name="Slide Image Placeholder 1"/>
+          <p:cNvSpPr>
+            <a:spLocks noGrp="1" noRot="1" noChangeAspect="1"/>
+          </p:cNvSpPr>
+          <p:nvPr>
+            <p:ph type="sldImg"/>
+          </p:nvPr>
+        </p:nvSpPr>
+        <p:spPr/>
+      </p:sp>
+      <p:sp>
+        <p:nvSpPr>
+          <p:cNvPr id="3" name="Notes Placeholder 2"/>
+          <p:cNvSpPr>
+            <a:spLocks noGrp="1"/>
+          </p:cNvSpPr>
+          <p:nvPr>
+            <p:ph type="body" idx="1"/>
+          </p:nvPr>
+        </p:nvSpPr>
+        <p:spPr/>
+        <p:txBody>
+          <a:bodyPr/>
+          <a:lstStyle/>
+          <a:p>
+            <a:endParaRPr lang="en-US" dirty="0"/>
+          </a:p>
+        </p:txBody>
+      </p:sp>
+      <p:sp>
+        <p:nvSpPr>
+          <p:cNvPr id="4" name="Slide Number Placeholder 3"/>
+          <p:cNvSpPr>
+            <a:spLocks noGrp="1"/>
+          </p:cNvSpPr>
+          <p:nvPr>
+            <p:ph type="sldNum" sz="quarter" idx="5"/>
+          </p:nvPr>
+        </p:nvSpPr>
+        <p:spPr/>
+        <p:txBody>
+          <a:bodyPr/>
+          <a:lstStyle/>
+          <a:p>
+            <a:fld id="{07F65287-0258-BC43-8221-F86E5F96768A}" type="slidenum">
+              <a:rPr lang="en-US" smtClean="0"/>
+              <a:t>30</a:t>
+            </a:fld>
+            <a:endParaRPr lang="en-US"/>
+          </a:p>
+        </p:txBody>
+      </p:sp>
+    </p:spTree>
+    <p:extLst>
+      <p:ext uri="{BB962C8B-B14F-4D97-AF65-F5344CB8AC3E}">
+        <p14:creationId xmlns:p14="http://schemas.microsoft.com/office/powerpoint/2010/main" val="1309255926"/>
+      </p:ext>
+    </p:extLst>
+  </p:cSld>
+  <p:clrMapOvr>
+    <a:masterClrMapping/>
+  </p:clrMapOvr>
+</p:notes>
+</file>
+
+<file path=ppt/notesSlides/notesSlide17.xml><?xml version="1.0" encoding="utf-8"?>
+<p:notes xmlns:a="http://schemas.openxmlformats.org/drawingml/2006/main" xmlns:r="http://schemas.openxmlformats.org/officeDocument/2006/relationships" xmlns:p="http://schemas.openxmlformats.org/presentationml/2006/main">
+  <p:cSld>
+    <p:spTree>
+      <p:nvGrpSpPr>
+        <p:cNvPr id="1" name=""/>
+        <p:cNvGrpSpPr/>
+        <p:nvPr/>
+      </p:nvGrpSpPr>
+      <p:grpSpPr>
+        <a:xfrm>
+          <a:off x="0" y="0"/>
+          <a:ext cx="0" cy="0"/>
+          <a:chOff x="0" y="0"/>
+          <a:chExt cx="0" cy="0"/>
+        </a:xfrm>
+      </p:grpSpPr>
+      <p:sp>
+        <p:nvSpPr>
+          <p:cNvPr id="2" name="Slide Image Placeholder 1"/>
+          <p:cNvSpPr>
+            <a:spLocks noGrp="1" noRot="1" noChangeAspect="1"/>
+          </p:cNvSpPr>
+          <p:nvPr>
+            <p:ph type="sldImg"/>
+          </p:nvPr>
+        </p:nvSpPr>
+        <p:spPr/>
+      </p:sp>
+      <p:sp>
+        <p:nvSpPr>
+          <p:cNvPr id="3" name="Notes Placeholder 2"/>
+          <p:cNvSpPr>
+            <a:spLocks noGrp="1"/>
+          </p:cNvSpPr>
+          <p:nvPr>
+            <p:ph type="body" idx="1"/>
+          </p:nvPr>
+        </p:nvSpPr>
+        <p:spPr/>
+        <p:txBody>
+          <a:bodyPr/>
+          <a:lstStyle/>
+          <a:p>
+            <a:endParaRPr lang="en-US" dirty="0"/>
+          </a:p>
+        </p:txBody>
+      </p:sp>
+      <p:sp>
+        <p:nvSpPr>
+          <p:cNvPr id="4" name="Slide Number Placeholder 3"/>
+          <p:cNvSpPr>
+            <a:spLocks noGrp="1"/>
+          </p:cNvSpPr>
+          <p:nvPr>
+            <p:ph type="sldNum" sz="quarter" idx="5"/>
+          </p:nvPr>
+        </p:nvSpPr>
+        <p:spPr/>
+        <p:txBody>
+          <a:bodyPr/>
+          <a:lstStyle/>
+          <a:p>
+            <a:fld id="{07F65287-0258-BC43-8221-F86E5F96768A}" type="slidenum">
+              <a:rPr lang="en-US" smtClean="0"/>
               <a:t>31</a:t>
+            </a:fld>
+            <a:endParaRPr lang="en-US"/>
+          </a:p>
+        </p:txBody>
+      </p:sp>
+    </p:spTree>
+    <p:extLst>
+      <p:ext uri="{BB962C8B-B14F-4D97-AF65-F5344CB8AC3E}">
+        <p14:creationId xmlns:p14="http://schemas.microsoft.com/office/powerpoint/2010/main" val="380505923"/>
+      </p:ext>
+    </p:extLst>
+  </p:cSld>
+  <p:clrMapOvr>
+    <a:masterClrMapping/>
+  </p:clrMapOvr>
+</p:notes>
+</file>
+
+<file path=ppt/notesSlides/notesSlide18.xml><?xml version="1.0" encoding="utf-8"?>
+<p:notes xmlns:a="http://schemas.openxmlformats.org/drawingml/2006/main" xmlns:r="http://schemas.openxmlformats.org/officeDocument/2006/relationships" xmlns:p="http://schemas.openxmlformats.org/presentationml/2006/main">
+  <p:cSld>
+    <p:spTree>
+      <p:nvGrpSpPr>
+        <p:cNvPr id="1" name=""/>
+        <p:cNvGrpSpPr/>
+        <p:nvPr/>
+      </p:nvGrpSpPr>
+      <p:grpSpPr>
+        <a:xfrm>
+          <a:off x="0" y="0"/>
+          <a:ext cx="0" cy="0"/>
+          <a:chOff x="0" y="0"/>
+          <a:chExt cx="0" cy="0"/>
+        </a:xfrm>
+      </p:grpSpPr>
+      <p:sp>
+        <p:nvSpPr>
+          <p:cNvPr id="2" name="Slide Image Placeholder 1"/>
+          <p:cNvSpPr>
+            <a:spLocks noGrp="1" noRot="1" noChangeAspect="1"/>
+          </p:cNvSpPr>
+          <p:nvPr>
+            <p:ph type="sldImg"/>
+          </p:nvPr>
+        </p:nvSpPr>
+        <p:spPr/>
+      </p:sp>
+      <p:sp>
+        <p:nvSpPr>
+          <p:cNvPr id="3" name="Notes Placeholder 2"/>
+          <p:cNvSpPr>
+            <a:spLocks noGrp="1"/>
+          </p:cNvSpPr>
+          <p:nvPr>
+            <p:ph type="body" idx="1"/>
+          </p:nvPr>
+        </p:nvSpPr>
+        <p:spPr/>
+        <p:txBody>
+          <a:bodyPr/>
+          <a:lstStyle/>
+          <a:p>
+            <a:endParaRPr lang="en-US" dirty="0"/>
+          </a:p>
+        </p:txBody>
+      </p:sp>
+      <p:sp>
+        <p:nvSpPr>
+          <p:cNvPr id="4" name="Slide Number Placeholder 3"/>
+          <p:cNvSpPr>
+            <a:spLocks noGrp="1"/>
+          </p:cNvSpPr>
+          <p:nvPr>
+            <p:ph type="sldNum" sz="quarter" idx="5"/>
+          </p:nvPr>
+        </p:nvSpPr>
+        <p:spPr/>
+        <p:txBody>
+          <a:bodyPr/>
+          <a:lstStyle/>
+          <a:p>
+            <a:fld id="{07F65287-0258-BC43-8221-F86E5F96768A}" type="slidenum">
+              <a:rPr lang="en-US" smtClean="0"/>
+              <a:t>32</a:t>
             </a:fld>
             <a:endParaRPr lang="en-US"/>
           </a:p>
@@ -1190,7 +1489,7 @@
           <a:p>
             <a:r>
               <a:rPr lang="en-US" dirty="0"/>
-              <a:t>We aren’t going to dive deeply into Docker, because we don’t need to, we just need to keep in mind that Docker is what enables Lando to help us build a development environment.</a:t>
+              <a:t>What kind of chaos are we talking about? With dev environments, these are the options I’ve seen in use for various projects. On the left of the yarn, we have more ordered options, on the right, less so. I’m biased, so I put Lando at the base of the ordered side.</a:t>
             </a:r>
           </a:p>
         </p:txBody>
@@ -1212,7 +1511,7 @@
           <a:p>
             <a:fld id="{07F65287-0258-BC43-8221-F86E5F96768A}" type="slidenum">
               <a:rPr lang="en-US" smtClean="0"/>
-              <a:t>5</a:t>
+              <a:t>3</a:t>
             </a:fld>
             <a:endParaRPr lang="en-US"/>
           </a:p>
@@ -1221,7 +1520,7 @@
     </p:spTree>
     <p:extLst>
       <p:ext uri="{BB962C8B-B14F-4D97-AF65-F5344CB8AC3E}">
-        <p14:creationId xmlns:p14="http://schemas.microsoft.com/office/powerpoint/2010/main" val="3064967801"/>
+        <p14:creationId xmlns:p14="http://schemas.microsoft.com/office/powerpoint/2010/main" val="1892846666"/>
       </p:ext>
     </p:extLst>
   </p:cSld>
@@ -1275,86 +1574,9 @@
           <a:bodyPr/>
           <a:lstStyle/>
           <a:p>
-            <a:pPr marL="0" marR="0" lvl="0" indent="0" algn="l" defTabSz="914400" rtl="0" eaLnBrk="1" fontAlgn="auto" latinLnBrk="0" hangingPunct="1">
-              <a:lnSpc>
-                <a:spcPct val="100000"/>
-              </a:lnSpc>
-              <a:spcBef>
-                <a:spcPts val="0"/>
-              </a:spcBef>
-              <a:spcAft>
-                <a:spcPts val="0"/>
-              </a:spcAft>
-              <a:buClrTx/>
-              <a:buSzTx/>
-              <a:buFontTx/>
-              <a:buNone/>
-              <a:tabLst/>
-              <a:defRPr/>
-            </a:pPr>
-            <a:r>
-              <a:rPr lang="en-US" dirty="0"/>
-              <a:t>This is a famous cathedral in Barcelona, </a:t>
-            </a:r>
-            <a:r>
-              <a:rPr lang="en-US" sz="1200" b="0" i="0" kern="1200" dirty="0">
-                <a:solidFill>
-                  <a:schemeClr val="tx1"/>
-                </a:solidFill>
-                <a:effectLst/>
-                <a:latin typeface="+mn-lt"/>
-                <a:ea typeface="+mn-ea"/>
-                <a:cs typeface="+mn-cs"/>
-              </a:rPr>
-              <a:t>Sagrada </a:t>
-            </a:r>
-            <a:r>
-              <a:rPr lang="en-US" sz="1200" b="0" i="0" kern="1200" dirty="0" err="1">
-                <a:solidFill>
-                  <a:schemeClr val="tx1"/>
-                </a:solidFill>
-                <a:effectLst/>
-                <a:latin typeface="+mn-lt"/>
-                <a:ea typeface="+mn-ea"/>
-                <a:cs typeface="+mn-cs"/>
-              </a:rPr>
-              <a:t>Família</a:t>
-            </a:r>
-            <a:r>
-              <a:rPr lang="en-US" sz="1200" b="0" i="0" kern="1200" dirty="0">
-                <a:solidFill>
-                  <a:schemeClr val="tx1"/>
-                </a:solidFill>
-                <a:effectLst/>
-                <a:latin typeface="+mn-lt"/>
-                <a:ea typeface="+mn-ea"/>
-                <a:cs typeface="+mn-cs"/>
-              </a:rPr>
-              <a:t> ('Basilica of the Holy Family’), by Antoni </a:t>
-            </a:r>
-            <a:r>
-              <a:rPr lang="en-US" sz="1200" b="0" i="0" kern="1200" dirty="0" err="1">
-                <a:solidFill>
-                  <a:schemeClr val="tx1"/>
-                </a:solidFill>
-                <a:effectLst/>
-                <a:latin typeface="+mn-lt"/>
-                <a:ea typeface="+mn-ea"/>
-                <a:cs typeface="+mn-cs"/>
-              </a:rPr>
-              <a:t>Gaudí</a:t>
-            </a:r>
-            <a:r>
-              <a:rPr lang="en-US" sz="1200" b="0" i="0" kern="1200" dirty="0">
-                <a:solidFill>
-                  <a:schemeClr val="tx1"/>
-                </a:solidFill>
-                <a:effectLst/>
-                <a:latin typeface="+mn-lt"/>
-                <a:ea typeface="+mn-ea"/>
-                <a:cs typeface="+mn-cs"/>
-              </a:rPr>
-              <a:t>, it began construction in March of 1882. It’s still not done.</a:t>
+            <a:r>
+              <a:rPr lang="en-US" dirty="0"/>
+              <a:t>Here are the parts of this workshop. For the first 30 minutes, we’ll go through this introduction, then we’ll take a quick break, and come back for 4 exercises. Don’t panic, you don’t need to follow along with any of the typing, you can just kick back and watch. I hope you’ll still get something out of this without typing commands.</a:t>
             </a:r>
           </a:p>
         </p:txBody>
@@ -1376,7 +1598,7 @@
           <a:p>
             <a:fld id="{07F65287-0258-BC43-8221-F86E5F96768A}" type="slidenum">
               <a:rPr lang="en-US" smtClean="0"/>
-              <a:t>7</a:t>
+              <a:t>4</a:t>
             </a:fld>
             <a:endParaRPr lang="en-US"/>
           </a:p>
@@ -1385,7 +1607,7 @@
     </p:spTree>
     <p:extLst>
       <p:ext uri="{BB962C8B-B14F-4D97-AF65-F5344CB8AC3E}">
-        <p14:creationId xmlns:p14="http://schemas.microsoft.com/office/powerpoint/2010/main" val="2374772773"/>
+        <p14:creationId xmlns:p14="http://schemas.microsoft.com/office/powerpoint/2010/main" val="1174533777"/>
       </p:ext>
     </p:extLst>
   </p:cSld>
@@ -1441,7 +1663,7 @@
           <a:p>
             <a:r>
               <a:rPr lang="en-US" dirty="0"/>
-              <a:t>The main Lando page makes it very clear that Docker containers built by Lando are not to be used in production. This warning applies to almost any community-supported container you might pull down from Docker Hub: they are built for other reasons, mostly for developer convenience. For example: the official Tomcat containers from Apache all run as root. You do not want to run Tomcat as root. In a development environment, it’s fine, you know, whatever, let’s just get cracking. But you want your production site to be secure.</a:t>
+              <a:t>We aren’t going to dive deeply into Docker, because we don’t need to, we just need to keep in mind that Docker is what enables Lando to help us build a development environment. The most important part to know is that Docker is software that helps us organize our project environments into the parts we need. Like a database and an app server.</a:t>
             </a:r>
           </a:p>
         </p:txBody>
@@ -1463,7 +1685,7 @@
           <a:p>
             <a:fld id="{07F65287-0258-BC43-8221-F86E5F96768A}" type="slidenum">
               <a:rPr lang="en-US" smtClean="0"/>
-              <a:t>8</a:t>
+              <a:t>5</a:t>
             </a:fld>
             <a:endParaRPr lang="en-US"/>
           </a:p>
@@ -1472,7 +1694,7 @@
     </p:spTree>
     <p:extLst>
       <p:ext uri="{BB962C8B-B14F-4D97-AF65-F5344CB8AC3E}">
-        <p14:creationId xmlns:p14="http://schemas.microsoft.com/office/powerpoint/2010/main" val="1344439785"/>
+        <p14:creationId xmlns:p14="http://schemas.microsoft.com/office/powerpoint/2010/main" val="3064967801"/>
       </p:ext>
     </p:extLst>
   </p:cSld>
@@ -1526,17 +1748,144 @@
           <a:bodyPr/>
           <a:lstStyle/>
           <a:p>
-            <a:r>
-              <a:rPr lang="en-US" dirty="0"/>
-              <a:t>I should admit right now that I’ve borrowed, these intro slides from the Lando folks, they have a Google drive full of slide decks. Like a lot of opensource projects, they have a ton of resources and docs. The best place to start reading about Lando is </a:t>
-            </a:r>
-            <a:r>
-              <a:rPr lang="en-US" dirty="0" err="1"/>
-              <a:t>docs.lando.dev</a:t>
-            </a:r>
-            <a:r>
-              <a:rPr lang="en-US" dirty="0"/>
-              <a:t>. Stacks on Stacks on Racks is their explanation of just what Lando is. It starts with your operating system, which includes tech for containers, and then Docker running on that, and Docker Compose on top of Docker, and then Lando.</a:t>
+            <a:pPr marL="0" marR="0" lvl="0" indent="0" algn="l" defTabSz="914400" rtl="0" eaLnBrk="1" fontAlgn="auto" latinLnBrk="0" hangingPunct="1">
+              <a:lnSpc>
+                <a:spcPct val="100000"/>
+              </a:lnSpc>
+              <a:spcBef>
+                <a:spcPts val="0"/>
+              </a:spcBef>
+              <a:spcAft>
+                <a:spcPts val="0"/>
+              </a:spcAft>
+              <a:buClrTx/>
+              <a:buSzTx/>
+              <a:buFontTx/>
+              <a:buNone/>
+              <a:tabLst/>
+              <a:defRPr/>
+            </a:pPr>
+            <a:r>
+              <a:rPr lang="en-US" dirty="0"/>
+              <a:t>This is a famous cathedral in Barcelona, </a:t>
+            </a:r>
+            <a:r>
+              <a:rPr lang="en-US" sz="1200" b="0" i="0" kern="1200" dirty="0">
+                <a:solidFill>
+                  <a:schemeClr val="tx1"/>
+                </a:solidFill>
+                <a:effectLst/>
+                <a:latin typeface="+mn-lt"/>
+                <a:ea typeface="+mn-ea"/>
+                <a:cs typeface="+mn-cs"/>
+              </a:rPr>
+              <a:t>Sagrada </a:t>
+            </a:r>
+            <a:r>
+              <a:rPr lang="en-US" sz="1200" b="0" i="0" kern="1200" dirty="0" err="1">
+                <a:solidFill>
+                  <a:schemeClr val="tx1"/>
+                </a:solidFill>
+                <a:effectLst/>
+                <a:latin typeface="+mn-lt"/>
+                <a:ea typeface="+mn-ea"/>
+                <a:cs typeface="+mn-cs"/>
+              </a:rPr>
+              <a:t>Família</a:t>
+            </a:r>
+            <a:r>
+              <a:rPr lang="en-US" sz="1200" b="0" i="0" kern="1200" dirty="0">
+                <a:solidFill>
+                  <a:schemeClr val="tx1"/>
+                </a:solidFill>
+                <a:effectLst/>
+                <a:latin typeface="+mn-lt"/>
+                <a:ea typeface="+mn-ea"/>
+                <a:cs typeface="+mn-cs"/>
+              </a:rPr>
+              <a:t> ('Basilica of the Holy Family’), by Antoni </a:t>
+            </a:r>
+            <a:r>
+              <a:rPr lang="en-US" sz="1200" b="0" i="0" kern="1200" dirty="0" err="1">
+                <a:solidFill>
+                  <a:schemeClr val="tx1"/>
+                </a:solidFill>
+                <a:effectLst/>
+                <a:latin typeface="+mn-lt"/>
+                <a:ea typeface="+mn-ea"/>
+                <a:cs typeface="+mn-cs"/>
+              </a:rPr>
+              <a:t>Gaudí</a:t>
+            </a:r>
+            <a:r>
+              <a:rPr lang="en-US" sz="1200" b="0" i="0" kern="1200" dirty="0">
+                <a:solidFill>
+                  <a:schemeClr val="tx1"/>
+                </a:solidFill>
+                <a:effectLst/>
+                <a:latin typeface="+mn-lt"/>
+                <a:ea typeface="+mn-ea"/>
+                <a:cs typeface="+mn-cs"/>
+              </a:rPr>
+              <a:t>, it began construction in March of 1882. It’s still not done. I have a picture of this cathedral on my office wall, as a reminder that Perfect may not be attainable, and as a visual reminder of what the quest for perfection can look like.</a:t>
+            </a:r>
+            <a:br>
+              <a:rPr lang="en-US" sz="1200" b="0" i="0" kern="1200" dirty="0">
+                <a:solidFill>
+                  <a:schemeClr val="tx1"/>
+                </a:solidFill>
+                <a:effectLst/>
+                <a:latin typeface="+mn-lt"/>
+                <a:ea typeface="+mn-ea"/>
+                <a:cs typeface="+mn-cs"/>
+              </a:rPr>
+            </a:br>
+            <a:br>
+              <a:rPr lang="en-US" sz="1200" b="0" i="0" kern="1200" dirty="0">
+                <a:solidFill>
+                  <a:schemeClr val="tx1"/>
+                </a:solidFill>
+                <a:effectLst/>
+                <a:latin typeface="+mn-lt"/>
+                <a:ea typeface="+mn-ea"/>
+                <a:cs typeface="+mn-cs"/>
+              </a:rPr>
+            </a:br>
+            <a:r>
+              <a:rPr lang="en-US" sz="1200" b="0" i="0" kern="1200" dirty="0">
+                <a:solidFill>
+                  <a:schemeClr val="tx1"/>
+                </a:solidFill>
+                <a:effectLst/>
+                <a:latin typeface="+mn-lt"/>
+                <a:ea typeface="+mn-ea"/>
+                <a:cs typeface="+mn-cs"/>
+              </a:rPr>
+              <a:t>I have this picture in these slides as a way to say, Docker can be used to build huge and beautiful </a:t>
+            </a:r>
+            <a:r>
+              <a:rPr lang="en-US" sz="1200" b="0" i="0" kern="1200" dirty="0" err="1">
+                <a:solidFill>
+                  <a:schemeClr val="tx1"/>
+                </a:solidFill>
+                <a:effectLst/>
+                <a:latin typeface="+mn-lt"/>
+                <a:ea typeface="+mn-ea"/>
+                <a:cs typeface="+mn-cs"/>
+              </a:rPr>
+              <a:t>worklfows</a:t>
+            </a:r>
+            <a:r>
+              <a:rPr lang="en-US" sz="1200" b="0" i="0" kern="1200" dirty="0">
+                <a:solidFill>
+                  <a:schemeClr val="tx1"/>
+                </a:solidFill>
+                <a:effectLst/>
+                <a:latin typeface="+mn-lt"/>
+                <a:ea typeface="+mn-ea"/>
+                <a:cs typeface="+mn-cs"/>
+              </a:rPr>
+              <a:t>. We won’t be doing anything like that today. We are going to be building dev environments, so we can get to work.</a:t>
             </a:r>
           </a:p>
         </p:txBody>
@@ -1558,7 +1907,7 @@
           <a:p>
             <a:fld id="{07F65287-0258-BC43-8221-F86E5F96768A}" type="slidenum">
               <a:rPr lang="en-US" smtClean="0"/>
-              <a:t>11</a:t>
+              <a:t>7</a:t>
             </a:fld>
             <a:endParaRPr lang="en-US"/>
           </a:p>
@@ -1567,7 +1916,7 @@
     </p:spTree>
     <p:extLst>
       <p:ext uri="{BB962C8B-B14F-4D97-AF65-F5344CB8AC3E}">
-        <p14:creationId xmlns:p14="http://schemas.microsoft.com/office/powerpoint/2010/main" val="326291708"/>
+        <p14:creationId xmlns:p14="http://schemas.microsoft.com/office/powerpoint/2010/main" val="2374772773"/>
       </p:ext>
     </p:extLst>
   </p:cSld>
@@ -1621,7 +1970,10 @@
           <a:bodyPr/>
           <a:lstStyle/>
           <a:p>
-            <a:endParaRPr lang="en-US" dirty="0"/>
+            <a:r>
+              <a:rPr lang="en-US" dirty="0"/>
+              <a:t>The main Lando page makes it very clear that Docker containers built by Lando are not to be used in production. This warning applies to almost any community-supported container you might pull down from Docker Hub: they are built for other reasons, mostly for developer convenience. For example: the official Tomcat containers from Apache all run as root. You do not want to run Tomcat as root. In a development environment, it’s fine, you know, whatever, let’s just get cracking. But you want your production site to be secure.</a:t>
+            </a:r>
           </a:p>
         </p:txBody>
       </p:sp>
@@ -1642,7 +1994,7 @@
           <a:p>
             <a:fld id="{07F65287-0258-BC43-8221-F86E5F96768A}" type="slidenum">
               <a:rPr lang="en-US" smtClean="0"/>
-              <a:t>12</a:t>
+              <a:t>8</a:t>
             </a:fld>
             <a:endParaRPr lang="en-US"/>
           </a:p>
@@ -1651,7 +2003,7 @@
     </p:spTree>
     <p:extLst>
       <p:ext uri="{BB962C8B-B14F-4D97-AF65-F5344CB8AC3E}">
-        <p14:creationId xmlns:p14="http://schemas.microsoft.com/office/powerpoint/2010/main" val="1360150314"/>
+        <p14:creationId xmlns:p14="http://schemas.microsoft.com/office/powerpoint/2010/main" val="1344439785"/>
       </p:ext>
     </p:extLst>
   </p:cSld>
@@ -1707,23 +2059,15 @@
           <a:p>
             <a:r>
               <a:rPr lang="en-US" dirty="0"/>
-              <a:t>The Lando docs site makes a big deal about recipes, they’re flashy and can get you going quickly, but really, most of us are going to be working on stuff that is a bit more complicated than a Drupal site. We *will* use the LAMP recipe for </a:t>
+              <a:t>I should admit right now that I’ve borrowed, these intro slides from the Lando folks, they have a Google drive full of slide decks. Like a lot of opensource projects, they have a ton of resources and docs. The best place to start reading about Lando is </a:t>
             </a:r>
             <a:r>
               <a:rPr lang="en-US" dirty="0" err="1"/>
-              <a:t>Omeka</a:t>
-            </a:r>
-            <a:r>
-              <a:rPr lang="en-US" dirty="0"/>
-              <a:t>, and if you have a PHP app like </a:t>
-            </a:r>
-            <a:r>
-              <a:rPr lang="en-US" dirty="0" err="1"/>
-              <a:t>Omeka</a:t>
-            </a:r>
-            <a:r>
-              <a:rPr lang="en-US" dirty="0"/>
-              <a:t> or OJS, it’s a very fast way to get to work.</a:t>
+              <a:t>docs.lando.dev</a:t>
+            </a:r>
+            <a:r>
+              <a:rPr lang="en-US" dirty="0"/>
+              <a:t>. Stacks on Stacks on Racks is their explanation of just what Lando is. It starts with your operating system, which includes tech for containers, and then Docker running on that, and Docker Compose on top of Docker, and then Lando.</a:t>
             </a:r>
           </a:p>
         </p:txBody>
@@ -1745,7 +2089,7 @@
           <a:p>
             <a:fld id="{07F65287-0258-BC43-8221-F86E5F96768A}" type="slidenum">
               <a:rPr lang="en-US" smtClean="0"/>
-              <a:t>14</a:t>
+              <a:t>11</a:t>
             </a:fld>
             <a:endParaRPr lang="en-US"/>
           </a:p>
@@ -1754,7 +2098,7 @@
     </p:spTree>
     <p:extLst>
       <p:ext uri="{BB962C8B-B14F-4D97-AF65-F5344CB8AC3E}">
-        <p14:creationId xmlns:p14="http://schemas.microsoft.com/office/powerpoint/2010/main" val="1141383494"/>
+        <p14:creationId xmlns:p14="http://schemas.microsoft.com/office/powerpoint/2010/main" val="326291708"/>
       </p:ext>
     </p:extLst>
   </p:cSld>
@@ -1808,42 +2152,7 @@
           <a:bodyPr/>
           <a:lstStyle/>
           <a:p>
-            <a:r>
-              <a:rPr lang="en-US" dirty="0"/>
-              <a:t>This is a sketch of a .</a:t>
-            </a:r>
-            <a:r>
-              <a:rPr lang="en-US" dirty="0" err="1"/>
-              <a:t>lando.yml</a:t>
-            </a:r>
-            <a:r>
-              <a:rPr lang="en-US" dirty="0"/>
-              <a:t> file, it’s not complete, but gives you an idea of what one looks like. It’s </a:t>
-            </a:r>
-            <a:r>
-              <a:rPr lang="en-US" dirty="0" err="1"/>
-              <a:t>yaml</a:t>
-            </a:r>
-            <a:r>
-              <a:rPr lang="en-US" dirty="0"/>
-              <a:t>, so, you know, </a:t>
-            </a:r>
-            <a:r>
-              <a:rPr lang="en-US" dirty="0" err="1"/>
-              <a:t>gotta</a:t>
-            </a:r>
-            <a:r>
-              <a:rPr lang="en-US" dirty="0"/>
-              <a:t> start with three dashes. We’ll dig into the details through the rest of this workshop, but some things I want you to remember: you can specify environment variables in env files, you can provide as many as you need. SSH key management is mostly automatic with Lando (it copies your SSH keys for you), but you can control which key gets used by specifying it in the </a:t>
-            </a:r>
-            <a:r>
-              <a:rPr lang="en-US" dirty="0" err="1"/>
-              <a:t>Landofile</a:t>
-            </a:r>
-            <a:r>
-              <a:rPr lang="en-US" dirty="0"/>
-              <a:t>. Then you have SERVICES and TOOLING. Services are the pieces you need to develop your application. Tooling defines how you’ll interact with those services on the command line. Tooling is probably the most fun aspect of working with Lando, as the feedback loop is instantaneous. As soon as you add a new tooling config, you can use it, no reboot, no rebuild. Just dream it, write it, use it. Oh, if you’ve used Lando before or you’ve been keeping notes, you’ll probably be wondering if I’ve missed something here, and you’d be right, I’m intentionally skipping RECIPES for now. Mostly because as a library developer, none of the recipes will be a good fit. And recipes are too much magic. I’ve skipped other things as well, we’ll talk about them later, if we have time.</a:t>
-            </a:r>
+            <a:endParaRPr lang="en-US" dirty="0"/>
           </a:p>
         </p:txBody>
       </p:sp>
@@ -1864,7 +2173,7 @@
           <a:p>
             <a:fld id="{07F65287-0258-BC43-8221-F86E5F96768A}" type="slidenum">
               <a:rPr lang="en-US" smtClean="0"/>
-              <a:t>17</a:t>
+              <a:t>12</a:t>
             </a:fld>
             <a:endParaRPr lang="en-US"/>
           </a:p>
@@ -1873,7 +2182,7 @@
     </p:spTree>
     <p:extLst>
       <p:ext uri="{BB962C8B-B14F-4D97-AF65-F5344CB8AC3E}">
-        <p14:creationId xmlns:p14="http://schemas.microsoft.com/office/powerpoint/2010/main" val="2212794323"/>
+        <p14:creationId xmlns:p14="http://schemas.microsoft.com/office/powerpoint/2010/main" val="1360150314"/>
       </p:ext>
     </p:extLst>
   </p:cSld>
@@ -1929,15 +2238,23 @@
           <a:p>
             <a:r>
               <a:rPr lang="en-US" dirty="0"/>
-              <a:t>Here’s a quick look at a </a:t>
+              <a:t>The Lando docs site makes a big deal about recipes, they’re flashy and can get you going quickly, but really, most of us are going to be working on stuff that is a bit more complicated than a Drupal site. We *will* use the LAMP recipe for </a:t>
             </a:r>
             <a:r>
               <a:rPr lang="en-US" dirty="0" err="1"/>
-              <a:t>Landofile</a:t>
-            </a:r>
-            <a:r>
-              <a:rPr lang="en-US" dirty="0"/>
-              <a:t> that uses a recipe: this uses the Lamp recipe, so you specify what version of PHP you want to use, and what DB you want to use, and everything is auto-configured by convention. If a Lamp stack is what your app needs, this will get you going.</a:t>
+              <a:t>Omeka</a:t>
+            </a:r>
+            <a:r>
+              <a:rPr lang="en-US" dirty="0"/>
+              <a:t>, and if you have a PHP app like </a:t>
+            </a:r>
+            <a:r>
+              <a:rPr lang="en-US" dirty="0" err="1"/>
+              <a:t>Omeka</a:t>
+            </a:r>
+            <a:r>
+              <a:rPr lang="en-US" dirty="0"/>
+              <a:t> or OJS, it’s a very fast way to get to work.</a:t>
             </a:r>
           </a:p>
         </p:txBody>
@@ -1959,7 +2276,7 @@
           <a:p>
             <a:fld id="{07F65287-0258-BC43-8221-F86E5F96768A}" type="slidenum">
               <a:rPr lang="en-US" smtClean="0"/>
-              <a:t>18</a:t>
+              <a:t>14</a:t>
             </a:fld>
             <a:endParaRPr lang="en-US"/>
           </a:p>
@@ -1968,7 +2285,7 @@
     </p:spTree>
     <p:extLst>
       <p:ext uri="{BB962C8B-B14F-4D97-AF65-F5344CB8AC3E}">
-        <p14:creationId xmlns:p14="http://schemas.microsoft.com/office/powerpoint/2010/main" val="3778597517"/>
+        <p14:creationId xmlns:p14="http://schemas.microsoft.com/office/powerpoint/2010/main" val="1141383494"/>
       </p:ext>
     </p:extLst>
   </p:cSld>
@@ -2250,7 +2567,7 @@
           <a:p>
             <a:fld id="{DC542904-3975-4E3E-BBB9-A828B1A3FA3D}" type="datetimeFigureOut">
               <a:rPr lang="en-US" smtClean="0"/>
-              <a:t>3/1/21</a:t>
+              <a:t>3/8/21</a:t>
             </a:fld>
             <a:endParaRPr lang="en-US"/>
           </a:p>
@@ -2458,7 +2775,7 @@
           <a:p>
             <a:fld id="{DC542904-3975-4E3E-BBB9-A828B1A3FA3D}" type="datetimeFigureOut">
               <a:rPr lang="en-US" smtClean="0"/>
-              <a:t>3/1/21</a:t>
+              <a:t>3/8/21</a:t>
             </a:fld>
             <a:endParaRPr lang="en-US"/>
           </a:p>
@@ -2666,7 +2983,7 @@
           <a:p>
             <a:fld id="{DC542904-3975-4E3E-BBB9-A828B1A3FA3D}" type="datetimeFigureOut">
               <a:rPr lang="en-US" smtClean="0"/>
-              <a:t>3/1/21</a:t>
+              <a:t>3/8/21</a:t>
             </a:fld>
             <a:endParaRPr lang="en-US"/>
           </a:p>
@@ -2941,7 +3258,7 @@
           <a:p>
             <a:fld id="{DC542904-3975-4E3E-BBB9-A828B1A3FA3D}" type="datetimeFigureOut">
               <a:rPr lang="en-US" smtClean="0"/>
-              <a:t>3/1/21</a:t>
+              <a:t>3/8/21</a:t>
             </a:fld>
             <a:endParaRPr lang="en-US"/>
           </a:p>
@@ -3211,7 +3528,7 @@
           <a:p>
             <a:fld id="{DC542904-3975-4E3E-BBB9-A828B1A3FA3D}" type="datetimeFigureOut">
               <a:rPr lang="en-US" smtClean="0"/>
-              <a:t>3/1/21</a:t>
+              <a:t>3/8/21</a:t>
             </a:fld>
             <a:endParaRPr lang="en-US"/>
           </a:p>
@@ -3623,7 +3940,7 @@
           <a:p>
             <a:fld id="{DC542904-3975-4E3E-BBB9-A828B1A3FA3D}" type="datetimeFigureOut">
               <a:rPr lang="en-US" smtClean="0"/>
-              <a:t>3/1/21</a:t>
+              <a:t>3/8/21</a:t>
             </a:fld>
             <a:endParaRPr lang="en-US"/>
           </a:p>
@@ -3769,7 +4086,7 @@
           <a:p>
             <a:fld id="{DC542904-3975-4E3E-BBB9-A828B1A3FA3D}" type="datetimeFigureOut">
               <a:rPr lang="en-US" smtClean="0"/>
-              <a:t>3/1/21</a:t>
+              <a:t>3/8/21</a:t>
             </a:fld>
             <a:endParaRPr lang="en-US"/>
           </a:p>
@@ -3882,7 +4199,7 @@
           <a:p>
             <a:fld id="{DC542904-3975-4E3E-BBB9-A828B1A3FA3D}" type="datetimeFigureOut">
               <a:rPr lang="en-US" smtClean="0"/>
-              <a:t>3/1/21</a:t>
+              <a:t>3/8/21</a:t>
             </a:fld>
             <a:endParaRPr lang="en-US"/>
           </a:p>
@@ -4195,7 +4512,7 @@
           <a:p>
             <a:fld id="{DC542904-3975-4E3E-BBB9-A828B1A3FA3D}" type="datetimeFigureOut">
               <a:rPr lang="en-US" smtClean="0"/>
-              <a:t>3/1/21</a:t>
+              <a:t>3/8/21</a:t>
             </a:fld>
             <a:endParaRPr lang="en-US"/>
           </a:p>
@@ -4485,7 +4802,7 @@
           <a:p>
             <a:fld id="{DC542904-3975-4E3E-BBB9-A828B1A3FA3D}" type="datetimeFigureOut">
               <a:rPr lang="en-US" smtClean="0"/>
-              <a:t>3/1/21</a:t>
+              <a:t>3/8/21</a:t>
             </a:fld>
             <a:endParaRPr lang="en-US"/>
           </a:p>
@@ -4735,7 +5052,7 @@
           <a:p>
             <a:fld id="{DC542904-3975-4E3E-BBB9-A828B1A3FA3D}" type="datetimeFigureOut">
               <a:rPr lang="en-US" smtClean="0"/>
-              <a:t>3/1/21</a:t>
+              <a:t>3/8/21</a:t>
             </a:fld>
             <a:endParaRPr lang="en-US"/>
           </a:p>
@@ -5168,43 +5485,48 @@
             <p:ph type="ctrTitle"/>
           </p:nvPr>
         </p:nvSpPr>
-        <p:spPr/>
-        <p:txBody>
-          <a:bodyPr/>
-          <a:lstStyle/>
-          <a:p>
-            <a:r>
-              <a:rPr lang="en-US" dirty="0"/>
-              <a:t>Learning as We Go</a:t>
-            </a:r>
-          </a:p>
-        </p:txBody>
-      </p:sp>
-      <p:sp>
-        <p:nvSpPr>
-          <p:cNvPr id="3" name="Subtitle 2">
-            <a:extLst>
-              <a:ext uri="{FF2B5EF4-FFF2-40B4-BE49-F238E27FC236}">
-                <a16:creationId xmlns:a16="http://schemas.microsoft.com/office/drawing/2014/main" id="{F7C12DCE-9E0C-45CE-8B83-5E2D669C7054}"/>
-              </a:ext>
-            </a:extLst>
-          </p:cNvPr>
-          <p:cNvSpPr>
-            <a:spLocks noGrp="1"/>
-          </p:cNvSpPr>
-          <p:nvPr>
-            <p:ph type="subTitle" idx="1"/>
-          </p:nvPr>
-        </p:nvSpPr>
         <p:spPr>
           <a:xfrm>
-            <a:off x="1524000" y="3429000"/>
+            <a:off x="1524000" y="519249"/>
+            <a:ext cx="9144000" cy="2387600"/>
+          </a:xfrm>
+        </p:spPr>
+        <p:txBody>
+          <a:bodyPr/>
+          <a:lstStyle/>
+          <a:p>
+            <a:r>
+              <a:rPr lang="en-US" dirty="0"/>
+              <a:t>Learning as We Go</a:t>
+            </a:r>
+          </a:p>
+        </p:txBody>
+      </p:sp>
+      <p:sp>
+        <p:nvSpPr>
+          <p:cNvPr id="3" name="Subtitle 2">
+            <a:extLst>
+              <a:ext uri="{FF2B5EF4-FFF2-40B4-BE49-F238E27FC236}">
+                <a16:creationId xmlns:a16="http://schemas.microsoft.com/office/drawing/2014/main" id="{F7C12DCE-9E0C-45CE-8B83-5E2D669C7054}"/>
+              </a:ext>
+            </a:extLst>
+          </p:cNvPr>
+          <p:cNvSpPr>
+            <a:spLocks noGrp="1"/>
+          </p:cNvSpPr>
+          <p:nvPr>
+            <p:ph type="subTitle" idx="1"/>
+          </p:nvPr>
+        </p:nvSpPr>
+        <p:spPr>
+          <a:xfrm>
+            <a:off x="1524000" y="2825886"/>
             <a:ext cx="9144000" cy="1828800"/>
           </a:xfrm>
         </p:spPr>
         <p:txBody>
           <a:bodyPr>
-            <a:normAutofit fontScale="92500" lnSpcReduction="10000"/>
+            <a:noAutofit/>
           </a:bodyPr>
           <a:lstStyle/>
           <a:p>
@@ -5228,23 +5550,42 @@
               <a:rPr lang="en-US" dirty="0" err="1"/>
               <a:t>HardyPottinger</a:t>
             </a:r>
+            <a:br>
+              <a:rPr lang="en-US" dirty="0"/>
+            </a:br>
+            <a:br>
+              <a:rPr lang="en-US" sz="800" dirty="0"/>
+            </a:br>
+            <a:r>
+              <a:rPr lang="en-US" dirty="0"/>
+              <a:t>post-conference workshop</a:t>
+            </a:r>
+            <a:br>
+              <a:rPr lang="en-US" dirty="0"/>
+            </a:br>
+            <a:r>
+              <a:rPr lang="en-US" dirty="0"/>
+              <a:t>Friday March 26, 2021</a:t>
+            </a:r>
+          </a:p>
+          <a:p>
+            <a:r>
+              <a:rPr lang="en-US" dirty="0"/>
+              <a:t>https://</a:t>
+            </a:r>
+            <a:r>
+              <a:rPr lang="en-US" dirty="0" err="1"/>
+              <a:t>git.io</a:t>
+            </a:r>
+            <a:r>
+              <a:rPr lang="en-US" dirty="0"/>
+              <a:t>/</a:t>
+            </a:r>
+            <a:r>
+              <a:rPr lang="en-US" dirty="0" err="1"/>
+              <a:t>JqLaG</a:t>
+            </a:r>
             <a:endParaRPr lang="en-US" dirty="0"/>
-          </a:p>
-          <a:p>
-            <a:br>
-              <a:rPr lang="en-US" dirty="0"/>
-            </a:br>
-            <a:r>
-              <a:rPr lang="en-US" dirty="0"/>
-              <a:t>post-conference workshop</a:t>
-            </a:r>
-            <a:br>
-              <a:rPr lang="en-US" dirty="0"/>
-            </a:br>
-            <a:r>
-              <a:rPr lang="en-US" dirty="0"/>
-              <a:t>Friday March 26, 2021</a:t>
-            </a:r>
           </a:p>
         </p:txBody>
       </p:sp>
@@ -5270,7 +5611,7 @@
         </p:blipFill>
         <p:spPr>
           <a:xfrm>
-            <a:off x="6800850" y="3810000"/>
+            <a:off x="6800850" y="3304162"/>
             <a:ext cx="304800" cy="304800"/>
           </a:xfrm>
           <a:prstGeom prst="rect">
@@ -7504,8 +7845,8 @@
           </a:p>
         </p:txBody>
       </p:sp>
-      <mc:AlternateContent xmlns:mc="http://schemas.openxmlformats.org/markup-compatibility/2006">
-        <mc:Choice xmlns:p14="http://schemas.microsoft.com/office/powerpoint/2010/main" Requires="p14">
+      <mc:AlternateContent xmlns:mc="http://schemas.openxmlformats.org/markup-compatibility/2006" xmlns:p14="http://schemas.microsoft.com/office/powerpoint/2010/main">
+        <mc:Choice Requires="p14">
           <p:contentPart p14:bwMode="auto" r:id="rId3">
             <p14:nvContentPartPr>
               <p14:cNvPr id="7" name="Ink 6">
@@ -7524,7 +7865,7 @@
             </p14:xfrm>
           </p:contentPart>
         </mc:Choice>
-        <mc:Fallback>
+        <mc:Fallback xmlns="">
           <p:pic>
             <p:nvPicPr>
               <p:cNvPr id="7" name="Ink 6">
@@ -7555,8 +7896,8 @@
           </p:pic>
         </mc:Fallback>
       </mc:AlternateContent>
-      <mc:AlternateContent xmlns:mc="http://schemas.openxmlformats.org/markup-compatibility/2006">
-        <mc:Choice xmlns:p14="http://schemas.microsoft.com/office/powerpoint/2010/main" Requires="p14">
+      <mc:AlternateContent xmlns:mc="http://schemas.openxmlformats.org/markup-compatibility/2006" xmlns:p14="http://schemas.microsoft.com/office/powerpoint/2010/main">
+        <mc:Choice Requires="p14">
           <p:contentPart p14:bwMode="auto" r:id="rId5">
             <p14:nvContentPartPr>
               <p14:cNvPr id="8" name="Ink 7">
@@ -7575,7 +7916,7 @@
             </p14:xfrm>
           </p:contentPart>
         </mc:Choice>
-        <mc:Fallback>
+        <mc:Fallback xmlns="">
           <p:pic>
             <p:nvPicPr>
               <p:cNvPr id="8" name="Ink 7">
@@ -7916,7 +8257,7 @@
           <p:cNvPr id="2" name="Title 1">
             <a:extLst>
               <a:ext uri="{FF2B5EF4-FFF2-40B4-BE49-F238E27FC236}">
-                <a16:creationId xmlns:a16="http://schemas.microsoft.com/office/drawing/2014/main" id="{D6A23C41-493D-424B-8C82-01C1E6707DAD}"/>
+                <a16:creationId xmlns:a16="http://schemas.microsoft.com/office/drawing/2014/main" id="{3DED720E-D38B-334C-900E-B39AB7B77FD9}"/>
               </a:ext>
             </a:extLst>
           </p:cNvPr>
@@ -7934,40 +8275,63 @@
           <a:p>
             <a:r>
               <a:rPr lang="en-US" dirty="0"/>
-              <a:t>Questions?</a:t>
-            </a:r>
-          </a:p>
-        </p:txBody>
-      </p:sp>
-      <p:sp>
-        <p:nvSpPr>
-          <p:cNvPr id="3" name="Text Placeholder 2">
-            <a:extLst>
-              <a:ext uri="{FF2B5EF4-FFF2-40B4-BE49-F238E27FC236}">
-                <a16:creationId xmlns:a16="http://schemas.microsoft.com/office/drawing/2014/main" id="{956277A2-A008-EC47-9DAD-A5091B32E39C}"/>
-              </a:ext>
-            </a:extLst>
-          </p:cNvPr>
-          <p:cNvSpPr>
-            <a:spLocks noGrp="1"/>
-          </p:cNvSpPr>
-          <p:nvPr>
-            <p:ph type="body" idx="1"/>
-          </p:nvPr>
-        </p:nvSpPr>
-        <p:spPr/>
-        <p:txBody>
-          <a:bodyPr/>
-          <a:lstStyle/>
-          <a:p>
-            <a:endParaRPr lang="en-US"/>
-          </a:p>
-        </p:txBody>
-      </p:sp>
+              <a:t>Lando Cheat Sheet: https://</a:t>
+            </a:r>
+            <a:r>
+              <a:rPr lang="en-US" dirty="0" err="1"/>
+              <a:t>git.io</a:t>
+            </a:r>
+            <a:r>
+              <a:rPr lang="en-US" dirty="0"/>
+              <a:t>/</a:t>
+            </a:r>
+            <a:r>
+              <a:rPr lang="en-US" dirty="0" err="1"/>
+              <a:t>JqLaI</a:t>
+            </a:r>
+            <a:endParaRPr lang="en-US" dirty="0"/>
+          </a:p>
+        </p:txBody>
+      </p:sp>
+      <p:pic>
+        <p:nvPicPr>
+          <p:cNvPr id="5" name="Content Placeholder 4">
+            <a:extLst>
+              <a:ext uri="{FF2B5EF4-FFF2-40B4-BE49-F238E27FC236}">
+                <a16:creationId xmlns:a16="http://schemas.microsoft.com/office/drawing/2014/main" id="{7C59A9DB-44B7-1844-A01A-D10EFA710E50}"/>
+              </a:ext>
+            </a:extLst>
+          </p:cNvPr>
+          <p:cNvPicPr>
+            <a:picLocks noGrp="1" noChangeAspect="1"/>
+          </p:cNvPicPr>
+          <p:nvPr>
+            <p:ph idx="1"/>
+          </p:nvPr>
+        </p:nvPicPr>
+        <p:blipFill>
+          <a:blip r:embed="rId3">
+            <a:extLst>
+              <a:ext uri="{28A0092B-C50C-407E-A947-70E740481C1C}">
+                <a14:useLocalDpi xmlns:a14="http://schemas.microsoft.com/office/drawing/2010/main" val="0"/>
+              </a:ext>
+            </a:extLst>
+          </a:blip>
+          <a:stretch>
+            <a:fillRect/>
+          </a:stretch>
+        </p:blipFill>
+        <p:spPr>
+          <a:xfrm>
+            <a:off x="3305943" y="1690688"/>
+            <a:ext cx="4592916" cy="3659191"/>
+          </a:xfrm>
+        </p:spPr>
+      </p:pic>
     </p:spTree>
     <p:extLst>
       <p:ext uri="{BB962C8B-B14F-4D97-AF65-F5344CB8AC3E}">
-        <p14:creationId xmlns:p14="http://schemas.microsoft.com/office/powerpoint/2010/main" val="2081146988"/>
+        <p14:creationId xmlns:p14="http://schemas.microsoft.com/office/powerpoint/2010/main" val="1616805076"/>
       </p:ext>
     </p:extLst>
   </p:cSld>
@@ -8161,7 +8525,7 @@
           <p:cNvPr id="2" name="Title 1">
             <a:extLst>
               <a:ext uri="{FF2B5EF4-FFF2-40B4-BE49-F238E27FC236}">
-                <a16:creationId xmlns:a16="http://schemas.microsoft.com/office/drawing/2014/main" id="{E228AC91-6098-F144-B508-084DE48E6304}"/>
+                <a16:creationId xmlns:a16="http://schemas.microsoft.com/office/drawing/2014/main" id="{D6A23C41-493D-424B-8C82-01C1E6707DAD}"/>
               </a:ext>
             </a:extLst>
           </p:cNvPr>
@@ -8179,7 +8543,7 @@
           <a:p>
             <a:r>
               <a:rPr lang="en-US" dirty="0"/>
-              <a:t>Demo: Using Lando</a:t>
+              <a:t>Questions?</a:t>
             </a:r>
           </a:p>
         </p:txBody>
@@ -8189,7 +8553,7 @@
           <p:cNvPr id="3" name="Text Placeholder 2">
             <a:extLst>
               <a:ext uri="{FF2B5EF4-FFF2-40B4-BE49-F238E27FC236}">
-                <a16:creationId xmlns:a16="http://schemas.microsoft.com/office/drawing/2014/main" id="{97CB21E6-C5B0-F84F-B2AF-ABADE9B4086C}"/>
+                <a16:creationId xmlns:a16="http://schemas.microsoft.com/office/drawing/2014/main" id="{956277A2-A008-EC47-9DAD-A5091B32E39C}"/>
               </a:ext>
             </a:extLst>
           </p:cNvPr>
@@ -8212,7 +8576,7 @@
     </p:spTree>
     <p:extLst>
       <p:ext uri="{BB962C8B-B14F-4D97-AF65-F5344CB8AC3E}">
-        <p14:creationId xmlns:p14="http://schemas.microsoft.com/office/powerpoint/2010/main" val="2597285647"/>
+        <p14:creationId xmlns:p14="http://schemas.microsoft.com/office/powerpoint/2010/main" val="2081146988"/>
       </p:ext>
     </p:extLst>
   </p:cSld>
@@ -8244,7 +8608,7 @@
           <p:cNvPr id="2" name="Title 1">
             <a:extLst>
               <a:ext uri="{FF2B5EF4-FFF2-40B4-BE49-F238E27FC236}">
-                <a16:creationId xmlns:a16="http://schemas.microsoft.com/office/drawing/2014/main" id="{D6A23C41-493D-424B-8C82-01C1E6707DAD}"/>
+                <a16:creationId xmlns:a16="http://schemas.microsoft.com/office/drawing/2014/main" id="{E228AC91-6098-F144-B508-084DE48E6304}"/>
               </a:ext>
             </a:extLst>
           </p:cNvPr>
@@ -8262,7 +8626,7 @@
           <a:p>
             <a:r>
               <a:rPr lang="en-US" dirty="0"/>
-              <a:t>Questions?</a:t>
+              <a:t>Demo: Using Lando</a:t>
             </a:r>
           </a:p>
         </p:txBody>
@@ -8272,7 +8636,7 @@
           <p:cNvPr id="3" name="Text Placeholder 2">
             <a:extLst>
               <a:ext uri="{FF2B5EF4-FFF2-40B4-BE49-F238E27FC236}">
-                <a16:creationId xmlns:a16="http://schemas.microsoft.com/office/drawing/2014/main" id="{956277A2-A008-EC47-9DAD-A5091B32E39C}"/>
+                <a16:creationId xmlns:a16="http://schemas.microsoft.com/office/drawing/2014/main" id="{97CB21E6-C5B0-F84F-B2AF-ABADE9B4086C}"/>
               </a:ext>
             </a:extLst>
           </p:cNvPr>
@@ -8295,7 +8659,7 @@
     </p:spTree>
     <p:extLst>
       <p:ext uri="{BB962C8B-B14F-4D97-AF65-F5344CB8AC3E}">
-        <p14:creationId xmlns:p14="http://schemas.microsoft.com/office/powerpoint/2010/main" val="401549215"/>
+        <p14:creationId xmlns:p14="http://schemas.microsoft.com/office/powerpoint/2010/main" val="2597285647"/>
       </p:ext>
     </p:extLst>
   </p:cSld>
@@ -8327,7 +8691,7 @@
           <p:cNvPr id="2" name="Title 1">
             <a:extLst>
               <a:ext uri="{FF2B5EF4-FFF2-40B4-BE49-F238E27FC236}">
-                <a16:creationId xmlns:a16="http://schemas.microsoft.com/office/drawing/2014/main" id="{9C4B320C-BD32-E446-9725-A512D62FCF0C}"/>
+                <a16:creationId xmlns:a16="http://schemas.microsoft.com/office/drawing/2014/main" id="{D6A23C41-493D-424B-8C82-01C1E6707DAD}"/>
               </a:ext>
             </a:extLst>
           </p:cNvPr>
@@ -8345,7 +8709,7 @@
           <a:p>
             <a:r>
               <a:rPr lang="en-US" dirty="0"/>
-              <a:t>Exercise 1: MySQL</a:t>
+              <a:t>Questions?</a:t>
             </a:r>
           </a:p>
         </p:txBody>
@@ -8355,7 +8719,7 @@
           <p:cNvPr id="3" name="Text Placeholder 2">
             <a:extLst>
               <a:ext uri="{FF2B5EF4-FFF2-40B4-BE49-F238E27FC236}">
-                <a16:creationId xmlns:a16="http://schemas.microsoft.com/office/drawing/2014/main" id="{992759C3-BABA-6C41-B22B-A7AE3FE06478}"/>
+                <a16:creationId xmlns:a16="http://schemas.microsoft.com/office/drawing/2014/main" id="{956277A2-A008-EC47-9DAD-A5091B32E39C}"/>
               </a:ext>
             </a:extLst>
           </p:cNvPr>
@@ -8371,17 +8735,14 @@
           <a:bodyPr/>
           <a:lstStyle/>
           <a:p>
-            <a:r>
-              <a:rPr lang="en-US" dirty="0"/>
-              <a:t>Let’s make a database and import a backup from prod.</a:t>
-            </a:r>
+            <a:endParaRPr lang="en-US"/>
           </a:p>
         </p:txBody>
       </p:sp>
     </p:spTree>
     <p:extLst>
       <p:ext uri="{BB962C8B-B14F-4D97-AF65-F5344CB8AC3E}">
-        <p14:creationId xmlns:p14="http://schemas.microsoft.com/office/powerpoint/2010/main" val="2456542190"/>
+        <p14:creationId xmlns:p14="http://schemas.microsoft.com/office/powerpoint/2010/main" val="401549215"/>
       </p:ext>
     </p:extLst>
   </p:cSld>
@@ -8413,7 +8774,7 @@
           <p:cNvPr id="2" name="Title 1">
             <a:extLst>
               <a:ext uri="{FF2B5EF4-FFF2-40B4-BE49-F238E27FC236}">
-                <a16:creationId xmlns:a16="http://schemas.microsoft.com/office/drawing/2014/main" id="{D6A23C41-493D-424B-8C82-01C1E6707DAD}"/>
+                <a16:creationId xmlns:a16="http://schemas.microsoft.com/office/drawing/2014/main" id="{9C4B320C-BD32-E446-9725-A512D62FCF0C}"/>
               </a:ext>
             </a:extLst>
           </p:cNvPr>
@@ -8431,7 +8792,7 @@
           <a:p>
             <a:r>
               <a:rPr lang="en-US" dirty="0"/>
-              <a:t>Questions?</a:t>
+              <a:t>Exercise 1: MySQL</a:t>
             </a:r>
           </a:p>
         </p:txBody>
@@ -8441,7 +8802,7 @@
           <p:cNvPr id="3" name="Text Placeholder 2">
             <a:extLst>
               <a:ext uri="{FF2B5EF4-FFF2-40B4-BE49-F238E27FC236}">
-                <a16:creationId xmlns:a16="http://schemas.microsoft.com/office/drawing/2014/main" id="{956277A2-A008-EC47-9DAD-A5091B32E39C}"/>
+                <a16:creationId xmlns:a16="http://schemas.microsoft.com/office/drawing/2014/main" id="{992759C3-BABA-6C41-B22B-A7AE3FE06478}"/>
               </a:ext>
             </a:extLst>
           </p:cNvPr>
@@ -8457,14 +8818,17 @@
           <a:bodyPr/>
           <a:lstStyle/>
           <a:p>
-            <a:endParaRPr lang="en-US"/>
+            <a:r>
+              <a:rPr lang="en-US" dirty="0"/>
+              <a:t>Let’s make a database and import a backup from prod.</a:t>
+            </a:r>
           </a:p>
         </p:txBody>
       </p:sp>
     </p:spTree>
     <p:extLst>
       <p:ext uri="{BB962C8B-B14F-4D97-AF65-F5344CB8AC3E}">
-        <p14:creationId xmlns:p14="http://schemas.microsoft.com/office/powerpoint/2010/main" val="3503502895"/>
+        <p14:creationId xmlns:p14="http://schemas.microsoft.com/office/powerpoint/2010/main" val="2456542190"/>
       </p:ext>
     </p:extLst>
   </p:cSld>
@@ -8496,7 +8860,7 @@
           <p:cNvPr id="2" name="Title 1">
             <a:extLst>
               <a:ext uri="{FF2B5EF4-FFF2-40B4-BE49-F238E27FC236}">
-                <a16:creationId xmlns:a16="http://schemas.microsoft.com/office/drawing/2014/main" id="{7781E4E5-06EA-104B-B43C-12D360F7E4BF}"/>
+                <a16:creationId xmlns:a16="http://schemas.microsoft.com/office/drawing/2014/main" id="{D6A23C41-493D-424B-8C82-01C1E6707DAD}"/>
               </a:ext>
             </a:extLst>
           </p:cNvPr>
@@ -8514,15 +8878,7 @@
           <a:p>
             <a:r>
               <a:rPr lang="en-US" dirty="0"/>
-              <a:t>Exercise 2: </a:t>
-            </a:r>
-            <a:r>
-              <a:rPr lang="en-US" dirty="0" err="1"/>
-              <a:t>Omeka</a:t>
-            </a:r>
-            <a:r>
-              <a:rPr lang="en-US" dirty="0"/>
-              <a:t>-S</a:t>
+              <a:t>Questions?</a:t>
             </a:r>
           </a:p>
         </p:txBody>
@@ -8532,7 +8888,7 @@
           <p:cNvPr id="3" name="Text Placeholder 2">
             <a:extLst>
               <a:ext uri="{FF2B5EF4-FFF2-40B4-BE49-F238E27FC236}">
-                <a16:creationId xmlns:a16="http://schemas.microsoft.com/office/drawing/2014/main" id="{18F9F21A-B712-4A4F-A15A-B12D3FE26E8C}"/>
+                <a16:creationId xmlns:a16="http://schemas.microsoft.com/office/drawing/2014/main" id="{956277A2-A008-EC47-9DAD-A5091B32E39C}"/>
               </a:ext>
             </a:extLst>
           </p:cNvPr>
@@ -8548,17 +8904,14 @@
           <a:bodyPr/>
           <a:lstStyle/>
           <a:p>
-            <a:r>
-              <a:rPr lang="en-US" dirty="0"/>
-              <a:t>OK, fine, it’s a LAMP application. Let’s use a recipe.</a:t>
-            </a:r>
+            <a:endParaRPr lang="en-US"/>
           </a:p>
         </p:txBody>
       </p:sp>
     </p:spTree>
     <p:extLst>
       <p:ext uri="{BB962C8B-B14F-4D97-AF65-F5344CB8AC3E}">
-        <p14:creationId xmlns:p14="http://schemas.microsoft.com/office/powerpoint/2010/main" val="3688702771"/>
+        <p14:creationId xmlns:p14="http://schemas.microsoft.com/office/powerpoint/2010/main" val="3503502895"/>
       </p:ext>
     </p:extLst>
   </p:cSld>
@@ -8590,7 +8943,7 @@
           <p:cNvPr id="2" name="Title 1">
             <a:extLst>
               <a:ext uri="{FF2B5EF4-FFF2-40B4-BE49-F238E27FC236}">
-                <a16:creationId xmlns:a16="http://schemas.microsoft.com/office/drawing/2014/main" id="{D6A23C41-493D-424B-8C82-01C1E6707DAD}"/>
+                <a16:creationId xmlns:a16="http://schemas.microsoft.com/office/drawing/2014/main" id="{7781E4E5-06EA-104B-B43C-12D360F7E4BF}"/>
               </a:ext>
             </a:extLst>
           </p:cNvPr>
@@ -8608,7 +8961,15 @@
           <a:p>
             <a:r>
               <a:rPr lang="en-US" dirty="0"/>
-              <a:t>Questions?</a:t>
+              <a:t>Exercise 2: </a:t>
+            </a:r>
+            <a:r>
+              <a:rPr lang="en-US" dirty="0" err="1"/>
+              <a:t>Omeka</a:t>
+            </a:r>
+            <a:r>
+              <a:rPr lang="en-US" dirty="0"/>
+              <a:t>-S</a:t>
             </a:r>
           </a:p>
         </p:txBody>
@@ -8618,7 +8979,7 @@
           <p:cNvPr id="3" name="Text Placeholder 2">
             <a:extLst>
               <a:ext uri="{FF2B5EF4-FFF2-40B4-BE49-F238E27FC236}">
-                <a16:creationId xmlns:a16="http://schemas.microsoft.com/office/drawing/2014/main" id="{956277A2-A008-EC47-9DAD-A5091B32E39C}"/>
+                <a16:creationId xmlns:a16="http://schemas.microsoft.com/office/drawing/2014/main" id="{18F9F21A-B712-4A4F-A15A-B12D3FE26E8C}"/>
               </a:ext>
             </a:extLst>
           </p:cNvPr>
@@ -8634,14 +8995,17 @@
           <a:bodyPr/>
           <a:lstStyle/>
           <a:p>
-            <a:endParaRPr lang="en-US"/>
+            <a:r>
+              <a:rPr lang="en-US" dirty="0"/>
+              <a:t>OK, fine, it’s a LAMP application. Let’s use a recipe.</a:t>
+            </a:r>
           </a:p>
         </p:txBody>
       </p:sp>
     </p:spTree>
     <p:extLst>
       <p:ext uri="{BB962C8B-B14F-4D97-AF65-F5344CB8AC3E}">
-        <p14:creationId xmlns:p14="http://schemas.microsoft.com/office/powerpoint/2010/main" val="2669508734"/>
+        <p14:creationId xmlns:p14="http://schemas.microsoft.com/office/powerpoint/2010/main" val="3688702771"/>
       </p:ext>
     </p:extLst>
   </p:cSld>
@@ -8673,7 +9037,7 @@
           <p:cNvPr id="2" name="Title 1">
             <a:extLst>
               <a:ext uri="{FF2B5EF4-FFF2-40B4-BE49-F238E27FC236}">
-                <a16:creationId xmlns:a16="http://schemas.microsoft.com/office/drawing/2014/main" id="{AAEED4C0-1DF3-D144-A6A0-6C6646F28DDB}"/>
+                <a16:creationId xmlns:a16="http://schemas.microsoft.com/office/drawing/2014/main" id="{D6A23C41-493D-424B-8C82-01C1E6707DAD}"/>
               </a:ext>
             </a:extLst>
           </p:cNvPr>
@@ -8691,7 +9055,7 @@
           <a:p>
             <a:r>
               <a:rPr lang="en-US" dirty="0"/>
-              <a:t>Exercise 3: Django</a:t>
+              <a:t>Questions?</a:t>
             </a:r>
           </a:p>
         </p:txBody>
@@ -8701,7 +9065,7 @@
           <p:cNvPr id="3" name="Text Placeholder 2">
             <a:extLst>
               <a:ext uri="{FF2B5EF4-FFF2-40B4-BE49-F238E27FC236}">
-                <a16:creationId xmlns:a16="http://schemas.microsoft.com/office/drawing/2014/main" id="{67DDA928-AC23-F646-A723-A962FC9890D3}"/>
+                <a16:creationId xmlns:a16="http://schemas.microsoft.com/office/drawing/2014/main" id="{956277A2-A008-EC47-9DAD-A5091B32E39C}"/>
               </a:ext>
             </a:extLst>
           </p:cNvPr>
@@ -8724,7 +9088,7 @@
     </p:spTree>
     <p:extLst>
       <p:ext uri="{BB962C8B-B14F-4D97-AF65-F5344CB8AC3E}">
-        <p14:creationId xmlns:p14="http://schemas.microsoft.com/office/powerpoint/2010/main" val="2250178746"/>
+        <p14:creationId xmlns:p14="http://schemas.microsoft.com/office/powerpoint/2010/main" val="2669508734"/>
       </p:ext>
     </p:extLst>
   </p:cSld>
@@ -8756,7 +9120,7 @@
           <p:cNvPr id="2" name="Title 1">
             <a:extLst>
               <a:ext uri="{FF2B5EF4-FFF2-40B4-BE49-F238E27FC236}">
-                <a16:creationId xmlns:a16="http://schemas.microsoft.com/office/drawing/2014/main" id="{D6A23C41-493D-424B-8C82-01C1E6707DAD}"/>
+                <a16:creationId xmlns:a16="http://schemas.microsoft.com/office/drawing/2014/main" id="{AAEED4C0-1DF3-D144-A6A0-6C6646F28DDB}"/>
               </a:ext>
             </a:extLst>
           </p:cNvPr>
@@ -8774,7 +9138,7 @@
           <a:p>
             <a:r>
               <a:rPr lang="en-US" dirty="0"/>
-              <a:t>Questions?</a:t>
+              <a:t>Exercise 3: Django</a:t>
             </a:r>
           </a:p>
         </p:txBody>
@@ -8784,7 +9148,7 @@
           <p:cNvPr id="3" name="Text Placeholder 2">
             <a:extLst>
               <a:ext uri="{FF2B5EF4-FFF2-40B4-BE49-F238E27FC236}">
-                <a16:creationId xmlns:a16="http://schemas.microsoft.com/office/drawing/2014/main" id="{956277A2-A008-EC47-9DAD-A5091B32E39C}"/>
+                <a16:creationId xmlns:a16="http://schemas.microsoft.com/office/drawing/2014/main" id="{67DDA928-AC23-F646-A723-A962FC9890D3}"/>
               </a:ext>
             </a:extLst>
           </p:cNvPr>
@@ -8807,7 +9171,7 @@
     </p:spTree>
     <p:extLst>
       <p:ext uri="{BB962C8B-B14F-4D97-AF65-F5344CB8AC3E}">
-        <p14:creationId xmlns:p14="http://schemas.microsoft.com/office/powerpoint/2010/main" val="4089856535"/>
+        <p14:creationId xmlns:p14="http://schemas.microsoft.com/office/powerpoint/2010/main" val="2250178746"/>
       </p:ext>
     </p:extLst>
   </p:cSld>
@@ -8839,7 +9203,7 @@
           <p:cNvPr id="2" name="Title 1">
             <a:extLst>
               <a:ext uri="{FF2B5EF4-FFF2-40B4-BE49-F238E27FC236}">
-                <a16:creationId xmlns:a16="http://schemas.microsoft.com/office/drawing/2014/main" id="{A32D9154-3B32-1846-A1CD-CD5E07F4F549}"/>
+                <a16:creationId xmlns:a16="http://schemas.microsoft.com/office/drawing/2014/main" id="{D6A23C41-493D-424B-8C82-01C1E6707DAD}"/>
               </a:ext>
             </a:extLst>
           </p:cNvPr>
@@ -8857,7 +9221,7 @@
           <a:p>
             <a:r>
               <a:rPr lang="en-US" dirty="0"/>
-              <a:t>Exercise 4: Live Coding!</a:t>
+              <a:t>Questions?</a:t>
             </a:r>
           </a:p>
         </p:txBody>
@@ -8867,7 +9231,7 @@
           <p:cNvPr id="3" name="Text Placeholder 2">
             <a:extLst>
               <a:ext uri="{FF2B5EF4-FFF2-40B4-BE49-F238E27FC236}">
-                <a16:creationId xmlns:a16="http://schemas.microsoft.com/office/drawing/2014/main" id="{E9274D72-C8F7-F44A-BF2E-8A71860CB5C8}"/>
+                <a16:creationId xmlns:a16="http://schemas.microsoft.com/office/drawing/2014/main" id="{956277A2-A008-EC47-9DAD-A5091B32E39C}"/>
               </a:ext>
             </a:extLst>
           </p:cNvPr>
@@ -8883,17 +9247,14 @@
           <a:bodyPr/>
           <a:lstStyle/>
           <a:p>
-            <a:r>
-              <a:rPr lang="en-US" dirty="0"/>
-              <a:t>Let’s build a dev environment together!</a:t>
-            </a:r>
+            <a:endParaRPr lang="en-US"/>
           </a:p>
         </p:txBody>
       </p:sp>
     </p:spTree>
     <p:extLst>
       <p:ext uri="{BB962C8B-B14F-4D97-AF65-F5344CB8AC3E}">
-        <p14:creationId xmlns:p14="http://schemas.microsoft.com/office/powerpoint/2010/main" val="2344388654"/>
+        <p14:creationId xmlns:p14="http://schemas.microsoft.com/office/powerpoint/2010/main" val="4089856535"/>
       </p:ext>
     </p:extLst>
   </p:cSld>
@@ -8925,7 +9286,7 @@
           <p:cNvPr id="2" name="Title 1">
             <a:extLst>
               <a:ext uri="{FF2B5EF4-FFF2-40B4-BE49-F238E27FC236}">
-                <a16:creationId xmlns:a16="http://schemas.microsoft.com/office/drawing/2014/main" id="{B2097D4E-BCBE-B841-9D9D-4B7686B11008}"/>
+                <a16:creationId xmlns:a16="http://schemas.microsoft.com/office/drawing/2014/main" id="{A32D9154-3B32-1846-A1CD-CD5E07F4F549}"/>
               </a:ext>
             </a:extLst>
           </p:cNvPr>
@@ -8943,120 +9304,35 @@
           <a:p>
             <a:r>
               <a:rPr lang="en-US" dirty="0"/>
-              <a:t>Extra Credit</a:t>
-            </a:r>
-          </a:p>
-        </p:txBody>
-      </p:sp>
-      <p:sp>
-        <p:nvSpPr>
-          <p:cNvPr id="3" name="Content Placeholder 2">
-            <a:extLst>
-              <a:ext uri="{FF2B5EF4-FFF2-40B4-BE49-F238E27FC236}">
-                <a16:creationId xmlns:a16="http://schemas.microsoft.com/office/drawing/2014/main" id="{B0E1A122-A783-F14B-8B2E-F1E8176A675C}"/>
-              </a:ext>
-            </a:extLst>
-          </p:cNvPr>
-          <p:cNvSpPr>
-            <a:spLocks noGrp="1"/>
-          </p:cNvSpPr>
-          <p:nvPr>
-            <p:ph idx="1"/>
-          </p:nvPr>
-        </p:nvSpPr>
-        <p:spPr/>
-        <p:txBody>
-          <a:bodyPr/>
-          <a:lstStyle/>
-          <a:p>
-            <a:r>
-              <a:rPr lang="en-US" dirty="0">
-                <a:hlinkClick r:id="rId3"/>
-              </a:rPr>
-              <a:t>https://docs.lando.dev/guides/frontend.html</a:t>
-            </a:r>
-            <a:br>
-              <a:rPr lang="en-US" dirty="0"/>
-            </a:br>
-            <a:r>
-              <a:rPr lang="en-US" dirty="0"/>
-              <a:t>Need grunt, gulp, </a:t>
-            </a:r>
-            <a:r>
-              <a:rPr lang="en-US" dirty="0" err="1"/>
-              <a:t>etc</a:t>
-            </a:r>
-            <a:r>
-              <a:rPr lang="en-US" dirty="0"/>
-              <a:t>? You can </a:t>
-            </a:r>
-            <a:r>
-              <a:rPr lang="en-US" dirty="0" err="1"/>
-              <a:t>haz</a:t>
-            </a:r>
-            <a:r>
-              <a:rPr lang="en-US" dirty="0"/>
-              <a:t>.</a:t>
-            </a:r>
-          </a:p>
-          <a:p>
-            <a:r>
-              <a:rPr lang="en-US" dirty="0">
-                <a:hlinkClick r:id="rId4"/>
-              </a:rPr>
-              <a:t>https://docs.lando.dev/guides/lando-101/lando-overview.html</a:t>
-            </a:r>
-            <a:br>
-              <a:rPr lang="en-US" dirty="0"/>
-            </a:br>
-            <a:r>
-              <a:rPr lang="en-US" dirty="0"/>
-              <a:t>More Lando learning.</a:t>
-            </a:r>
-          </a:p>
-          <a:p>
-            <a:r>
-              <a:rPr lang="en-US" dirty="0"/>
-              <a:t>Interesting topics</a:t>
-            </a:r>
-          </a:p>
-          <a:p>
-            <a:pPr lvl="1"/>
-            <a:r>
-              <a:rPr lang="en-US" dirty="0">
-                <a:hlinkClick r:id="rId5"/>
-              </a:rPr>
-              <a:t>Proxy</a:t>
-            </a:r>
-            <a:r>
-              <a:rPr lang="en-US" dirty="0"/>
-              <a:t> (pick a domain name, or work offline)</a:t>
-            </a:r>
-          </a:p>
-          <a:p>
-            <a:pPr lvl="1"/>
-            <a:r>
-              <a:rPr lang="en-US" dirty="0">
-                <a:hlinkClick r:id="rId6"/>
-              </a:rPr>
-              <a:t>Events</a:t>
-            </a:r>
-            <a:r>
-              <a:rPr lang="en-US" dirty="0"/>
-              <a:t> (more automation)</a:t>
-            </a:r>
-          </a:p>
-          <a:p>
-            <a:pPr lvl="1"/>
-            <a:r>
-              <a:rPr lang="en-US" dirty="0">
-                <a:hlinkClick r:id="rId7"/>
-              </a:rPr>
-              <a:t>Compose (custom) service</a:t>
-            </a:r>
-            <a:r>
-              <a:rPr lang="en-US" dirty="0"/>
-              <a:t> (make your own service)</a:t>
+              <a:t>Exercise 4: Live Coding!</a:t>
+            </a:r>
+          </a:p>
+        </p:txBody>
+      </p:sp>
+      <p:sp>
+        <p:nvSpPr>
+          <p:cNvPr id="3" name="Text Placeholder 2">
+            <a:extLst>
+              <a:ext uri="{FF2B5EF4-FFF2-40B4-BE49-F238E27FC236}">
+                <a16:creationId xmlns:a16="http://schemas.microsoft.com/office/drawing/2014/main" id="{E9274D72-C8F7-F44A-BF2E-8A71860CB5C8}"/>
+              </a:ext>
+            </a:extLst>
+          </p:cNvPr>
+          <p:cNvSpPr>
+            <a:spLocks noGrp="1"/>
+          </p:cNvSpPr>
+          <p:nvPr>
+            <p:ph type="body" idx="1"/>
+          </p:nvPr>
+        </p:nvSpPr>
+        <p:spPr/>
+        <p:txBody>
+          <a:bodyPr/>
+          <a:lstStyle/>
+          <a:p>
+            <a:r>
+              <a:rPr lang="en-US" dirty="0"/>
+              <a:t>Let’s build a dev environment together!</a:t>
             </a:r>
           </a:p>
         </p:txBody>
@@ -9064,7 +9340,7 @@
     </p:spTree>
     <p:extLst>
       <p:ext uri="{BB962C8B-B14F-4D97-AF65-F5344CB8AC3E}">
-        <p14:creationId xmlns:p14="http://schemas.microsoft.com/office/powerpoint/2010/main" val="2947634169"/>
+        <p14:creationId xmlns:p14="http://schemas.microsoft.com/office/powerpoint/2010/main" val="2344388654"/>
       </p:ext>
     </p:extLst>
   </p:cSld>
@@ -9137,7 +9413,7 @@
           </p:nvPr>
         </p:nvPicPr>
         <p:blipFill>
-          <a:blip r:embed="rId2">
+          <a:blip r:embed="rId3">
             <a:extLst>
               <a:ext uri="{28A0092B-C50C-407E-A947-70E740481C1C}">
                 <a14:useLocalDpi xmlns:a14="http://schemas.microsoft.com/office/drawing/2010/main" val="0"/>
@@ -9455,6 +9731,177 @@
           <p:cNvPr id="2" name="Title 1">
             <a:extLst>
               <a:ext uri="{FF2B5EF4-FFF2-40B4-BE49-F238E27FC236}">
+                <a16:creationId xmlns:a16="http://schemas.microsoft.com/office/drawing/2014/main" id="{B2097D4E-BCBE-B841-9D9D-4B7686B11008}"/>
+              </a:ext>
+            </a:extLst>
+          </p:cNvPr>
+          <p:cNvSpPr>
+            <a:spLocks noGrp="1"/>
+          </p:cNvSpPr>
+          <p:nvPr>
+            <p:ph type="title"/>
+          </p:nvPr>
+        </p:nvSpPr>
+        <p:spPr/>
+        <p:txBody>
+          <a:bodyPr/>
+          <a:lstStyle/>
+          <a:p>
+            <a:r>
+              <a:rPr lang="en-US" dirty="0"/>
+              <a:t>Extra Credit</a:t>
+            </a:r>
+          </a:p>
+        </p:txBody>
+      </p:sp>
+      <p:sp>
+        <p:nvSpPr>
+          <p:cNvPr id="3" name="Content Placeholder 2">
+            <a:extLst>
+              <a:ext uri="{FF2B5EF4-FFF2-40B4-BE49-F238E27FC236}">
+                <a16:creationId xmlns:a16="http://schemas.microsoft.com/office/drawing/2014/main" id="{B0E1A122-A783-F14B-8B2E-F1E8176A675C}"/>
+              </a:ext>
+            </a:extLst>
+          </p:cNvPr>
+          <p:cNvSpPr>
+            <a:spLocks noGrp="1"/>
+          </p:cNvSpPr>
+          <p:nvPr>
+            <p:ph idx="1"/>
+          </p:nvPr>
+        </p:nvSpPr>
+        <p:spPr/>
+        <p:txBody>
+          <a:bodyPr/>
+          <a:lstStyle/>
+          <a:p>
+            <a:r>
+              <a:rPr lang="en-US" dirty="0">
+                <a:hlinkClick r:id="rId3"/>
+              </a:rPr>
+              <a:t>https://docs.lando.dev/guides/frontend.html</a:t>
+            </a:r>
+            <a:br>
+              <a:rPr lang="en-US" dirty="0"/>
+            </a:br>
+            <a:r>
+              <a:rPr lang="en-US" dirty="0"/>
+              <a:t>Need grunt, gulp, </a:t>
+            </a:r>
+            <a:r>
+              <a:rPr lang="en-US" dirty="0" err="1"/>
+              <a:t>etc</a:t>
+            </a:r>
+            <a:r>
+              <a:rPr lang="en-US" dirty="0"/>
+              <a:t>? You can </a:t>
+            </a:r>
+            <a:r>
+              <a:rPr lang="en-US" dirty="0" err="1"/>
+              <a:t>haz</a:t>
+            </a:r>
+            <a:r>
+              <a:rPr lang="en-US" dirty="0"/>
+              <a:t>.</a:t>
+            </a:r>
+          </a:p>
+          <a:p>
+            <a:r>
+              <a:rPr lang="en-US" dirty="0">
+                <a:hlinkClick r:id="rId4"/>
+              </a:rPr>
+              <a:t>https://docs.lando.dev/guides/lando-101/lando-overview.html</a:t>
+            </a:r>
+            <a:br>
+              <a:rPr lang="en-US" dirty="0"/>
+            </a:br>
+            <a:r>
+              <a:rPr lang="en-US" dirty="0"/>
+              <a:t>More Lando learning.</a:t>
+            </a:r>
+          </a:p>
+          <a:p>
+            <a:r>
+              <a:rPr lang="en-US" dirty="0"/>
+              <a:t>Interesting topics</a:t>
+            </a:r>
+          </a:p>
+          <a:p>
+            <a:pPr lvl="1"/>
+            <a:r>
+              <a:rPr lang="en-US" dirty="0">
+                <a:hlinkClick r:id="rId5"/>
+              </a:rPr>
+              <a:t>Proxy</a:t>
+            </a:r>
+            <a:r>
+              <a:rPr lang="en-US" dirty="0"/>
+              <a:t> (pick a domain name, or work offline)</a:t>
+            </a:r>
+          </a:p>
+          <a:p>
+            <a:pPr lvl="1"/>
+            <a:r>
+              <a:rPr lang="en-US" dirty="0">
+                <a:hlinkClick r:id="rId6"/>
+              </a:rPr>
+              <a:t>Events</a:t>
+            </a:r>
+            <a:r>
+              <a:rPr lang="en-US" dirty="0"/>
+              <a:t> (more automation)</a:t>
+            </a:r>
+          </a:p>
+          <a:p>
+            <a:pPr lvl="1"/>
+            <a:r>
+              <a:rPr lang="en-US" dirty="0">
+                <a:hlinkClick r:id="rId7"/>
+              </a:rPr>
+              <a:t>Compose (custom) service</a:t>
+            </a:r>
+            <a:r>
+              <a:rPr lang="en-US" dirty="0"/>
+              <a:t> (make your own service)</a:t>
+            </a:r>
+          </a:p>
+        </p:txBody>
+      </p:sp>
+    </p:spTree>
+    <p:extLst>
+      <p:ext uri="{BB962C8B-B14F-4D97-AF65-F5344CB8AC3E}">
+        <p14:creationId xmlns:p14="http://schemas.microsoft.com/office/powerpoint/2010/main" val="2947634169"/>
+      </p:ext>
+    </p:extLst>
+  </p:cSld>
+  <p:clrMapOvr>
+    <a:masterClrMapping/>
+  </p:clrMapOvr>
+</p:sld>
+</file>
+
+<file path=ppt/slides/slide31.xml><?xml version="1.0" encoding="utf-8"?>
+<p:sld xmlns:a="http://schemas.openxmlformats.org/drawingml/2006/main" xmlns:r="http://schemas.openxmlformats.org/officeDocument/2006/relationships" xmlns:p="http://schemas.openxmlformats.org/presentationml/2006/main">
+  <p:cSld>
+    <p:spTree>
+      <p:nvGrpSpPr>
+        <p:cNvPr id="1" name=""/>
+        <p:cNvGrpSpPr/>
+        <p:nvPr/>
+      </p:nvGrpSpPr>
+      <p:grpSpPr>
+        <a:xfrm>
+          <a:off x="0" y="0"/>
+          <a:ext cx="0" cy="0"/>
+          <a:chOff x="0" y="0"/>
+          <a:chExt cx="0" cy="0"/>
+        </a:xfrm>
+      </p:grpSpPr>
+      <p:sp>
+        <p:nvSpPr>
+          <p:cNvPr id="2" name="Title 1">
+            <a:extLst>
+              <a:ext uri="{FF2B5EF4-FFF2-40B4-BE49-F238E27FC236}">
                 <a16:creationId xmlns:a16="http://schemas.microsoft.com/office/drawing/2014/main" id="{D6A23C41-493D-424B-8C82-01C1E6707DAD}"/>
               </a:ext>
             </a:extLst>
@@ -9516,7 +9963,7 @@
 </p:sld>
 </file>
 
-<file path=ppt/slides/slide31.xml><?xml version="1.0" encoding="utf-8"?>
+<file path=ppt/slides/slide32.xml><?xml version="1.0" encoding="utf-8"?>
 <p:sld xmlns:a="http://schemas.openxmlformats.org/drawingml/2006/main" xmlns:r="http://schemas.openxmlformats.org/officeDocument/2006/relationships" xmlns:p="http://schemas.openxmlformats.org/presentationml/2006/main">
   <p:cSld>
     <p:spTree>
@@ -9742,7 +10189,7 @@
           <a:p>
             <a:r>
               <a:rPr lang="en-US" dirty="0"/>
-              <a:t>Parts</a:t>
+              <a:t>Parts: today’s agenda</a:t>
             </a:r>
           </a:p>
         </p:txBody>

</xml_diff>

<commit_message>
Clean up credits slide
</commit_message>
<xml_diff>
--- a/LearningAsWeGo-DecomposingDevEnvironmentsWithLando.pptx
+++ b/LearningAsWeGo-DecomposingDevEnvironmentsWithLando.pptx
@@ -5619,6 +5619,95 @@
           </a:prstGeom>
         </p:spPr>
       </p:pic>
+      <p:pic>
+        <p:nvPicPr>
+          <p:cNvPr id="1026" name="Picture 2" descr="Creative Commons License">
+            <a:extLst>
+              <a:ext uri="{FF2B5EF4-FFF2-40B4-BE49-F238E27FC236}">
+                <a16:creationId xmlns:a16="http://schemas.microsoft.com/office/drawing/2014/main" id="{964C46FE-1827-A64B-BFA8-079C67245F32}"/>
+              </a:ext>
+            </a:extLst>
+          </p:cNvPr>
+          <p:cNvPicPr>
+            <a:picLocks noChangeAspect="1" noChangeArrowheads="1"/>
+          </p:cNvPicPr>
+          <p:nvPr/>
+        </p:nvPicPr>
+        <p:blipFill>
+          <a:blip r:embed="rId4">
+            <a:extLst>
+              <a:ext uri="{28A0092B-C50C-407E-A947-70E740481C1C}">
+                <a14:useLocalDpi xmlns:a14="http://schemas.microsoft.com/office/drawing/2010/main" val="0"/>
+              </a:ext>
+            </a:extLst>
+          </a:blip>
+          <a:srcRect/>
+          <a:stretch>
+            <a:fillRect/>
+          </a:stretch>
+        </p:blipFill>
+        <p:spPr bwMode="auto">
+          <a:xfrm>
+            <a:off x="406400" y="5207624"/>
+            <a:ext cx="1117600" cy="393700"/>
+          </a:xfrm>
+          <a:prstGeom prst="rect">
+            <a:avLst/>
+          </a:prstGeom>
+          <a:noFill/>
+          <a:extLst>
+            <a:ext uri="{909E8E84-426E-40DD-AFC4-6F175D3DCCD1}">
+              <a14:hiddenFill xmlns:a14="http://schemas.microsoft.com/office/drawing/2010/main">
+                <a:solidFill>
+                  <a:srgbClr val="FFFFFF"/>
+                </a:solidFill>
+              </a14:hiddenFill>
+            </a:ext>
+          </a:extLst>
+        </p:spPr>
+      </p:pic>
+      <p:sp>
+        <p:nvSpPr>
+          <p:cNvPr id="6" name="TextBox 5">
+            <a:extLst>
+              <a:ext uri="{FF2B5EF4-FFF2-40B4-BE49-F238E27FC236}">
+                <a16:creationId xmlns:a16="http://schemas.microsoft.com/office/drawing/2014/main" id="{7318FDE4-1DBA-C147-931C-50FA738C510B}"/>
+              </a:ext>
+            </a:extLst>
+          </p:cNvPr>
+          <p:cNvSpPr txBox="1"/>
+          <p:nvPr/>
+        </p:nvSpPr>
+        <p:spPr>
+          <a:xfrm>
+            <a:off x="1524000" y="5231992"/>
+            <a:ext cx="8345554" cy="369332"/>
+          </a:xfrm>
+          <a:prstGeom prst="rect">
+            <a:avLst/>
+          </a:prstGeom>
+          <a:noFill/>
+        </p:spPr>
+        <p:txBody>
+          <a:bodyPr wrap="none" rtlCol="0">
+            <a:spAutoFit/>
+          </a:bodyPr>
+          <a:lstStyle/>
+          <a:p>
+            <a:r>
+              <a:rPr lang="en-US" dirty="0"/>
+              <a:t>This work is licensed under a </a:t>
+            </a:r>
+            <a:r>
+              <a:rPr lang="en-US" u="sng" dirty="0">
+                <a:hlinkClick r:id="rId5"/>
+              </a:rPr>
+              <a:t>Creative Commons Attribution 4.0 International License</a:t>
+            </a:r>
+            <a:endParaRPr lang="en-US" dirty="0"/>
+          </a:p>
+        </p:txBody>
+      </p:sp>
     </p:spTree>
     <p:extLst>
       <p:ext uri="{BB962C8B-B14F-4D97-AF65-F5344CB8AC3E}">
@@ -10027,112 +10116,165 @@
         <p:spPr/>
         <p:txBody>
           <a:bodyPr>
-            <a:normAutofit/>
+            <a:normAutofit lnSpcReduction="10000"/>
           </a:bodyPr>
           <a:lstStyle/>
           <a:p>
             <a:r>
-              <a:rPr lang="en-US" dirty="0"/>
-              <a:t>“tangle” </a:t>
-            </a:r>
-            <a:r>
-              <a:rPr lang="en-US" sz="2000" dirty="0"/>
-              <a:t>by Trinity is licensed with CC BY-SA 2.0. </a:t>
-            </a:r>
-            <a:br>
-              <a:rPr lang="en-US" sz="2000" dirty="0"/>
-            </a:br>
-            <a:r>
-              <a:rPr lang="en-US" sz="2000" dirty="0"/>
-              <a:t>https://</a:t>
-            </a:r>
-            <a:r>
-              <a:rPr lang="en-US" sz="2000" dirty="0" err="1"/>
-              <a:t>search.creativecommons.org</a:t>
-            </a:r>
-            <a:r>
-              <a:rPr lang="en-US" sz="2000" dirty="0"/>
-              <a:t>/photos/c574d90e-753d-4be0-8658-ae1ff4109717</a:t>
-            </a:r>
-            <a:br>
-              <a:rPr lang="en-US" dirty="0"/>
-            </a:br>
-            <a:endParaRPr lang="en-US" dirty="0"/>
-          </a:p>
-          <a:p>
-            <a:r>
-              <a:rPr lang="en-US" dirty="0"/>
-              <a:t>“sagrada </a:t>
-            </a:r>
-            <a:r>
-              <a:rPr lang="en-US" dirty="0" err="1"/>
+              <a:rPr lang="en-US" i="1" dirty="0"/>
+              <a:t>tangle</a:t>
+            </a:r>
+            <a:r>
+              <a:rPr lang="en-US" dirty="0"/>
+              <a:t> </a:t>
+            </a:r>
+            <a:r>
+              <a:rPr lang="en-US" sz="1900" dirty="0"/>
+              <a:t>by Trinity </a:t>
+            </a:r>
+          </a:p>
+          <a:p>
+            <a:r>
+              <a:rPr lang="en-US" i="1" dirty="0"/>
+              <a:t>sagrada </a:t>
+            </a:r>
+            <a:r>
+              <a:rPr lang="en-US" i="1" dirty="0" err="1"/>
               <a:t>família</a:t>
             </a:r>
             <a:r>
-              <a:rPr lang="en-US" dirty="0"/>
-              <a:t>: more cranes” </a:t>
-            </a:r>
-            <a:r>
-              <a:rPr lang="en-US" sz="2000" dirty="0"/>
+              <a:rPr lang="en-US" i="1" dirty="0"/>
+              <a:t>: more cranes </a:t>
+            </a:r>
+            <a:r>
+              <a:rPr lang="en-US" sz="1900" dirty="0"/>
               <a:t>by </a:t>
             </a:r>
             <a:r>
-              <a:rPr lang="en-US" sz="2000" dirty="0" err="1"/>
+              <a:rPr lang="en-US" sz="1900" dirty="0" err="1"/>
               <a:t>cygnoir</a:t>
             </a:r>
             <a:r>
-              <a:rPr lang="en-US" sz="2000" dirty="0"/>
-              <a:t> is licensed with CC BY-NC-ND 2.0.</a:t>
-            </a:r>
-            <a:br>
-              <a:rPr lang="en-US" sz="2000" dirty="0"/>
-            </a:br>
-            <a:r>
-              <a:rPr lang="en-US" sz="2000" dirty="0"/>
-              <a:t>https://</a:t>
-            </a:r>
-            <a:r>
-              <a:rPr lang="en-US" sz="2000" dirty="0" err="1"/>
-              <a:t>search.creativecommons.org</a:t>
-            </a:r>
-            <a:r>
-              <a:rPr lang="en-US" sz="2000" dirty="0"/>
-              <a:t>/photos/c7d00256-b165-462c-837f-2c5f0cfb5ff9 </a:t>
-            </a:r>
-          </a:p>
-          <a:p>
-            <a:r>
-              <a:rPr lang="en-US" dirty="0"/>
-              <a:t>“Temple </a:t>
-            </a:r>
-            <a:r>
-              <a:rPr lang="en-US" dirty="0" err="1"/>
+              <a:rPr lang="en-US" sz="1900" dirty="0"/>
+              <a:t> </a:t>
+            </a:r>
+          </a:p>
+          <a:p>
+            <a:r>
+              <a:rPr lang="en-US" i="1" dirty="0"/>
+              <a:t>Temple </a:t>
+            </a:r>
+            <a:r>
+              <a:rPr lang="en-US" i="1" dirty="0" err="1"/>
               <a:t>Expiatori</a:t>
             </a:r>
             <a:r>
-              <a:rPr lang="en-US" dirty="0"/>
+              <a:rPr lang="en-US" i="1" dirty="0"/>
               <a:t> de la Sagrada </a:t>
             </a:r>
             <a:r>
-              <a:rPr lang="en-US" dirty="0" err="1"/>
+              <a:rPr lang="en-US" i="1" dirty="0" err="1"/>
               <a:t>Família</a:t>
             </a:r>
             <a:r>
-              <a:rPr lang="en-US" dirty="0"/>
-              <a:t>” </a:t>
-            </a:r>
-            <a:r>
-              <a:rPr lang="en-US" sz="2000" dirty="0"/>
+              <a:rPr lang="en-US" i="1" dirty="0"/>
+              <a:t> </a:t>
+            </a:r>
+            <a:r>
+              <a:rPr lang="en-US" sz="1900" dirty="0"/>
               <a:t>by </a:t>
             </a:r>
             <a:r>
-              <a:rPr lang="en-US" sz="2000" dirty="0" err="1"/>
+              <a:rPr lang="en-US" sz="1900" dirty="0" err="1"/>
               <a:t>PHOTOGRAPHRdotNET</a:t>
             </a:r>
             <a:r>
-              <a:rPr lang="en-US" sz="2000" dirty="0"/>
-              <a:t> is licensed with CC BY-ND 2.0.</a:t>
-            </a:r>
+              <a:rPr lang="en-US" sz="1900" dirty="0"/>
+              <a:t> </a:t>
+            </a:r>
+          </a:p>
+          <a:p>
+            <a:r>
+              <a:rPr lang="en-US" i="1" dirty="0"/>
+              <a:t>Computer</a:t>
+            </a:r>
+            <a:r>
+              <a:rPr lang="en-US" dirty="0"/>
+              <a:t> </a:t>
+            </a:r>
+            <a:r>
+              <a:rPr lang="en-US" sz="1900" dirty="0"/>
+              <a:t>created by Med </a:t>
+            </a:r>
+            <a:r>
+              <a:rPr lang="en-US" sz="1900" dirty="0" err="1"/>
+              <a:t>Marki</a:t>
+            </a:r>
+            <a:r>
+              <a:rPr lang="en-US" sz="1900" dirty="0"/>
+              <a:t> from the Noun Project</a:t>
+            </a:r>
+          </a:p>
+          <a:p>
+            <a:r>
+              <a:rPr lang="en-US" i="1" dirty="0"/>
+              <a:t>Container</a:t>
+            </a:r>
+            <a:r>
+              <a:rPr lang="en-US" dirty="0"/>
+              <a:t> </a:t>
+            </a:r>
+            <a:r>
+              <a:rPr lang="en-US" sz="1900" dirty="0"/>
+              <a:t>created by </a:t>
+            </a:r>
+            <a:r>
+              <a:rPr lang="en-US" sz="1900" dirty="0" err="1"/>
+              <a:t>ProSymbols</a:t>
+            </a:r>
+            <a:r>
+              <a:rPr lang="en-US" sz="1900" dirty="0"/>
+              <a:t> from the Noun Project</a:t>
+            </a:r>
+          </a:p>
+          <a:p>
+            <a:r>
+              <a:rPr lang="en-US" i="1" dirty="0"/>
+              <a:t>Folder</a:t>
+            </a:r>
+            <a:r>
+              <a:rPr lang="en-US" dirty="0"/>
+              <a:t> </a:t>
+            </a:r>
+            <a:r>
+              <a:rPr lang="en-US" sz="1900" dirty="0"/>
+              <a:t>created by Landon Lloyd from the Noun Project</a:t>
+            </a:r>
+          </a:p>
+          <a:p>
+            <a:r>
+              <a:rPr lang="en-US" i="1" dirty="0"/>
+              <a:t>File</a:t>
+            </a:r>
+            <a:r>
+              <a:rPr lang="en-US" dirty="0"/>
+              <a:t> </a:t>
+            </a:r>
+            <a:r>
+              <a:rPr lang="en-US" sz="1900" dirty="0"/>
+              <a:t>created by </a:t>
+            </a:r>
+            <a:r>
+              <a:rPr lang="en-US" sz="1900" dirty="0" err="1"/>
+              <a:t>Ranah</a:t>
+            </a:r>
+            <a:r>
+              <a:rPr lang="en-US" sz="1900" dirty="0"/>
+              <a:t> Pixel Studio from the Noun Project</a:t>
+            </a:r>
+          </a:p>
+          <a:p>
+            <a:endParaRPr lang="en-US" sz="2000" dirty="0"/>
           </a:p>
         </p:txBody>
       </p:sp>

</xml_diff>

<commit_message>
Updating slides with more speakers notes. Adding PDF version of slides.
</commit_message>
<xml_diff>
--- a/LearningAsWeGo-DecomposingDevEnvironmentsWithLando.pptx
+++ b/LearningAsWeGo-DecomposingDevEnvironmentsWithLando.pptx
@@ -284,7 +284,7 @@
           <a:p>
             <a:fld id="{1D896817-C553-DC40-BD68-E09EA78F3436}" type="datetimeFigureOut">
               <a:rPr lang="en-US" smtClean="0"/>
-              <a:t>3/8/21</a:t>
+              <a:t>3/9/21</a:t>
             </a:fld>
             <a:endParaRPr lang="en-US"/>
           </a:p>
@@ -684,39 +684,15 @@
           <a:p>
             <a:r>
               <a:rPr lang="en-US" dirty="0"/>
-              <a:t>This is a sketch of a .</a:t>
+              <a:t>I should admit right now that I’ve borrowed, these intro slides from the Lando folks, they have a Google drive full of slide decks. Like a lot of opensource projects, they have a ton of resources and docs. The best place to start reading about Lando is </a:t>
             </a:r>
             <a:r>
               <a:rPr lang="en-US" dirty="0" err="1"/>
-              <a:t>lando.yml</a:t>
-            </a:r>
-            <a:r>
-              <a:rPr lang="en-US" dirty="0"/>
-              <a:t> file, it’s not complete, but gives you an idea of what one looks like. It’s </a:t>
-            </a:r>
-            <a:r>
-              <a:rPr lang="en-US" dirty="0" err="1"/>
-              <a:t>yaml</a:t>
-            </a:r>
-            <a:r>
-              <a:rPr lang="en-US" dirty="0"/>
-              <a:t>, so, you know, </a:t>
-            </a:r>
-            <a:r>
-              <a:rPr lang="en-US" dirty="0" err="1"/>
-              <a:t>gotta</a:t>
-            </a:r>
-            <a:r>
-              <a:rPr lang="en-US" dirty="0"/>
-              <a:t> start with three dashes. We’ll dig into the details through the rest of this workshop, but some things I want you to remember: you can specify environment variables in env files, you can provide as many as you need. SSH key management is mostly automatic with Lando (it copies your SSH keys for you), but you can control which key gets used by specifying it in the </a:t>
-            </a:r>
-            <a:r>
-              <a:rPr lang="en-US" dirty="0" err="1"/>
-              <a:t>Landofile</a:t>
-            </a:r>
-            <a:r>
-              <a:rPr lang="en-US" dirty="0"/>
-              <a:t>. Then you have SERVICES and TOOLING. Services are the pieces you need to develop your application. Tooling defines how you’ll interact with those services on the command line. Tooling is probably the most fun aspect of working with Lando, as the feedback loop is instantaneous. As soon as you add a new tooling config, you can use it, no reboot, no rebuild. Just dream it, write it, use it. Oh, if you’ve used Lando before or you’ve been keeping notes, you’ll probably be wondering if I’ve missed something here, and you’d be right, I’m intentionally skipping RECIPES for now. Mostly because as a library developer, none of the recipes will be a good fit. And recipes are too much magic. I’ve skipped other things as well, we’ll talk about them later, if we have time.</a:t>
+              <a:t>docs.lando.dev</a:t>
+            </a:r>
+            <a:r>
+              <a:rPr lang="en-US" dirty="0"/>
+              <a:t>. “Stacks on Stacks on Racks” is their explanation of Lando. It starts with your operating system, which includes tech for containers, and then Docker running on that, and Docker Compose on top of Docker, and then Lando.</a:t>
             </a:r>
           </a:p>
         </p:txBody>
@@ -738,7 +714,7 @@
           <a:p>
             <a:fld id="{07F65287-0258-BC43-8221-F86E5F96768A}" type="slidenum">
               <a:rPr lang="en-US" smtClean="0"/>
-              <a:t>17</a:t>
+              <a:t>11</a:t>
             </a:fld>
             <a:endParaRPr lang="en-US"/>
           </a:p>
@@ -747,7 +723,7 @@
     </p:spTree>
     <p:extLst>
       <p:ext uri="{BB962C8B-B14F-4D97-AF65-F5344CB8AC3E}">
-        <p14:creationId xmlns:p14="http://schemas.microsoft.com/office/powerpoint/2010/main" val="2212794323"/>
+        <p14:creationId xmlns:p14="http://schemas.microsoft.com/office/powerpoint/2010/main" val="326291708"/>
       </p:ext>
     </p:extLst>
   </p:cSld>
@@ -803,15 +779,7 @@
           <a:p>
             <a:r>
               <a:rPr lang="en-US" dirty="0"/>
-              <a:t>Here’s a quick look at a </a:t>
-            </a:r>
-            <a:r>
-              <a:rPr lang="en-US" dirty="0" err="1"/>
-              <a:t>Landofile</a:t>
-            </a:r>
-            <a:r>
-              <a:rPr lang="en-US" dirty="0"/>
-              <a:t> that uses a recipe: this uses the Lamp recipe, so you specify what version of PHP you want to use, and what DB you want to use, and everything is auto-configured by convention. If a Lamp stack is what your app needs, this will get you going.</a:t>
+              <a:t>At its core, Lando prepackages docker images for various services and technologies. Here are a few.</a:t>
             </a:r>
           </a:p>
         </p:txBody>
@@ -833,7 +801,7 @@
           <a:p>
             <a:fld id="{07F65287-0258-BC43-8221-F86E5F96768A}" type="slidenum">
               <a:rPr lang="en-US" smtClean="0"/>
-              <a:t>18</a:t>
+              <a:t>12</a:t>
             </a:fld>
             <a:endParaRPr lang="en-US"/>
           </a:p>
@@ -842,7 +810,7 @@
     </p:spTree>
     <p:extLst>
       <p:ext uri="{BB962C8B-B14F-4D97-AF65-F5344CB8AC3E}">
-        <p14:creationId xmlns:p14="http://schemas.microsoft.com/office/powerpoint/2010/main" val="3778597517"/>
+        <p14:creationId xmlns:p14="http://schemas.microsoft.com/office/powerpoint/2010/main" val="1360150314"/>
       </p:ext>
     </p:extLst>
   </p:cSld>
@@ -896,7 +864,10 @@
           <a:bodyPr/>
           <a:lstStyle/>
           <a:p>
-            <a:endParaRPr lang="en-US" dirty="0"/>
+            <a:r>
+              <a:rPr lang="en-US" dirty="0"/>
+              <a:t>And here are a few more. Each of these services is configurable, and you can swap in different ones (like use MySQL as a database, and then you can experiment using PostgreSQL instead)</a:t>
+            </a:r>
           </a:p>
         </p:txBody>
       </p:sp>
@@ -917,7 +888,7 @@
           <a:p>
             <a:fld id="{07F65287-0258-BC43-8221-F86E5F96768A}" type="slidenum">
               <a:rPr lang="en-US" smtClean="0"/>
-              <a:t>19</a:t>
+              <a:t>13</a:t>
             </a:fld>
             <a:endParaRPr lang="en-US"/>
           </a:p>
@@ -926,7 +897,7 @@
     </p:spTree>
     <p:extLst>
       <p:ext uri="{BB962C8B-B14F-4D97-AF65-F5344CB8AC3E}">
-        <p14:creationId xmlns:p14="http://schemas.microsoft.com/office/powerpoint/2010/main" val="1022956409"/>
+        <p14:creationId xmlns:p14="http://schemas.microsoft.com/office/powerpoint/2010/main" val="2374417366"/>
       </p:ext>
     </p:extLst>
   </p:cSld>
@@ -982,7 +953,7 @@
           <a:p>
             <a:r>
               <a:rPr lang="en-US" dirty="0"/>
-              <a:t>A database is often the heart of our applications, and this is a great way to get a feel for how Lando works. You also end up with something you can use: a copy of your production data, running locally on your notebook. Where you can run whatever unsafe query or update your heart might desire.</a:t>
+              <a:t>The Lando docs site makes a big deal about recipes, they’re flashy and can get you going quickly, but really, most of us are going to be working on stuff that is a bit more complicated than a Drupal site. (No offense, Drupal folks). We *will* use the LAMP recipe for Omeka, and if you have a PHP app like Omeka or OJS, a Lando recipe a very fast way to get to work.</a:t>
             </a:r>
           </a:p>
         </p:txBody>
@@ -1004,7 +975,7 @@
           <a:p>
             <a:fld id="{07F65287-0258-BC43-8221-F86E5F96768A}" type="slidenum">
               <a:rPr lang="en-US" smtClean="0"/>
-              <a:t>23</a:t>
+              <a:t>14</a:t>
             </a:fld>
             <a:endParaRPr lang="en-US"/>
           </a:p>
@@ -1013,7 +984,7 @@
     </p:spTree>
     <p:extLst>
       <p:ext uri="{BB962C8B-B14F-4D97-AF65-F5344CB8AC3E}">
-        <p14:creationId xmlns:p14="http://schemas.microsoft.com/office/powerpoint/2010/main" val="1904307631"/>
+        <p14:creationId xmlns:p14="http://schemas.microsoft.com/office/powerpoint/2010/main" val="1141383494"/>
       </p:ext>
     </p:extLst>
   </p:cSld>
@@ -1067,7 +1038,18 @@
           <a:bodyPr/>
           <a:lstStyle/>
           <a:p>
-            <a:endParaRPr lang="en-US" dirty="0"/>
+            <a:r>
+              <a:rPr lang="en-US" dirty="0"/>
+              <a:t>Installing is easy, just download the thing, click on the thing, agree to terms. If you already have Docker and Docker-Compose installed, you don’t need to reinstall </a:t>
+            </a:r>
+            <a:r>
+              <a:rPr lang="en-US" dirty="0" err="1"/>
+              <a:t>Lando’s</a:t>
+            </a:r>
+            <a:r>
+              <a:rPr lang="en-US" dirty="0"/>
+              <a:t> versions, but do verify that the versions you are running are at least the same as what Lando wants to install. If not, you may want to upgrade your docker setup.</a:t>
+            </a:r>
           </a:p>
         </p:txBody>
       </p:sp>
@@ -1088,7 +1070,7 @@
           <a:p>
             <a:fld id="{07F65287-0258-BC43-8221-F86E5F96768A}" type="slidenum">
               <a:rPr lang="en-US" smtClean="0"/>
-              <a:t>28</a:t>
+              <a:t>15</a:t>
             </a:fld>
             <a:endParaRPr lang="en-US"/>
           </a:p>
@@ -1097,7 +1079,7 @@
     </p:spTree>
     <p:extLst>
       <p:ext uri="{BB962C8B-B14F-4D97-AF65-F5344CB8AC3E}">
-        <p14:creationId xmlns:p14="http://schemas.microsoft.com/office/powerpoint/2010/main" val="925748264"/>
+        <p14:creationId xmlns:p14="http://schemas.microsoft.com/office/powerpoint/2010/main" val="1223936442"/>
       </p:ext>
     </p:extLst>
   </p:cSld>
@@ -1151,7 +1133,18 @@
           <a:bodyPr/>
           <a:lstStyle/>
           <a:p>
-            <a:endParaRPr lang="en-US" dirty="0"/>
+            <a:r>
+              <a:rPr lang="en-US" dirty="0"/>
+              <a:t>The </a:t>
+            </a:r>
+            <a:r>
+              <a:rPr lang="en-US" dirty="0" err="1"/>
+              <a:t>Landofile</a:t>
+            </a:r>
+            <a:r>
+              <a:rPr lang="en-US" dirty="0"/>
+              <a:t> is the heart of what tells Lando what to do. It goes into your project root, next to all of your source code.</a:t>
+            </a:r>
           </a:p>
         </p:txBody>
       </p:sp>
@@ -1172,7 +1165,7 @@
           <a:p>
             <a:fld id="{07F65287-0258-BC43-8221-F86E5F96768A}" type="slidenum">
               <a:rPr lang="en-US" smtClean="0"/>
-              <a:t>29</a:t>
+              <a:t>16</a:t>
             </a:fld>
             <a:endParaRPr lang="en-US"/>
           </a:p>
@@ -1181,7 +1174,7 @@
     </p:spTree>
     <p:extLst>
       <p:ext uri="{BB962C8B-B14F-4D97-AF65-F5344CB8AC3E}">
-        <p14:creationId xmlns:p14="http://schemas.microsoft.com/office/powerpoint/2010/main" val="3304442387"/>
+        <p14:creationId xmlns:p14="http://schemas.microsoft.com/office/powerpoint/2010/main" val="3625839814"/>
       </p:ext>
     </p:extLst>
   </p:cSld>
@@ -1235,7 +1228,42 @@
           <a:bodyPr/>
           <a:lstStyle/>
           <a:p>
-            <a:endParaRPr lang="en-US" dirty="0"/>
+            <a:r>
+              <a:rPr lang="en-US" dirty="0"/>
+              <a:t>This is a sketch of a </a:t>
+            </a:r>
+            <a:r>
+              <a:rPr lang="en-US" dirty="0" err="1"/>
+              <a:t>Landofile</a:t>
+            </a:r>
+            <a:r>
+              <a:rPr lang="en-US" dirty="0"/>
+              <a:t>. It’s not complete, but gives you an idea of what one looks like. It’s </a:t>
+            </a:r>
+            <a:r>
+              <a:rPr lang="en-US" dirty="0" err="1"/>
+              <a:t>yaml</a:t>
+            </a:r>
+            <a:r>
+              <a:rPr lang="en-US" dirty="0"/>
+              <a:t>, so, you know, </a:t>
+            </a:r>
+            <a:r>
+              <a:rPr lang="en-US" dirty="0" err="1"/>
+              <a:t>gotta</a:t>
+            </a:r>
+            <a:r>
+              <a:rPr lang="en-US" dirty="0"/>
+              <a:t> start with three dashes. We’ll dig into the details through the rest of this workshop, but some things I want you to remember: you can specify environment variables in env files, you can provide as many as you need. SSH key management is mostly automatic with Lando (it copies your SSH keys for you), but you can control which key gets used by specifying it in the </a:t>
+            </a:r>
+            <a:r>
+              <a:rPr lang="en-US" dirty="0" err="1"/>
+              <a:t>Landofile</a:t>
+            </a:r>
+            <a:r>
+              <a:rPr lang="en-US" dirty="0"/>
+              <a:t>. Then you have SERVICES and TOOLING. Services are the pieces you need to develop your application. Tooling defines how you’ll interact with those services on the command line. Tooling is probably the most fun aspect of working with Lando, as the feedback loop is instantaneous. As soon as you add a new tooling config, you can use it, no reboot, no rebuild. Just dream it, write it, use it. I am skipping a few things with this sketch, such as recipe configuration. You don’t NEED to use a recipe with Lando, but I’ll show you one now.</a:t>
+            </a:r>
           </a:p>
         </p:txBody>
       </p:sp>
@@ -1256,7 +1284,7 @@
           <a:p>
             <a:fld id="{07F65287-0258-BC43-8221-F86E5F96768A}" type="slidenum">
               <a:rPr lang="en-US" smtClean="0"/>
-              <a:t>30</a:t>
+              <a:t>17</a:t>
             </a:fld>
             <a:endParaRPr lang="en-US"/>
           </a:p>
@@ -1265,7 +1293,7 @@
     </p:spTree>
     <p:extLst>
       <p:ext uri="{BB962C8B-B14F-4D97-AF65-F5344CB8AC3E}">
-        <p14:creationId xmlns:p14="http://schemas.microsoft.com/office/powerpoint/2010/main" val="1309255926"/>
+        <p14:creationId xmlns:p14="http://schemas.microsoft.com/office/powerpoint/2010/main" val="2212794323"/>
       </p:ext>
     </p:extLst>
   </p:cSld>
@@ -1319,7 +1347,18 @@
           <a:bodyPr/>
           <a:lstStyle/>
           <a:p>
-            <a:endParaRPr lang="en-US" dirty="0"/>
+            <a:r>
+              <a:rPr lang="en-US" dirty="0"/>
+              <a:t>Here’s a quick look at a </a:t>
+            </a:r>
+            <a:r>
+              <a:rPr lang="en-US" dirty="0" err="1"/>
+              <a:t>Landofile</a:t>
+            </a:r>
+            <a:r>
+              <a:rPr lang="en-US" dirty="0"/>
+              <a:t> that uses a recipe: this uses the Lamp recipe, so you specify what version of PHP you want to use, and what DB you want to use, and everything is auto-configured by convention. If a Lamp stack is what your app needs, this will get you going.</a:t>
+            </a:r>
           </a:p>
         </p:txBody>
       </p:sp>
@@ -1340,7 +1379,7 @@
           <a:p>
             <a:fld id="{07F65287-0258-BC43-8221-F86E5F96768A}" type="slidenum">
               <a:rPr lang="en-US" smtClean="0"/>
-              <a:t>31</a:t>
+              <a:t>18</a:t>
             </a:fld>
             <a:endParaRPr lang="en-US"/>
           </a:p>
@@ -1349,7 +1388,7 @@
     </p:spTree>
     <p:extLst>
       <p:ext uri="{BB962C8B-B14F-4D97-AF65-F5344CB8AC3E}">
-        <p14:creationId xmlns:p14="http://schemas.microsoft.com/office/powerpoint/2010/main" val="380505923"/>
+        <p14:creationId xmlns:p14="http://schemas.microsoft.com/office/powerpoint/2010/main" val="3778597517"/>
       </p:ext>
     </p:extLst>
   </p:cSld>
@@ -1403,7 +1442,50 @@
           <a:bodyPr/>
           <a:lstStyle/>
           <a:p>
-            <a:endParaRPr lang="en-US" dirty="0"/>
+            <a:r>
+              <a:rPr lang="en-US" dirty="0"/>
+              <a:t>After you start up Lando with your </a:t>
+            </a:r>
+            <a:r>
+              <a:rPr lang="en-US" dirty="0" err="1"/>
+              <a:t>Landofile</a:t>
+            </a:r>
+            <a:r>
+              <a:rPr lang="en-US" dirty="0"/>
+              <a:t> in place, what happens? I made you a Lando cheat sheet, you should check that URL and print it out, keep it handy. Thanks to the magic of Docker mounts, your </a:t>
+            </a:r>
+            <a:r>
+              <a:rPr lang="en-US" dirty="0" err="1"/>
+              <a:t>project_root</a:t>
+            </a:r>
+            <a:r>
+              <a:rPr lang="en-US" dirty="0"/>
+              <a:t> folder is mounted as /app in every service container you define in your </a:t>
+            </a:r>
+            <a:r>
+              <a:rPr lang="en-US" dirty="0" err="1"/>
+              <a:t>Landofile</a:t>
+            </a:r>
+            <a:r>
+              <a:rPr lang="en-US" dirty="0"/>
+              <a:t>. It’s in the DB, in Solr, in your </a:t>
+            </a:r>
+            <a:r>
+              <a:rPr lang="en-US" dirty="0" err="1"/>
+              <a:t>Appserver</a:t>
+            </a:r>
+            <a:r>
+              <a:rPr lang="en-US" dirty="0"/>
+              <a:t>. This is for convenience. And it *is* convenient, knowing where your application code is. So, I want you to have this mental model ready for later. Your </a:t>
+            </a:r>
+            <a:r>
+              <a:rPr lang="en-US" dirty="0" err="1"/>
+              <a:t>project_root</a:t>
+            </a:r>
+            <a:r>
+              <a:rPr lang="en-US" dirty="0"/>
+              <a:t> is at /app.</a:t>
+            </a:r>
           </a:p>
         </p:txBody>
       </p:sp>
@@ -1424,7 +1506,7 @@
           <a:p>
             <a:fld id="{07F65287-0258-BC43-8221-F86E5F96768A}" type="slidenum">
               <a:rPr lang="en-US" smtClean="0"/>
-              <a:t>32</a:t>
+              <a:t>19</a:t>
             </a:fld>
             <a:endParaRPr lang="en-US"/>
           </a:p>
@@ -1433,7 +1515,94 @@
     </p:spTree>
     <p:extLst>
       <p:ext uri="{BB962C8B-B14F-4D97-AF65-F5344CB8AC3E}">
-        <p14:creationId xmlns:p14="http://schemas.microsoft.com/office/powerpoint/2010/main" val="3340434738"/>
+        <p14:creationId xmlns:p14="http://schemas.microsoft.com/office/powerpoint/2010/main" val="1022956409"/>
+      </p:ext>
+    </p:extLst>
+  </p:cSld>
+  <p:clrMapOvr>
+    <a:masterClrMapping/>
+  </p:clrMapOvr>
+</p:notes>
+</file>
+
+<file path=ppt/notesSlides/notesSlide19.xml><?xml version="1.0" encoding="utf-8"?>
+<p:notes xmlns:a="http://schemas.openxmlformats.org/drawingml/2006/main" xmlns:r="http://schemas.openxmlformats.org/officeDocument/2006/relationships" xmlns:p="http://schemas.openxmlformats.org/presentationml/2006/main">
+  <p:cSld>
+    <p:spTree>
+      <p:nvGrpSpPr>
+        <p:cNvPr id="1" name=""/>
+        <p:cNvGrpSpPr/>
+        <p:nvPr/>
+      </p:nvGrpSpPr>
+      <p:grpSpPr>
+        <a:xfrm>
+          <a:off x="0" y="0"/>
+          <a:ext cx="0" cy="0"/>
+          <a:chOff x="0" y="0"/>
+          <a:chExt cx="0" cy="0"/>
+        </a:xfrm>
+      </p:grpSpPr>
+      <p:sp>
+        <p:nvSpPr>
+          <p:cNvPr id="2" name="Slide Image Placeholder 1"/>
+          <p:cNvSpPr>
+            <a:spLocks noGrp="1" noRot="1" noChangeAspect="1"/>
+          </p:cNvSpPr>
+          <p:nvPr>
+            <p:ph type="sldImg"/>
+          </p:nvPr>
+        </p:nvSpPr>
+        <p:spPr/>
+      </p:sp>
+      <p:sp>
+        <p:nvSpPr>
+          <p:cNvPr id="3" name="Notes Placeholder 2"/>
+          <p:cNvSpPr>
+            <a:spLocks noGrp="1"/>
+          </p:cNvSpPr>
+          <p:nvPr>
+            <p:ph type="body" idx="1"/>
+          </p:nvPr>
+        </p:nvSpPr>
+        <p:spPr/>
+        <p:txBody>
+          <a:bodyPr/>
+          <a:lstStyle/>
+          <a:p>
+            <a:r>
+              <a:rPr lang="en-US" dirty="0"/>
+              <a:t>OK, before I do a demo of Lando, any questions? Do we need a quick break?</a:t>
+            </a:r>
+          </a:p>
+        </p:txBody>
+      </p:sp>
+      <p:sp>
+        <p:nvSpPr>
+          <p:cNvPr id="4" name="Slide Number Placeholder 3"/>
+          <p:cNvSpPr>
+            <a:spLocks noGrp="1"/>
+          </p:cNvSpPr>
+          <p:nvPr>
+            <p:ph type="sldNum" sz="quarter" idx="5"/>
+          </p:nvPr>
+        </p:nvSpPr>
+        <p:spPr/>
+        <p:txBody>
+          <a:bodyPr/>
+          <a:lstStyle/>
+          <a:p>
+            <a:fld id="{07F65287-0258-BC43-8221-F86E5F96768A}" type="slidenum">
+              <a:rPr lang="en-US" smtClean="0"/>
+              <a:t>20</a:t>
+            </a:fld>
+            <a:endParaRPr lang="en-US"/>
+          </a:p>
+        </p:txBody>
+      </p:sp>
+    </p:spTree>
+    <p:extLst>
+      <p:ext uri="{BB962C8B-B14F-4D97-AF65-F5344CB8AC3E}">
+        <p14:creationId xmlns:p14="http://schemas.microsoft.com/office/powerpoint/2010/main" val="1324921279"/>
       </p:ext>
     </p:extLst>
   </p:cSld>
@@ -1530,6 +1699,884 @@
 </p:notes>
 </file>
 
+<file path=ppt/notesSlides/notesSlide20.xml><?xml version="1.0" encoding="utf-8"?>
+<p:notes xmlns:a="http://schemas.openxmlformats.org/drawingml/2006/main" xmlns:r="http://schemas.openxmlformats.org/officeDocument/2006/relationships" xmlns:p="http://schemas.openxmlformats.org/presentationml/2006/main">
+  <p:cSld>
+    <p:spTree>
+      <p:nvGrpSpPr>
+        <p:cNvPr id="1" name=""/>
+        <p:cNvGrpSpPr/>
+        <p:nvPr/>
+      </p:nvGrpSpPr>
+      <p:grpSpPr>
+        <a:xfrm>
+          <a:off x="0" y="0"/>
+          <a:ext cx="0" cy="0"/>
+          <a:chOff x="0" y="0"/>
+          <a:chExt cx="0" cy="0"/>
+        </a:xfrm>
+      </p:grpSpPr>
+      <p:sp>
+        <p:nvSpPr>
+          <p:cNvPr id="2" name="Slide Image Placeholder 1"/>
+          <p:cNvSpPr>
+            <a:spLocks noGrp="1" noRot="1" noChangeAspect="1"/>
+          </p:cNvSpPr>
+          <p:nvPr>
+            <p:ph type="sldImg"/>
+          </p:nvPr>
+        </p:nvSpPr>
+        <p:spPr/>
+      </p:sp>
+      <p:sp>
+        <p:nvSpPr>
+          <p:cNvPr id="3" name="Notes Placeholder 2"/>
+          <p:cNvSpPr>
+            <a:spLocks noGrp="1"/>
+          </p:cNvSpPr>
+          <p:nvPr>
+            <p:ph type="body" idx="1"/>
+          </p:nvPr>
+        </p:nvSpPr>
+        <p:spPr/>
+        <p:txBody>
+          <a:bodyPr/>
+          <a:lstStyle/>
+          <a:p>
+            <a:r>
+              <a:rPr lang="en-US" dirty="0"/>
+              <a:t>Here’s a quick demo of Lando, to give you an idea of what working with it is like.</a:t>
+            </a:r>
+          </a:p>
+        </p:txBody>
+      </p:sp>
+      <p:sp>
+        <p:nvSpPr>
+          <p:cNvPr id="4" name="Slide Number Placeholder 3"/>
+          <p:cNvSpPr>
+            <a:spLocks noGrp="1"/>
+          </p:cNvSpPr>
+          <p:nvPr>
+            <p:ph type="sldNum" sz="quarter" idx="5"/>
+          </p:nvPr>
+        </p:nvSpPr>
+        <p:spPr/>
+        <p:txBody>
+          <a:bodyPr/>
+          <a:lstStyle/>
+          <a:p>
+            <a:fld id="{07F65287-0258-BC43-8221-F86E5F96768A}" type="slidenum">
+              <a:rPr lang="en-US" smtClean="0"/>
+              <a:t>21</a:t>
+            </a:fld>
+            <a:endParaRPr lang="en-US"/>
+          </a:p>
+        </p:txBody>
+      </p:sp>
+    </p:spTree>
+    <p:extLst>
+      <p:ext uri="{BB962C8B-B14F-4D97-AF65-F5344CB8AC3E}">
+        <p14:creationId xmlns:p14="http://schemas.microsoft.com/office/powerpoint/2010/main" val="453976422"/>
+      </p:ext>
+    </p:extLst>
+  </p:cSld>
+  <p:clrMapOvr>
+    <a:masterClrMapping/>
+  </p:clrMapOvr>
+</p:notes>
+</file>
+
+<file path=ppt/notesSlides/notesSlide21.xml><?xml version="1.0" encoding="utf-8"?>
+<p:notes xmlns:a="http://schemas.openxmlformats.org/drawingml/2006/main" xmlns:r="http://schemas.openxmlformats.org/officeDocument/2006/relationships" xmlns:p="http://schemas.openxmlformats.org/presentationml/2006/main">
+  <p:cSld>
+    <p:spTree>
+      <p:nvGrpSpPr>
+        <p:cNvPr id="1" name=""/>
+        <p:cNvGrpSpPr/>
+        <p:nvPr/>
+      </p:nvGrpSpPr>
+      <p:grpSpPr>
+        <a:xfrm>
+          <a:off x="0" y="0"/>
+          <a:ext cx="0" cy="0"/>
+          <a:chOff x="0" y="0"/>
+          <a:chExt cx="0" cy="0"/>
+        </a:xfrm>
+      </p:grpSpPr>
+      <p:sp>
+        <p:nvSpPr>
+          <p:cNvPr id="2" name="Slide Image Placeholder 1"/>
+          <p:cNvSpPr>
+            <a:spLocks noGrp="1" noRot="1" noChangeAspect="1"/>
+          </p:cNvSpPr>
+          <p:nvPr>
+            <p:ph type="sldImg"/>
+          </p:nvPr>
+        </p:nvSpPr>
+        <p:spPr/>
+      </p:sp>
+      <p:sp>
+        <p:nvSpPr>
+          <p:cNvPr id="3" name="Notes Placeholder 2"/>
+          <p:cNvSpPr>
+            <a:spLocks noGrp="1"/>
+          </p:cNvSpPr>
+          <p:nvPr>
+            <p:ph type="body" idx="1"/>
+          </p:nvPr>
+        </p:nvSpPr>
+        <p:spPr/>
+        <p:txBody>
+          <a:bodyPr/>
+          <a:lstStyle/>
+          <a:p>
+            <a:r>
+              <a:rPr lang="en-US" dirty="0"/>
+              <a:t>Any questions? Do we need a break before we start working on stuff together?</a:t>
+            </a:r>
+          </a:p>
+        </p:txBody>
+      </p:sp>
+      <p:sp>
+        <p:nvSpPr>
+          <p:cNvPr id="4" name="Slide Number Placeholder 3"/>
+          <p:cNvSpPr>
+            <a:spLocks noGrp="1"/>
+          </p:cNvSpPr>
+          <p:nvPr>
+            <p:ph type="sldNum" sz="quarter" idx="5"/>
+          </p:nvPr>
+        </p:nvSpPr>
+        <p:spPr/>
+        <p:txBody>
+          <a:bodyPr/>
+          <a:lstStyle/>
+          <a:p>
+            <a:fld id="{07F65287-0258-BC43-8221-F86E5F96768A}" type="slidenum">
+              <a:rPr lang="en-US" smtClean="0"/>
+              <a:t>22</a:t>
+            </a:fld>
+            <a:endParaRPr lang="en-US"/>
+          </a:p>
+        </p:txBody>
+      </p:sp>
+    </p:spTree>
+    <p:extLst>
+      <p:ext uri="{BB962C8B-B14F-4D97-AF65-F5344CB8AC3E}">
+        <p14:creationId xmlns:p14="http://schemas.microsoft.com/office/powerpoint/2010/main" val="3378653353"/>
+      </p:ext>
+    </p:extLst>
+  </p:cSld>
+  <p:clrMapOvr>
+    <a:masterClrMapping/>
+  </p:clrMapOvr>
+</p:notes>
+</file>
+
+<file path=ppt/notesSlides/notesSlide22.xml><?xml version="1.0" encoding="utf-8"?>
+<p:notes xmlns:a="http://schemas.openxmlformats.org/drawingml/2006/main" xmlns:r="http://schemas.openxmlformats.org/officeDocument/2006/relationships" xmlns:p="http://schemas.openxmlformats.org/presentationml/2006/main">
+  <p:cSld>
+    <p:spTree>
+      <p:nvGrpSpPr>
+        <p:cNvPr id="1" name=""/>
+        <p:cNvGrpSpPr/>
+        <p:nvPr/>
+      </p:nvGrpSpPr>
+      <p:grpSpPr>
+        <a:xfrm>
+          <a:off x="0" y="0"/>
+          <a:ext cx="0" cy="0"/>
+          <a:chOff x="0" y="0"/>
+          <a:chExt cx="0" cy="0"/>
+        </a:xfrm>
+      </p:grpSpPr>
+      <p:sp>
+        <p:nvSpPr>
+          <p:cNvPr id="2" name="Slide Image Placeholder 1"/>
+          <p:cNvSpPr>
+            <a:spLocks noGrp="1" noRot="1" noChangeAspect="1"/>
+          </p:cNvSpPr>
+          <p:nvPr>
+            <p:ph type="sldImg"/>
+          </p:nvPr>
+        </p:nvSpPr>
+        <p:spPr/>
+      </p:sp>
+      <p:sp>
+        <p:nvSpPr>
+          <p:cNvPr id="3" name="Notes Placeholder 2"/>
+          <p:cNvSpPr>
+            <a:spLocks noGrp="1"/>
+          </p:cNvSpPr>
+          <p:nvPr>
+            <p:ph type="body" idx="1"/>
+          </p:nvPr>
+        </p:nvSpPr>
+        <p:spPr/>
+        <p:txBody>
+          <a:bodyPr/>
+          <a:lstStyle/>
+          <a:p>
+            <a:r>
+              <a:rPr lang="en-US" dirty="0"/>
+              <a:t>A database is often the heart of our applications, and this is a great way to get a feel for how Lando works. You also end up with something you can use: a copy of your production data, running locally on your notebook. Where you can run whatever unsafe query or update your heart might desire.</a:t>
+            </a:r>
+          </a:p>
+        </p:txBody>
+      </p:sp>
+      <p:sp>
+        <p:nvSpPr>
+          <p:cNvPr id="4" name="Slide Number Placeholder 3"/>
+          <p:cNvSpPr>
+            <a:spLocks noGrp="1"/>
+          </p:cNvSpPr>
+          <p:nvPr>
+            <p:ph type="sldNum" sz="quarter" idx="5"/>
+          </p:nvPr>
+        </p:nvSpPr>
+        <p:spPr/>
+        <p:txBody>
+          <a:bodyPr/>
+          <a:lstStyle/>
+          <a:p>
+            <a:fld id="{07F65287-0258-BC43-8221-F86E5F96768A}" type="slidenum">
+              <a:rPr lang="en-US" smtClean="0"/>
+              <a:t>23</a:t>
+            </a:fld>
+            <a:endParaRPr lang="en-US"/>
+          </a:p>
+        </p:txBody>
+      </p:sp>
+    </p:spTree>
+    <p:extLst>
+      <p:ext uri="{BB962C8B-B14F-4D97-AF65-F5344CB8AC3E}">
+        <p14:creationId xmlns:p14="http://schemas.microsoft.com/office/powerpoint/2010/main" val="1904307631"/>
+      </p:ext>
+    </p:extLst>
+  </p:cSld>
+  <p:clrMapOvr>
+    <a:masterClrMapping/>
+  </p:clrMapOvr>
+</p:notes>
+</file>
+
+<file path=ppt/notesSlides/notesSlide23.xml><?xml version="1.0" encoding="utf-8"?>
+<p:notes xmlns:a="http://schemas.openxmlformats.org/drawingml/2006/main" xmlns:r="http://schemas.openxmlformats.org/officeDocument/2006/relationships" xmlns:p="http://schemas.openxmlformats.org/presentationml/2006/main">
+  <p:cSld>
+    <p:spTree>
+      <p:nvGrpSpPr>
+        <p:cNvPr id="1" name=""/>
+        <p:cNvGrpSpPr/>
+        <p:nvPr/>
+      </p:nvGrpSpPr>
+      <p:grpSpPr>
+        <a:xfrm>
+          <a:off x="0" y="0"/>
+          <a:ext cx="0" cy="0"/>
+          <a:chOff x="0" y="0"/>
+          <a:chExt cx="0" cy="0"/>
+        </a:xfrm>
+      </p:grpSpPr>
+      <p:sp>
+        <p:nvSpPr>
+          <p:cNvPr id="2" name="Slide Image Placeholder 1"/>
+          <p:cNvSpPr>
+            <a:spLocks noGrp="1" noRot="1" noChangeAspect="1"/>
+          </p:cNvSpPr>
+          <p:nvPr>
+            <p:ph type="sldImg"/>
+          </p:nvPr>
+        </p:nvSpPr>
+        <p:spPr/>
+      </p:sp>
+      <p:sp>
+        <p:nvSpPr>
+          <p:cNvPr id="3" name="Notes Placeholder 2"/>
+          <p:cNvSpPr>
+            <a:spLocks noGrp="1"/>
+          </p:cNvSpPr>
+          <p:nvPr>
+            <p:ph type="body" idx="1"/>
+          </p:nvPr>
+        </p:nvSpPr>
+        <p:spPr/>
+        <p:txBody>
+          <a:bodyPr/>
+          <a:lstStyle/>
+          <a:p>
+            <a:r>
+              <a:rPr lang="en-US" dirty="0"/>
+              <a:t>Any questions? Do we need a quick break?</a:t>
+            </a:r>
+          </a:p>
+        </p:txBody>
+      </p:sp>
+      <p:sp>
+        <p:nvSpPr>
+          <p:cNvPr id="4" name="Slide Number Placeholder 3"/>
+          <p:cNvSpPr>
+            <a:spLocks noGrp="1"/>
+          </p:cNvSpPr>
+          <p:nvPr>
+            <p:ph type="sldNum" sz="quarter" idx="5"/>
+          </p:nvPr>
+        </p:nvSpPr>
+        <p:spPr/>
+        <p:txBody>
+          <a:bodyPr/>
+          <a:lstStyle/>
+          <a:p>
+            <a:fld id="{07F65287-0258-BC43-8221-F86E5F96768A}" type="slidenum">
+              <a:rPr lang="en-US" smtClean="0"/>
+              <a:t>24</a:t>
+            </a:fld>
+            <a:endParaRPr lang="en-US"/>
+          </a:p>
+        </p:txBody>
+      </p:sp>
+    </p:spTree>
+    <p:extLst>
+      <p:ext uri="{BB962C8B-B14F-4D97-AF65-F5344CB8AC3E}">
+        <p14:creationId xmlns:p14="http://schemas.microsoft.com/office/powerpoint/2010/main" val="491364371"/>
+      </p:ext>
+    </p:extLst>
+  </p:cSld>
+  <p:clrMapOvr>
+    <a:masterClrMapping/>
+  </p:clrMapOvr>
+</p:notes>
+</file>
+
+<file path=ppt/notesSlides/notesSlide24.xml><?xml version="1.0" encoding="utf-8"?>
+<p:notes xmlns:a="http://schemas.openxmlformats.org/drawingml/2006/main" xmlns:r="http://schemas.openxmlformats.org/officeDocument/2006/relationships" xmlns:p="http://schemas.openxmlformats.org/presentationml/2006/main">
+  <p:cSld>
+    <p:spTree>
+      <p:nvGrpSpPr>
+        <p:cNvPr id="1" name=""/>
+        <p:cNvGrpSpPr/>
+        <p:nvPr/>
+      </p:nvGrpSpPr>
+      <p:grpSpPr>
+        <a:xfrm>
+          <a:off x="0" y="0"/>
+          <a:ext cx="0" cy="0"/>
+          <a:chOff x="0" y="0"/>
+          <a:chExt cx="0" cy="0"/>
+        </a:xfrm>
+      </p:grpSpPr>
+      <p:sp>
+        <p:nvSpPr>
+          <p:cNvPr id="2" name="Slide Image Placeholder 1"/>
+          <p:cNvSpPr>
+            <a:spLocks noGrp="1" noRot="1" noChangeAspect="1"/>
+          </p:cNvSpPr>
+          <p:nvPr>
+            <p:ph type="sldImg"/>
+          </p:nvPr>
+        </p:nvSpPr>
+        <p:spPr/>
+      </p:sp>
+      <p:sp>
+        <p:nvSpPr>
+          <p:cNvPr id="3" name="Notes Placeholder 2"/>
+          <p:cNvSpPr>
+            <a:spLocks noGrp="1"/>
+          </p:cNvSpPr>
+          <p:nvPr>
+            <p:ph type="body" idx="1"/>
+          </p:nvPr>
+        </p:nvSpPr>
+        <p:spPr/>
+        <p:txBody>
+          <a:bodyPr/>
+          <a:lstStyle/>
+          <a:p>
+            <a:r>
+              <a:rPr lang="en-US" dirty="0"/>
+              <a:t>Oh, cool, now we get to use a recipe. And, if you’ve never used </a:t>
+            </a:r>
+            <a:r>
+              <a:rPr lang="en-US" dirty="0" err="1"/>
+              <a:t>Omeka</a:t>
+            </a:r>
+            <a:r>
+              <a:rPr lang="en-US" dirty="0"/>
+              <a:t>-S, it’s pretty cool. I think you’ll like it. I hope we don’t lose you to it. Stay with us, there’s more we want to do today.</a:t>
+            </a:r>
+          </a:p>
+        </p:txBody>
+      </p:sp>
+      <p:sp>
+        <p:nvSpPr>
+          <p:cNvPr id="4" name="Slide Number Placeholder 3"/>
+          <p:cNvSpPr>
+            <a:spLocks noGrp="1"/>
+          </p:cNvSpPr>
+          <p:nvPr>
+            <p:ph type="sldNum" sz="quarter" idx="5"/>
+          </p:nvPr>
+        </p:nvSpPr>
+        <p:spPr/>
+        <p:txBody>
+          <a:bodyPr/>
+          <a:lstStyle/>
+          <a:p>
+            <a:fld id="{07F65287-0258-BC43-8221-F86E5F96768A}" type="slidenum">
+              <a:rPr lang="en-US" smtClean="0"/>
+              <a:t>25</a:t>
+            </a:fld>
+            <a:endParaRPr lang="en-US"/>
+          </a:p>
+        </p:txBody>
+      </p:sp>
+    </p:spTree>
+    <p:extLst>
+      <p:ext uri="{BB962C8B-B14F-4D97-AF65-F5344CB8AC3E}">
+        <p14:creationId xmlns:p14="http://schemas.microsoft.com/office/powerpoint/2010/main" val="1753263772"/>
+      </p:ext>
+    </p:extLst>
+  </p:cSld>
+  <p:clrMapOvr>
+    <a:masterClrMapping/>
+  </p:clrMapOvr>
+</p:notes>
+</file>
+
+<file path=ppt/notesSlides/notesSlide25.xml><?xml version="1.0" encoding="utf-8"?>
+<p:notes xmlns:a="http://schemas.openxmlformats.org/drawingml/2006/main" xmlns:r="http://schemas.openxmlformats.org/officeDocument/2006/relationships" xmlns:p="http://schemas.openxmlformats.org/presentationml/2006/main">
+  <p:cSld>
+    <p:spTree>
+      <p:nvGrpSpPr>
+        <p:cNvPr id="1" name=""/>
+        <p:cNvGrpSpPr/>
+        <p:nvPr/>
+      </p:nvGrpSpPr>
+      <p:grpSpPr>
+        <a:xfrm>
+          <a:off x="0" y="0"/>
+          <a:ext cx="0" cy="0"/>
+          <a:chOff x="0" y="0"/>
+          <a:chExt cx="0" cy="0"/>
+        </a:xfrm>
+      </p:grpSpPr>
+      <p:sp>
+        <p:nvSpPr>
+          <p:cNvPr id="2" name="Slide Image Placeholder 1"/>
+          <p:cNvSpPr>
+            <a:spLocks noGrp="1" noRot="1" noChangeAspect="1"/>
+          </p:cNvSpPr>
+          <p:nvPr>
+            <p:ph type="sldImg"/>
+          </p:nvPr>
+        </p:nvSpPr>
+        <p:spPr/>
+      </p:sp>
+      <p:sp>
+        <p:nvSpPr>
+          <p:cNvPr id="3" name="Notes Placeholder 2"/>
+          <p:cNvSpPr>
+            <a:spLocks noGrp="1"/>
+          </p:cNvSpPr>
+          <p:nvPr>
+            <p:ph type="body" idx="1"/>
+          </p:nvPr>
+        </p:nvSpPr>
+        <p:spPr/>
+        <p:txBody>
+          <a:bodyPr/>
+          <a:lstStyle/>
+          <a:p>
+            <a:r>
+              <a:rPr lang="en-US" dirty="0"/>
+              <a:t>Any questions? Do we need a quick break?</a:t>
+            </a:r>
+          </a:p>
+        </p:txBody>
+      </p:sp>
+      <p:sp>
+        <p:nvSpPr>
+          <p:cNvPr id="4" name="Slide Number Placeholder 3"/>
+          <p:cNvSpPr>
+            <a:spLocks noGrp="1"/>
+          </p:cNvSpPr>
+          <p:nvPr>
+            <p:ph type="sldNum" sz="quarter" idx="5"/>
+          </p:nvPr>
+        </p:nvSpPr>
+        <p:spPr/>
+        <p:txBody>
+          <a:bodyPr/>
+          <a:lstStyle/>
+          <a:p>
+            <a:fld id="{07F65287-0258-BC43-8221-F86E5F96768A}" type="slidenum">
+              <a:rPr lang="en-US" smtClean="0"/>
+              <a:t>26</a:t>
+            </a:fld>
+            <a:endParaRPr lang="en-US"/>
+          </a:p>
+        </p:txBody>
+      </p:sp>
+    </p:spTree>
+    <p:extLst>
+      <p:ext uri="{BB962C8B-B14F-4D97-AF65-F5344CB8AC3E}">
+        <p14:creationId xmlns:p14="http://schemas.microsoft.com/office/powerpoint/2010/main" val="1642885866"/>
+      </p:ext>
+    </p:extLst>
+  </p:cSld>
+  <p:clrMapOvr>
+    <a:masterClrMapping/>
+  </p:clrMapOvr>
+</p:notes>
+</file>
+
+<file path=ppt/notesSlides/notesSlide26.xml><?xml version="1.0" encoding="utf-8"?>
+<p:notes xmlns:a="http://schemas.openxmlformats.org/drawingml/2006/main" xmlns:r="http://schemas.openxmlformats.org/officeDocument/2006/relationships" xmlns:p="http://schemas.openxmlformats.org/presentationml/2006/main">
+  <p:cSld>
+    <p:spTree>
+      <p:nvGrpSpPr>
+        <p:cNvPr id="1" name=""/>
+        <p:cNvGrpSpPr/>
+        <p:nvPr/>
+      </p:nvGrpSpPr>
+      <p:grpSpPr>
+        <a:xfrm>
+          <a:off x="0" y="0"/>
+          <a:ext cx="0" cy="0"/>
+          <a:chOff x="0" y="0"/>
+          <a:chExt cx="0" cy="0"/>
+        </a:xfrm>
+      </p:grpSpPr>
+      <p:sp>
+        <p:nvSpPr>
+          <p:cNvPr id="2" name="Slide Image Placeholder 1"/>
+          <p:cNvSpPr>
+            <a:spLocks noGrp="1" noRot="1" noChangeAspect="1"/>
+          </p:cNvSpPr>
+          <p:nvPr>
+            <p:ph type="sldImg"/>
+          </p:nvPr>
+        </p:nvSpPr>
+        <p:spPr/>
+      </p:sp>
+      <p:sp>
+        <p:nvSpPr>
+          <p:cNvPr id="3" name="Notes Placeholder 2"/>
+          <p:cNvSpPr>
+            <a:spLocks noGrp="1"/>
+          </p:cNvSpPr>
+          <p:nvPr>
+            <p:ph type="body" idx="1"/>
+          </p:nvPr>
+        </p:nvSpPr>
+        <p:spPr/>
+        <p:txBody>
+          <a:bodyPr/>
+          <a:lstStyle/>
+          <a:p>
+            <a:r>
+              <a:rPr lang="en-US" dirty="0"/>
+              <a:t>OK, final workspace I have prepared, let’s get Django running. And maybe, if we have time, we can try to start up a debugger.</a:t>
+            </a:r>
+          </a:p>
+        </p:txBody>
+      </p:sp>
+      <p:sp>
+        <p:nvSpPr>
+          <p:cNvPr id="4" name="Slide Number Placeholder 3"/>
+          <p:cNvSpPr>
+            <a:spLocks noGrp="1"/>
+          </p:cNvSpPr>
+          <p:nvPr>
+            <p:ph type="sldNum" sz="quarter" idx="5"/>
+          </p:nvPr>
+        </p:nvSpPr>
+        <p:spPr/>
+        <p:txBody>
+          <a:bodyPr/>
+          <a:lstStyle/>
+          <a:p>
+            <a:fld id="{07F65287-0258-BC43-8221-F86E5F96768A}" type="slidenum">
+              <a:rPr lang="en-US" smtClean="0"/>
+              <a:t>27</a:t>
+            </a:fld>
+            <a:endParaRPr lang="en-US"/>
+          </a:p>
+        </p:txBody>
+      </p:sp>
+    </p:spTree>
+    <p:extLst>
+      <p:ext uri="{BB962C8B-B14F-4D97-AF65-F5344CB8AC3E}">
+        <p14:creationId xmlns:p14="http://schemas.microsoft.com/office/powerpoint/2010/main" val="3704286337"/>
+      </p:ext>
+    </p:extLst>
+  </p:cSld>
+  <p:clrMapOvr>
+    <a:masterClrMapping/>
+  </p:clrMapOvr>
+</p:notes>
+</file>
+
+<file path=ppt/notesSlides/notesSlide27.xml><?xml version="1.0" encoding="utf-8"?>
+<p:notes xmlns:a="http://schemas.openxmlformats.org/drawingml/2006/main" xmlns:r="http://schemas.openxmlformats.org/officeDocument/2006/relationships" xmlns:p="http://schemas.openxmlformats.org/presentationml/2006/main">
+  <p:cSld>
+    <p:spTree>
+      <p:nvGrpSpPr>
+        <p:cNvPr id="1" name=""/>
+        <p:cNvGrpSpPr/>
+        <p:nvPr/>
+      </p:nvGrpSpPr>
+      <p:grpSpPr>
+        <a:xfrm>
+          <a:off x="0" y="0"/>
+          <a:ext cx="0" cy="0"/>
+          <a:chOff x="0" y="0"/>
+          <a:chExt cx="0" cy="0"/>
+        </a:xfrm>
+      </p:grpSpPr>
+      <p:sp>
+        <p:nvSpPr>
+          <p:cNvPr id="2" name="Slide Image Placeholder 1"/>
+          <p:cNvSpPr>
+            <a:spLocks noGrp="1" noRot="1" noChangeAspect="1"/>
+          </p:cNvSpPr>
+          <p:nvPr>
+            <p:ph type="sldImg"/>
+          </p:nvPr>
+        </p:nvSpPr>
+        <p:spPr/>
+      </p:sp>
+      <p:sp>
+        <p:nvSpPr>
+          <p:cNvPr id="3" name="Notes Placeholder 2"/>
+          <p:cNvSpPr>
+            <a:spLocks noGrp="1"/>
+          </p:cNvSpPr>
+          <p:nvPr>
+            <p:ph type="body" idx="1"/>
+          </p:nvPr>
+        </p:nvSpPr>
+        <p:spPr/>
+        <p:txBody>
+          <a:bodyPr/>
+          <a:lstStyle/>
+          <a:p>
+            <a:r>
+              <a:rPr lang="en-US" dirty="0"/>
+              <a:t>Any questions? Do we need a quick break?</a:t>
+            </a:r>
+          </a:p>
+        </p:txBody>
+      </p:sp>
+      <p:sp>
+        <p:nvSpPr>
+          <p:cNvPr id="4" name="Slide Number Placeholder 3"/>
+          <p:cNvSpPr>
+            <a:spLocks noGrp="1"/>
+          </p:cNvSpPr>
+          <p:nvPr>
+            <p:ph type="sldNum" sz="quarter" idx="5"/>
+          </p:nvPr>
+        </p:nvSpPr>
+        <p:spPr/>
+        <p:txBody>
+          <a:bodyPr/>
+          <a:lstStyle/>
+          <a:p>
+            <a:fld id="{07F65287-0258-BC43-8221-F86E5F96768A}" type="slidenum">
+              <a:rPr lang="en-US" smtClean="0"/>
+              <a:t>28</a:t>
+            </a:fld>
+            <a:endParaRPr lang="en-US"/>
+          </a:p>
+        </p:txBody>
+      </p:sp>
+    </p:spTree>
+    <p:extLst>
+      <p:ext uri="{BB962C8B-B14F-4D97-AF65-F5344CB8AC3E}">
+        <p14:creationId xmlns:p14="http://schemas.microsoft.com/office/powerpoint/2010/main" val="925748264"/>
+      </p:ext>
+    </p:extLst>
+  </p:cSld>
+  <p:clrMapOvr>
+    <a:masterClrMapping/>
+  </p:clrMapOvr>
+</p:notes>
+</file>
+
+<file path=ppt/notesSlides/notesSlide28.xml><?xml version="1.0" encoding="utf-8"?>
+<p:notes xmlns:a="http://schemas.openxmlformats.org/drawingml/2006/main" xmlns:r="http://schemas.openxmlformats.org/officeDocument/2006/relationships" xmlns:p="http://schemas.openxmlformats.org/presentationml/2006/main">
+  <p:cSld>
+    <p:spTree>
+      <p:nvGrpSpPr>
+        <p:cNvPr id="1" name=""/>
+        <p:cNvGrpSpPr/>
+        <p:nvPr/>
+      </p:nvGrpSpPr>
+      <p:grpSpPr>
+        <a:xfrm>
+          <a:off x="0" y="0"/>
+          <a:ext cx="0" cy="0"/>
+          <a:chOff x="0" y="0"/>
+          <a:chExt cx="0" cy="0"/>
+        </a:xfrm>
+      </p:grpSpPr>
+      <p:sp>
+        <p:nvSpPr>
+          <p:cNvPr id="2" name="Slide Image Placeholder 1"/>
+          <p:cNvSpPr>
+            <a:spLocks noGrp="1" noRot="1" noChangeAspect="1"/>
+          </p:cNvSpPr>
+          <p:nvPr>
+            <p:ph type="sldImg"/>
+          </p:nvPr>
+        </p:nvSpPr>
+        <p:spPr/>
+      </p:sp>
+      <p:sp>
+        <p:nvSpPr>
+          <p:cNvPr id="3" name="Notes Placeholder 2"/>
+          <p:cNvSpPr>
+            <a:spLocks noGrp="1"/>
+          </p:cNvSpPr>
+          <p:nvPr>
+            <p:ph type="body" idx="1"/>
+          </p:nvPr>
+        </p:nvSpPr>
+        <p:spPr/>
+        <p:txBody>
+          <a:bodyPr/>
+          <a:lstStyle/>
+          <a:p>
+            <a:r>
+              <a:rPr lang="en-US" dirty="0"/>
+              <a:t>OK, this is going to be fun. I have an idea of what you all will suggest we build together, but let’s figure that out first. Then let’s build it.</a:t>
+            </a:r>
+          </a:p>
+        </p:txBody>
+      </p:sp>
+      <p:sp>
+        <p:nvSpPr>
+          <p:cNvPr id="4" name="Slide Number Placeholder 3"/>
+          <p:cNvSpPr>
+            <a:spLocks noGrp="1"/>
+          </p:cNvSpPr>
+          <p:nvPr>
+            <p:ph type="sldNum" sz="quarter" idx="5"/>
+          </p:nvPr>
+        </p:nvSpPr>
+        <p:spPr/>
+        <p:txBody>
+          <a:bodyPr/>
+          <a:lstStyle/>
+          <a:p>
+            <a:fld id="{07F65287-0258-BC43-8221-F86E5F96768A}" type="slidenum">
+              <a:rPr lang="en-US" smtClean="0"/>
+              <a:t>29</a:t>
+            </a:fld>
+            <a:endParaRPr lang="en-US"/>
+          </a:p>
+        </p:txBody>
+      </p:sp>
+    </p:spTree>
+    <p:extLst>
+      <p:ext uri="{BB962C8B-B14F-4D97-AF65-F5344CB8AC3E}">
+        <p14:creationId xmlns:p14="http://schemas.microsoft.com/office/powerpoint/2010/main" val="3304442387"/>
+      </p:ext>
+    </p:extLst>
+  </p:cSld>
+  <p:clrMapOvr>
+    <a:masterClrMapping/>
+  </p:clrMapOvr>
+</p:notes>
+</file>
+
+<file path=ppt/notesSlides/notesSlide29.xml><?xml version="1.0" encoding="utf-8"?>
+<p:notes xmlns:a="http://schemas.openxmlformats.org/drawingml/2006/main" xmlns:r="http://schemas.openxmlformats.org/officeDocument/2006/relationships" xmlns:p="http://schemas.openxmlformats.org/presentationml/2006/main">
+  <p:cSld>
+    <p:spTree>
+      <p:nvGrpSpPr>
+        <p:cNvPr id="1" name=""/>
+        <p:cNvGrpSpPr/>
+        <p:nvPr/>
+      </p:nvGrpSpPr>
+      <p:grpSpPr>
+        <a:xfrm>
+          <a:off x="0" y="0"/>
+          <a:ext cx="0" cy="0"/>
+          <a:chOff x="0" y="0"/>
+          <a:chExt cx="0" cy="0"/>
+        </a:xfrm>
+      </p:grpSpPr>
+      <p:sp>
+        <p:nvSpPr>
+          <p:cNvPr id="2" name="Slide Image Placeholder 1"/>
+          <p:cNvSpPr>
+            <a:spLocks noGrp="1" noRot="1" noChangeAspect="1"/>
+          </p:cNvSpPr>
+          <p:nvPr>
+            <p:ph type="sldImg"/>
+          </p:nvPr>
+        </p:nvSpPr>
+        <p:spPr/>
+      </p:sp>
+      <p:sp>
+        <p:nvSpPr>
+          <p:cNvPr id="3" name="Notes Placeholder 2"/>
+          <p:cNvSpPr>
+            <a:spLocks noGrp="1"/>
+          </p:cNvSpPr>
+          <p:nvPr>
+            <p:ph type="body" idx="1"/>
+          </p:nvPr>
+        </p:nvSpPr>
+        <p:spPr/>
+        <p:txBody>
+          <a:bodyPr/>
+          <a:lstStyle/>
+          <a:p>
+            <a:r>
+              <a:rPr lang="en-US" dirty="0"/>
+              <a:t>Now that we’ve built a database, Omeka-S and Django dev environments, if you want to explore more, here are some things to check out. I haven’t tried the frontend tooling that Lando makes available, but it looks cool. I especially like that you can just slap on these front-end toolsets like grunt and gulp, to any other dev environment. And other places to play are, if you want to work offline, you can experiment with the proxy configuration options. Or if you want to automate more things, check out the Events configuration. Or, if you want to use Lando as a piece of your great Docker empire, check out the Compose/custom service. You *can* use your custom Docker images. It’ll just take more work on your part.</a:t>
+            </a:r>
+          </a:p>
+        </p:txBody>
+      </p:sp>
+      <p:sp>
+        <p:nvSpPr>
+          <p:cNvPr id="4" name="Slide Number Placeholder 3"/>
+          <p:cNvSpPr>
+            <a:spLocks noGrp="1"/>
+          </p:cNvSpPr>
+          <p:nvPr>
+            <p:ph type="sldNum" sz="quarter" idx="5"/>
+          </p:nvPr>
+        </p:nvSpPr>
+        <p:spPr/>
+        <p:txBody>
+          <a:bodyPr/>
+          <a:lstStyle/>
+          <a:p>
+            <a:fld id="{07F65287-0258-BC43-8221-F86E5F96768A}" type="slidenum">
+              <a:rPr lang="en-US" smtClean="0"/>
+              <a:t>30</a:t>
+            </a:fld>
+            <a:endParaRPr lang="en-US"/>
+          </a:p>
+        </p:txBody>
+      </p:sp>
+    </p:spTree>
+    <p:extLst>
+      <p:ext uri="{BB962C8B-B14F-4D97-AF65-F5344CB8AC3E}">
+        <p14:creationId xmlns:p14="http://schemas.microsoft.com/office/powerpoint/2010/main" val="1309255926"/>
+      </p:ext>
+    </p:extLst>
+  </p:cSld>
+  <p:clrMapOvr>
+    <a:masterClrMapping/>
+  </p:clrMapOvr>
+</p:notes>
+</file>
+
 <file path=ppt/notesSlides/notesSlide3.xml><?xml version="1.0" encoding="utf-8"?>
 <p:notes xmlns:a="http://schemas.openxmlformats.org/drawingml/2006/main" xmlns:r="http://schemas.openxmlformats.org/officeDocument/2006/relationships" xmlns:p="http://schemas.openxmlformats.org/presentationml/2006/main">
   <p:cSld>
@@ -1608,6 +2655,180 @@
     <p:extLst>
       <p:ext uri="{BB962C8B-B14F-4D97-AF65-F5344CB8AC3E}">
         <p14:creationId xmlns:p14="http://schemas.microsoft.com/office/powerpoint/2010/main" val="1174533777"/>
+      </p:ext>
+    </p:extLst>
+  </p:cSld>
+  <p:clrMapOvr>
+    <a:masterClrMapping/>
+  </p:clrMapOvr>
+</p:notes>
+</file>
+
+<file path=ppt/notesSlides/notesSlide30.xml><?xml version="1.0" encoding="utf-8"?>
+<p:notes xmlns:a="http://schemas.openxmlformats.org/drawingml/2006/main" xmlns:r="http://schemas.openxmlformats.org/officeDocument/2006/relationships" xmlns:p="http://schemas.openxmlformats.org/presentationml/2006/main">
+  <p:cSld>
+    <p:spTree>
+      <p:nvGrpSpPr>
+        <p:cNvPr id="1" name=""/>
+        <p:cNvGrpSpPr/>
+        <p:nvPr/>
+      </p:nvGrpSpPr>
+      <p:grpSpPr>
+        <a:xfrm>
+          <a:off x="0" y="0"/>
+          <a:ext cx="0" cy="0"/>
+          <a:chOff x="0" y="0"/>
+          <a:chExt cx="0" cy="0"/>
+        </a:xfrm>
+      </p:grpSpPr>
+      <p:sp>
+        <p:nvSpPr>
+          <p:cNvPr id="2" name="Slide Image Placeholder 1"/>
+          <p:cNvSpPr>
+            <a:spLocks noGrp="1" noRot="1" noChangeAspect="1"/>
+          </p:cNvSpPr>
+          <p:nvPr>
+            <p:ph type="sldImg"/>
+          </p:nvPr>
+        </p:nvSpPr>
+        <p:spPr/>
+      </p:sp>
+      <p:sp>
+        <p:nvSpPr>
+          <p:cNvPr id="3" name="Notes Placeholder 2"/>
+          <p:cNvSpPr>
+            <a:spLocks noGrp="1"/>
+          </p:cNvSpPr>
+          <p:nvPr>
+            <p:ph type="body" idx="1"/>
+          </p:nvPr>
+        </p:nvSpPr>
+        <p:spPr/>
+        <p:txBody>
+          <a:bodyPr/>
+          <a:lstStyle/>
+          <a:p>
+            <a:r>
+              <a:rPr lang="en-US" dirty="0"/>
+              <a:t>Any questions?</a:t>
+            </a:r>
+          </a:p>
+        </p:txBody>
+      </p:sp>
+      <p:sp>
+        <p:nvSpPr>
+          <p:cNvPr id="4" name="Slide Number Placeholder 3"/>
+          <p:cNvSpPr>
+            <a:spLocks noGrp="1"/>
+          </p:cNvSpPr>
+          <p:nvPr>
+            <p:ph type="sldNum" sz="quarter" idx="5"/>
+          </p:nvPr>
+        </p:nvSpPr>
+        <p:spPr/>
+        <p:txBody>
+          <a:bodyPr/>
+          <a:lstStyle/>
+          <a:p>
+            <a:fld id="{07F65287-0258-BC43-8221-F86E5F96768A}" type="slidenum">
+              <a:rPr lang="en-US" smtClean="0"/>
+              <a:t>31</a:t>
+            </a:fld>
+            <a:endParaRPr lang="en-US"/>
+          </a:p>
+        </p:txBody>
+      </p:sp>
+    </p:spTree>
+    <p:extLst>
+      <p:ext uri="{BB962C8B-B14F-4D97-AF65-F5344CB8AC3E}">
+        <p14:creationId xmlns:p14="http://schemas.microsoft.com/office/powerpoint/2010/main" val="380505923"/>
+      </p:ext>
+    </p:extLst>
+  </p:cSld>
+  <p:clrMapOvr>
+    <a:masterClrMapping/>
+  </p:clrMapOvr>
+</p:notes>
+</file>
+
+<file path=ppt/notesSlides/notesSlide31.xml><?xml version="1.0" encoding="utf-8"?>
+<p:notes xmlns:a="http://schemas.openxmlformats.org/drawingml/2006/main" xmlns:r="http://schemas.openxmlformats.org/officeDocument/2006/relationships" xmlns:p="http://schemas.openxmlformats.org/presentationml/2006/main">
+  <p:cSld>
+    <p:spTree>
+      <p:nvGrpSpPr>
+        <p:cNvPr id="1" name=""/>
+        <p:cNvGrpSpPr/>
+        <p:nvPr/>
+      </p:nvGrpSpPr>
+      <p:grpSpPr>
+        <a:xfrm>
+          <a:off x="0" y="0"/>
+          <a:ext cx="0" cy="0"/>
+          <a:chOff x="0" y="0"/>
+          <a:chExt cx="0" cy="0"/>
+        </a:xfrm>
+      </p:grpSpPr>
+      <p:sp>
+        <p:nvSpPr>
+          <p:cNvPr id="2" name="Slide Image Placeholder 1"/>
+          <p:cNvSpPr>
+            <a:spLocks noGrp="1" noRot="1" noChangeAspect="1"/>
+          </p:cNvSpPr>
+          <p:nvPr>
+            <p:ph type="sldImg"/>
+          </p:nvPr>
+        </p:nvSpPr>
+        <p:spPr/>
+      </p:sp>
+      <p:sp>
+        <p:nvSpPr>
+          <p:cNvPr id="3" name="Notes Placeholder 2"/>
+          <p:cNvSpPr>
+            <a:spLocks noGrp="1"/>
+          </p:cNvSpPr>
+          <p:nvPr>
+            <p:ph type="body" idx="1"/>
+          </p:nvPr>
+        </p:nvSpPr>
+        <p:spPr/>
+        <p:txBody>
+          <a:bodyPr/>
+          <a:lstStyle/>
+          <a:p>
+            <a:r>
+              <a:rPr lang="en-US" dirty="0"/>
+              <a:t>Here are the credits for the images I used in these slides.</a:t>
+            </a:r>
+          </a:p>
+        </p:txBody>
+      </p:sp>
+      <p:sp>
+        <p:nvSpPr>
+          <p:cNvPr id="4" name="Slide Number Placeholder 3"/>
+          <p:cNvSpPr>
+            <a:spLocks noGrp="1"/>
+          </p:cNvSpPr>
+          <p:nvPr>
+            <p:ph type="sldNum" sz="quarter" idx="5"/>
+          </p:nvPr>
+        </p:nvSpPr>
+        <p:spPr/>
+        <p:txBody>
+          <a:bodyPr/>
+          <a:lstStyle/>
+          <a:p>
+            <a:fld id="{07F65287-0258-BC43-8221-F86E5F96768A}" type="slidenum">
+              <a:rPr lang="en-US" smtClean="0"/>
+              <a:t>32</a:t>
+            </a:fld>
+            <a:endParaRPr lang="en-US"/>
+          </a:p>
+        </p:txBody>
+      </p:sp>
+    </p:spTree>
+    <p:extLst>
+      <p:ext uri="{BB962C8B-B14F-4D97-AF65-F5344CB8AC3E}">
+        <p14:creationId xmlns:p14="http://schemas.microsoft.com/office/powerpoint/2010/main" val="3340434738"/>
       </p:ext>
     </p:extLst>
   </p:cSld>
@@ -1748,144 +2969,9 @@
           <a:bodyPr/>
           <a:lstStyle/>
           <a:p>
-            <a:pPr marL="0" marR="0" lvl="0" indent="0" algn="l" defTabSz="914400" rtl="0" eaLnBrk="1" fontAlgn="auto" latinLnBrk="0" hangingPunct="1">
-              <a:lnSpc>
-                <a:spcPct val="100000"/>
-              </a:lnSpc>
-              <a:spcBef>
-                <a:spcPts val="0"/>
-              </a:spcBef>
-              <a:spcAft>
-                <a:spcPts val="0"/>
-              </a:spcAft>
-              <a:buClrTx/>
-              <a:buSzTx/>
-              <a:buFontTx/>
-              <a:buNone/>
-              <a:tabLst/>
-              <a:defRPr/>
-            </a:pPr>
-            <a:r>
-              <a:rPr lang="en-US" dirty="0"/>
-              <a:t>This is a famous cathedral in Barcelona, </a:t>
-            </a:r>
-            <a:r>
-              <a:rPr lang="en-US" sz="1200" b="0" i="0" kern="1200" dirty="0">
-                <a:solidFill>
-                  <a:schemeClr val="tx1"/>
-                </a:solidFill>
-                <a:effectLst/>
-                <a:latin typeface="+mn-lt"/>
-                <a:ea typeface="+mn-ea"/>
-                <a:cs typeface="+mn-cs"/>
-              </a:rPr>
-              <a:t>Sagrada </a:t>
-            </a:r>
-            <a:r>
-              <a:rPr lang="en-US" sz="1200" b="0" i="0" kern="1200" dirty="0" err="1">
-                <a:solidFill>
-                  <a:schemeClr val="tx1"/>
-                </a:solidFill>
-                <a:effectLst/>
-                <a:latin typeface="+mn-lt"/>
-                <a:ea typeface="+mn-ea"/>
-                <a:cs typeface="+mn-cs"/>
-              </a:rPr>
-              <a:t>Família</a:t>
-            </a:r>
-            <a:r>
-              <a:rPr lang="en-US" sz="1200" b="0" i="0" kern="1200" dirty="0">
-                <a:solidFill>
-                  <a:schemeClr val="tx1"/>
-                </a:solidFill>
-                <a:effectLst/>
-                <a:latin typeface="+mn-lt"/>
-                <a:ea typeface="+mn-ea"/>
-                <a:cs typeface="+mn-cs"/>
-              </a:rPr>
-              <a:t> ('Basilica of the Holy Family’), by Antoni </a:t>
-            </a:r>
-            <a:r>
-              <a:rPr lang="en-US" sz="1200" b="0" i="0" kern="1200" dirty="0" err="1">
-                <a:solidFill>
-                  <a:schemeClr val="tx1"/>
-                </a:solidFill>
-                <a:effectLst/>
-                <a:latin typeface="+mn-lt"/>
-                <a:ea typeface="+mn-ea"/>
-                <a:cs typeface="+mn-cs"/>
-              </a:rPr>
-              <a:t>Gaudí</a:t>
-            </a:r>
-            <a:r>
-              <a:rPr lang="en-US" sz="1200" b="0" i="0" kern="1200" dirty="0">
-                <a:solidFill>
-                  <a:schemeClr val="tx1"/>
-                </a:solidFill>
-                <a:effectLst/>
-                <a:latin typeface="+mn-lt"/>
-                <a:ea typeface="+mn-ea"/>
-                <a:cs typeface="+mn-cs"/>
-              </a:rPr>
-              <a:t>, it began construction in March of 1882. It’s still not done. I have a picture of this cathedral on my office wall, as a reminder that Perfect may not be attainable, and as a visual reminder of what the quest for perfection can look like.</a:t>
-            </a:r>
-            <a:br>
-              <a:rPr lang="en-US" sz="1200" b="0" i="0" kern="1200" dirty="0">
-                <a:solidFill>
-                  <a:schemeClr val="tx1"/>
-                </a:solidFill>
-                <a:effectLst/>
-                <a:latin typeface="+mn-lt"/>
-                <a:ea typeface="+mn-ea"/>
-                <a:cs typeface="+mn-cs"/>
-              </a:rPr>
-            </a:br>
-            <a:br>
-              <a:rPr lang="en-US" sz="1200" b="0" i="0" kern="1200" dirty="0">
-                <a:solidFill>
-                  <a:schemeClr val="tx1"/>
-                </a:solidFill>
-                <a:effectLst/>
-                <a:latin typeface="+mn-lt"/>
-                <a:ea typeface="+mn-ea"/>
-                <a:cs typeface="+mn-cs"/>
-              </a:rPr>
-            </a:br>
-            <a:r>
-              <a:rPr lang="en-US" sz="1200" b="0" i="0" kern="1200" dirty="0">
-                <a:solidFill>
-                  <a:schemeClr val="tx1"/>
-                </a:solidFill>
-                <a:effectLst/>
-                <a:latin typeface="+mn-lt"/>
-                <a:ea typeface="+mn-ea"/>
-                <a:cs typeface="+mn-cs"/>
-              </a:rPr>
-              <a:t>I have this picture in these slides as a way to say, Docker can be used to build huge and beautiful </a:t>
-            </a:r>
-            <a:r>
-              <a:rPr lang="en-US" sz="1200" b="0" i="0" kern="1200" dirty="0" err="1">
-                <a:solidFill>
-                  <a:schemeClr val="tx1"/>
-                </a:solidFill>
-                <a:effectLst/>
-                <a:latin typeface="+mn-lt"/>
-                <a:ea typeface="+mn-ea"/>
-                <a:cs typeface="+mn-cs"/>
-              </a:rPr>
-              <a:t>worklfows</a:t>
-            </a:r>
-            <a:r>
-              <a:rPr lang="en-US" sz="1200" b="0" i="0" kern="1200" dirty="0">
-                <a:solidFill>
-                  <a:schemeClr val="tx1"/>
-                </a:solidFill>
-                <a:effectLst/>
-                <a:latin typeface="+mn-lt"/>
-                <a:ea typeface="+mn-ea"/>
-                <a:cs typeface="+mn-cs"/>
-              </a:rPr>
-              <a:t>. We won’t be doing anything like that today. We are going to be building dev environments, so we can get to work.</a:t>
+            <a:r>
+              <a:rPr lang="en-US" dirty="0"/>
+              <a:t>I don’t want to complain about Docker too much, and please don’t take offense if you’ve already invested the time in developing and using a Docker workflow. I want to honor that work and level of commitment, but getting a development environment running, so we can do some work, should not require that level of commitment. Awesome and Awful. You get building blocks, and it runs on most anything. But, it’s complicated, and hard.</a:t>
             </a:r>
           </a:p>
         </p:txBody>
@@ -1907,7 +2993,7 @@
           <a:p>
             <a:fld id="{07F65287-0258-BC43-8221-F86E5F96768A}" type="slidenum">
               <a:rPr lang="en-US" smtClean="0"/>
-              <a:t>7</a:t>
+              <a:t>6</a:t>
             </a:fld>
             <a:endParaRPr lang="en-US"/>
           </a:p>
@@ -1916,7 +3002,7 @@
     </p:spTree>
     <p:extLst>
       <p:ext uri="{BB962C8B-B14F-4D97-AF65-F5344CB8AC3E}">
-        <p14:creationId xmlns:p14="http://schemas.microsoft.com/office/powerpoint/2010/main" val="2374772773"/>
+        <p14:creationId xmlns:p14="http://schemas.microsoft.com/office/powerpoint/2010/main" val="1056243610"/>
       </p:ext>
     </p:extLst>
   </p:cSld>
@@ -1970,9 +3056,144 @@
           <a:bodyPr/>
           <a:lstStyle/>
           <a:p>
-            <a:r>
-              <a:rPr lang="en-US" dirty="0"/>
-              <a:t>The main Lando page makes it very clear that Docker containers built by Lando are not to be used in production. This warning applies to almost any community-supported container you might pull down from Docker Hub: they are built for other reasons, mostly for developer convenience. For example: the official Tomcat containers from Apache all run as root. You do not want to run Tomcat as root. In a development environment, it’s fine, you know, whatever, let’s just get cracking. But you want your production site to be secure.</a:t>
+            <a:pPr marL="0" marR="0" lvl="0" indent="0" algn="l" defTabSz="914400" rtl="0" eaLnBrk="1" fontAlgn="auto" latinLnBrk="0" hangingPunct="1">
+              <a:lnSpc>
+                <a:spcPct val="100000"/>
+              </a:lnSpc>
+              <a:spcBef>
+                <a:spcPts val="0"/>
+              </a:spcBef>
+              <a:spcAft>
+                <a:spcPts val="0"/>
+              </a:spcAft>
+              <a:buClrTx/>
+              <a:buSzTx/>
+              <a:buFontTx/>
+              <a:buNone/>
+              <a:tabLst/>
+              <a:defRPr/>
+            </a:pPr>
+            <a:r>
+              <a:rPr lang="en-US" dirty="0"/>
+              <a:t>This is a famous cathedral in Barcelona, </a:t>
+            </a:r>
+            <a:r>
+              <a:rPr lang="en-US" sz="1200" b="0" i="0" kern="1200" dirty="0">
+                <a:solidFill>
+                  <a:schemeClr val="tx1"/>
+                </a:solidFill>
+                <a:effectLst/>
+                <a:latin typeface="+mn-lt"/>
+                <a:ea typeface="+mn-ea"/>
+                <a:cs typeface="+mn-cs"/>
+              </a:rPr>
+              <a:t>Sagrada </a:t>
+            </a:r>
+            <a:r>
+              <a:rPr lang="en-US" sz="1200" b="0" i="0" kern="1200" dirty="0" err="1">
+                <a:solidFill>
+                  <a:schemeClr val="tx1"/>
+                </a:solidFill>
+                <a:effectLst/>
+                <a:latin typeface="+mn-lt"/>
+                <a:ea typeface="+mn-ea"/>
+                <a:cs typeface="+mn-cs"/>
+              </a:rPr>
+              <a:t>Família</a:t>
+            </a:r>
+            <a:r>
+              <a:rPr lang="en-US" sz="1200" b="0" i="0" kern="1200" dirty="0">
+                <a:solidFill>
+                  <a:schemeClr val="tx1"/>
+                </a:solidFill>
+                <a:effectLst/>
+                <a:latin typeface="+mn-lt"/>
+                <a:ea typeface="+mn-ea"/>
+                <a:cs typeface="+mn-cs"/>
+              </a:rPr>
+              <a:t> ('Basilica of the Holy Family’), by Antoni </a:t>
+            </a:r>
+            <a:r>
+              <a:rPr lang="en-US" sz="1200" b="0" i="0" kern="1200" dirty="0" err="1">
+                <a:solidFill>
+                  <a:schemeClr val="tx1"/>
+                </a:solidFill>
+                <a:effectLst/>
+                <a:latin typeface="+mn-lt"/>
+                <a:ea typeface="+mn-ea"/>
+                <a:cs typeface="+mn-cs"/>
+              </a:rPr>
+              <a:t>Gaudí</a:t>
+            </a:r>
+            <a:r>
+              <a:rPr lang="en-US" sz="1200" b="0" i="0" kern="1200" dirty="0">
+                <a:solidFill>
+                  <a:schemeClr val="tx1"/>
+                </a:solidFill>
+                <a:effectLst/>
+                <a:latin typeface="+mn-lt"/>
+                <a:ea typeface="+mn-ea"/>
+                <a:cs typeface="+mn-cs"/>
+              </a:rPr>
+              <a:t>, it began construction in March of 1882. It’s still not done. I have a picture of this cathedral on my office wall, as a reminder that Perfect may not be attainable, and as a visual reminder of what the quest for perfection can look like.</a:t>
+            </a:r>
+            <a:br>
+              <a:rPr lang="en-US" sz="1200" b="0" i="0" kern="1200" dirty="0">
+                <a:solidFill>
+                  <a:schemeClr val="tx1"/>
+                </a:solidFill>
+                <a:effectLst/>
+                <a:latin typeface="+mn-lt"/>
+                <a:ea typeface="+mn-ea"/>
+                <a:cs typeface="+mn-cs"/>
+              </a:rPr>
+            </a:br>
+            <a:br>
+              <a:rPr lang="en-US" sz="1200" b="0" i="0" kern="1200" dirty="0">
+                <a:solidFill>
+                  <a:schemeClr val="tx1"/>
+                </a:solidFill>
+                <a:effectLst/>
+                <a:latin typeface="+mn-lt"/>
+                <a:ea typeface="+mn-ea"/>
+                <a:cs typeface="+mn-cs"/>
+              </a:rPr>
+            </a:br>
+            <a:r>
+              <a:rPr lang="en-US" sz="1200" b="0" i="0" kern="1200" dirty="0">
+                <a:solidFill>
+                  <a:schemeClr val="tx1"/>
+                </a:solidFill>
+                <a:effectLst/>
+                <a:latin typeface="+mn-lt"/>
+                <a:ea typeface="+mn-ea"/>
+                <a:cs typeface="+mn-cs"/>
+              </a:rPr>
+              <a:t>I have this picture in these slides to say, Docker can be used to build huge and beautiful </a:t>
+            </a:r>
+            <a:r>
+              <a:rPr lang="en-US" sz="1200" b="0" i="0" kern="1200" dirty="0" err="1">
+                <a:solidFill>
+                  <a:schemeClr val="tx1"/>
+                </a:solidFill>
+                <a:effectLst/>
+                <a:latin typeface="+mn-lt"/>
+                <a:ea typeface="+mn-ea"/>
+                <a:cs typeface="+mn-cs"/>
+              </a:rPr>
+              <a:t>worklfows</a:t>
+            </a:r>
+            <a:r>
+              <a:rPr lang="en-US" sz="1200" b="0" i="0" kern="1200" dirty="0">
+                <a:solidFill>
+                  <a:schemeClr val="tx1"/>
+                </a:solidFill>
+                <a:effectLst/>
+                <a:latin typeface="+mn-lt"/>
+                <a:ea typeface="+mn-ea"/>
+                <a:cs typeface="+mn-cs"/>
+              </a:rPr>
+              <a:t>. We won’t be doing anything like that today. We are going to be building dev environments, so we can get to work.</a:t>
             </a:r>
           </a:p>
         </p:txBody>
@@ -1994,7 +3215,7 @@
           <a:p>
             <a:fld id="{07F65287-0258-BC43-8221-F86E5F96768A}" type="slidenum">
               <a:rPr lang="en-US" smtClean="0"/>
-              <a:t>8</a:t>
+              <a:t>7</a:t>
             </a:fld>
             <a:endParaRPr lang="en-US"/>
           </a:p>
@@ -2003,7 +3224,7 @@
     </p:spTree>
     <p:extLst>
       <p:ext uri="{BB962C8B-B14F-4D97-AF65-F5344CB8AC3E}">
-        <p14:creationId xmlns:p14="http://schemas.microsoft.com/office/powerpoint/2010/main" val="1344439785"/>
+        <p14:creationId xmlns:p14="http://schemas.microsoft.com/office/powerpoint/2010/main" val="2374772773"/>
       </p:ext>
     </p:extLst>
   </p:cSld>
@@ -2059,15 +3280,7 @@
           <a:p>
             <a:r>
               <a:rPr lang="en-US" dirty="0"/>
-              <a:t>I should admit right now that I’ve borrowed, these intro slides from the Lando folks, they have a Google drive full of slide decks. Like a lot of opensource projects, they have a ton of resources and docs. The best place to start reading about Lando is </a:t>
-            </a:r>
-            <a:r>
-              <a:rPr lang="en-US" dirty="0" err="1"/>
-              <a:t>docs.lando.dev</a:t>
-            </a:r>
-            <a:r>
-              <a:rPr lang="en-US" dirty="0"/>
-              <a:t>. Stacks on Stacks on Racks is their explanation of just what Lando is. It starts with your operating system, which includes tech for containers, and then Docker running on that, and Docker Compose on top of Docker, and then Lando.</a:t>
+              <a:t>The main Lando page makes it very clear that Docker containers built by Lando are not to be used in production. This warning applies to almost any community-supported container you might pull down from Docker Hub: they are built for other reasons, mostly for developer convenience. For example: the official Tomcat containers from Apache all run as root. You do not want to run Tomcat as root. In a development environment, it’s fine, you know, whatever, let’s just get cracking. But you want your production site to be secure.</a:t>
             </a:r>
           </a:p>
         </p:txBody>
@@ -2089,7 +3302,7 @@
           <a:p>
             <a:fld id="{07F65287-0258-BC43-8221-F86E5F96768A}" type="slidenum">
               <a:rPr lang="en-US" smtClean="0"/>
-              <a:t>11</a:t>
+              <a:t>8</a:t>
             </a:fld>
             <a:endParaRPr lang="en-US"/>
           </a:p>
@@ -2098,7 +3311,7 @@
     </p:spTree>
     <p:extLst>
       <p:ext uri="{BB962C8B-B14F-4D97-AF65-F5344CB8AC3E}">
-        <p14:creationId xmlns:p14="http://schemas.microsoft.com/office/powerpoint/2010/main" val="326291708"/>
+        <p14:creationId xmlns:p14="http://schemas.microsoft.com/office/powerpoint/2010/main" val="1344439785"/>
       </p:ext>
     </p:extLst>
   </p:cSld>
@@ -2152,7 +3365,10 @@
           <a:bodyPr/>
           <a:lstStyle/>
           <a:p>
-            <a:endParaRPr lang="en-US" dirty="0"/>
+            <a:r>
+              <a:rPr lang="en-US" dirty="0"/>
+              <a:t>If you can’t have a perfect workflow, using the same containers in dev as prod, why bother? Honestly, it’s scope creep. I’m here to talk about making some dev environments. You can work on your perfect ideal workflow on your own time. Let’s get to work.</a:t>
+            </a:r>
           </a:p>
         </p:txBody>
       </p:sp>
@@ -2173,7 +3389,7 @@
           <a:p>
             <a:fld id="{07F65287-0258-BC43-8221-F86E5F96768A}" type="slidenum">
               <a:rPr lang="en-US" smtClean="0"/>
-              <a:t>12</a:t>
+              <a:t>9</a:t>
             </a:fld>
             <a:endParaRPr lang="en-US"/>
           </a:p>
@@ -2182,7 +3398,7 @@
     </p:spTree>
     <p:extLst>
       <p:ext uri="{BB962C8B-B14F-4D97-AF65-F5344CB8AC3E}">
-        <p14:creationId xmlns:p14="http://schemas.microsoft.com/office/powerpoint/2010/main" val="1360150314"/>
+        <p14:creationId xmlns:p14="http://schemas.microsoft.com/office/powerpoint/2010/main" val="1769581732"/>
       </p:ext>
     </p:extLst>
   </p:cSld>
@@ -2238,23 +3454,7 @@
           <a:p>
             <a:r>
               <a:rPr lang="en-US" dirty="0"/>
-              <a:t>The Lando docs site makes a big deal about recipes, they’re flashy and can get you going quickly, but really, most of us are going to be working on stuff that is a bit more complicated than a Drupal site. We *will* use the LAMP recipe for </a:t>
-            </a:r>
-            <a:r>
-              <a:rPr lang="en-US" dirty="0" err="1"/>
-              <a:t>Omeka</a:t>
-            </a:r>
-            <a:r>
-              <a:rPr lang="en-US" dirty="0"/>
-              <a:t>, and if you have a PHP app like </a:t>
-            </a:r>
-            <a:r>
-              <a:rPr lang="en-US" dirty="0" err="1"/>
-              <a:t>Omeka</a:t>
-            </a:r>
-            <a:r>
-              <a:rPr lang="en-US" dirty="0"/>
-              <a:t> or OJS, it’s a very fast way to get to work.</a:t>
+              <a:t>The Lando community declares Lando is a “per app, single config file, containerized everything, local dev tool.” Let’s break that down a bit.</a:t>
             </a:r>
           </a:p>
         </p:txBody>
@@ -2276,7 +3476,7 @@
           <a:p>
             <a:fld id="{07F65287-0258-BC43-8221-F86E5F96768A}" type="slidenum">
               <a:rPr lang="en-US" smtClean="0"/>
-              <a:t>14</a:t>
+              <a:t>10</a:t>
             </a:fld>
             <a:endParaRPr lang="en-US"/>
           </a:p>
@@ -2285,7 +3485,7 @@
     </p:spTree>
     <p:extLst>
       <p:ext uri="{BB962C8B-B14F-4D97-AF65-F5344CB8AC3E}">
-        <p14:creationId xmlns:p14="http://schemas.microsoft.com/office/powerpoint/2010/main" val="1141383494"/>
+        <p14:creationId xmlns:p14="http://schemas.microsoft.com/office/powerpoint/2010/main" val="4055699967"/>
       </p:ext>
     </p:extLst>
   </p:cSld>
@@ -2567,7 +3767,7 @@
           <a:p>
             <a:fld id="{DC542904-3975-4E3E-BBB9-A828B1A3FA3D}" type="datetimeFigureOut">
               <a:rPr lang="en-US" smtClean="0"/>
-              <a:t>3/8/21</a:t>
+              <a:t>3/9/21</a:t>
             </a:fld>
             <a:endParaRPr lang="en-US"/>
           </a:p>
@@ -2775,7 +3975,7 @@
           <a:p>
             <a:fld id="{DC542904-3975-4E3E-BBB9-A828B1A3FA3D}" type="datetimeFigureOut">
               <a:rPr lang="en-US" smtClean="0"/>
-              <a:t>3/8/21</a:t>
+              <a:t>3/9/21</a:t>
             </a:fld>
             <a:endParaRPr lang="en-US"/>
           </a:p>
@@ -2983,7 +4183,7 @@
           <a:p>
             <a:fld id="{DC542904-3975-4E3E-BBB9-A828B1A3FA3D}" type="datetimeFigureOut">
               <a:rPr lang="en-US" smtClean="0"/>
-              <a:t>3/8/21</a:t>
+              <a:t>3/9/21</a:t>
             </a:fld>
             <a:endParaRPr lang="en-US"/>
           </a:p>
@@ -3258,7 +4458,7 @@
           <a:p>
             <a:fld id="{DC542904-3975-4E3E-BBB9-A828B1A3FA3D}" type="datetimeFigureOut">
               <a:rPr lang="en-US" smtClean="0"/>
-              <a:t>3/8/21</a:t>
+              <a:t>3/9/21</a:t>
             </a:fld>
             <a:endParaRPr lang="en-US"/>
           </a:p>
@@ -3528,7 +4728,7 @@
           <a:p>
             <a:fld id="{DC542904-3975-4E3E-BBB9-A828B1A3FA3D}" type="datetimeFigureOut">
               <a:rPr lang="en-US" smtClean="0"/>
-              <a:t>3/8/21</a:t>
+              <a:t>3/9/21</a:t>
             </a:fld>
             <a:endParaRPr lang="en-US"/>
           </a:p>
@@ -3940,7 +5140,7 @@
           <a:p>
             <a:fld id="{DC542904-3975-4E3E-BBB9-A828B1A3FA3D}" type="datetimeFigureOut">
               <a:rPr lang="en-US" smtClean="0"/>
-              <a:t>3/8/21</a:t>
+              <a:t>3/9/21</a:t>
             </a:fld>
             <a:endParaRPr lang="en-US"/>
           </a:p>
@@ -4086,7 +5286,7 @@
           <a:p>
             <a:fld id="{DC542904-3975-4E3E-BBB9-A828B1A3FA3D}" type="datetimeFigureOut">
               <a:rPr lang="en-US" smtClean="0"/>
-              <a:t>3/8/21</a:t>
+              <a:t>3/9/21</a:t>
             </a:fld>
             <a:endParaRPr lang="en-US"/>
           </a:p>
@@ -4199,7 +5399,7 @@
           <a:p>
             <a:fld id="{DC542904-3975-4E3E-BBB9-A828B1A3FA3D}" type="datetimeFigureOut">
               <a:rPr lang="en-US" smtClean="0"/>
-              <a:t>3/8/21</a:t>
+              <a:t>3/9/21</a:t>
             </a:fld>
             <a:endParaRPr lang="en-US"/>
           </a:p>
@@ -4512,7 +5712,7 @@
           <a:p>
             <a:fld id="{DC542904-3975-4E3E-BBB9-A828B1A3FA3D}" type="datetimeFigureOut">
               <a:rPr lang="en-US" smtClean="0"/>
-              <a:t>3/8/21</a:t>
+              <a:t>3/9/21</a:t>
             </a:fld>
             <a:endParaRPr lang="en-US"/>
           </a:p>
@@ -4802,7 +6002,7 @@
           <a:p>
             <a:fld id="{DC542904-3975-4E3E-BBB9-A828B1A3FA3D}" type="datetimeFigureOut">
               <a:rPr lang="en-US" smtClean="0"/>
-              <a:t>3/8/21</a:t>
+              <a:t>3/9/21</a:t>
             </a:fld>
             <a:endParaRPr lang="en-US"/>
           </a:p>
@@ -5052,7 +6252,7 @@
           <a:p>
             <a:fld id="{DC542904-3975-4E3E-BBB9-A828B1A3FA3D}" type="datetimeFigureOut">
               <a:rPr lang="en-US" smtClean="0"/>
-              <a:t>3/8/21</a:t>
+              <a:t>3/9/21</a:t>
             </a:fld>
             <a:endParaRPr lang="en-US"/>
           </a:p>
@@ -5783,7 +6983,7 @@
           </p:nvPr>
         </p:nvPicPr>
         <p:blipFill>
-          <a:blip r:embed="rId2">
+          <a:blip r:embed="rId3">
             <a:extLst>
               <a:ext uri="{28A0092B-C50C-407E-A947-70E740481C1C}">
                 <a14:useLocalDpi xmlns:a14="http://schemas.microsoft.com/office/drawing/2010/main" val="0"/>
@@ -7072,7 +8272,7 @@
             </a:r>
             <a:r>
               <a:rPr lang="en-US" dirty="0">
-                <a:hlinkClick r:id="rId2"/>
+                <a:hlinkClick r:id="rId3"/>
               </a:rPr>
               <a:t>https://github.com/lando/lando/releases</a:t>
             </a:r>
@@ -7085,7 +8285,7 @@
             </a:r>
             <a:r>
               <a:rPr lang="en-US" dirty="0">
-                <a:hlinkClick r:id="rId3"/>
+                <a:hlinkClick r:id="rId4"/>
               </a:rPr>
               <a:t>https://docs.lando.dev/basics/installation.html</a:t>
             </a:r>
@@ -7173,7 +8373,18 @@
               <a:rPr lang="en-US" dirty="0" err="1"/>
               <a:t>lando.yml</a:t>
             </a:r>
-            <a:endParaRPr lang="en-US" dirty="0"/>
+            <a:r>
+              <a:rPr lang="en-US" dirty="0"/>
+              <a:t> (The </a:t>
+            </a:r>
+            <a:r>
+              <a:rPr lang="en-US" dirty="0" err="1"/>
+              <a:t>Landofile</a:t>
+            </a:r>
+            <a:r>
+              <a:rPr lang="en-US" dirty="0"/>
+              <a:t>)</a:t>
+            </a:r>
           </a:p>
         </p:txBody>
       </p:sp>
@@ -10382,12 +11593,20 @@
             </a:r>
           </a:p>
           <a:p>
+            <a:pPr marL="514350" indent="-514350">
+              <a:buFont typeface="+mj-lt"/>
+              <a:buAutoNum type="arabicPeriod"/>
+            </a:pPr>
             <a:r>
               <a:rPr lang="en-US" dirty="0"/>
               <a:t>Start Small, just a database</a:t>
             </a:r>
           </a:p>
           <a:p>
+            <a:pPr marL="514350" indent="-514350">
+              <a:buFont typeface="+mj-lt"/>
+              <a:buAutoNum type="arabicPeriod"/>
+            </a:pPr>
             <a:r>
               <a:rPr lang="en-US" dirty="0"/>
               <a:t>Let’s build: </a:t>
@@ -10402,12 +11621,20 @@
             </a:r>
           </a:p>
           <a:p>
+            <a:pPr marL="514350" indent="-514350">
+              <a:buFont typeface="+mj-lt"/>
+              <a:buAutoNum type="arabicPeriod"/>
+            </a:pPr>
             <a:r>
               <a:rPr lang="en-US" dirty="0"/>
               <a:t>Let’s build: Django</a:t>
             </a:r>
           </a:p>
           <a:p>
+            <a:pPr marL="514350" indent="-514350">
+              <a:buFont typeface="+mj-lt"/>
+              <a:buAutoNum type="arabicPeriod"/>
+            </a:pPr>
             <a:r>
               <a:rPr lang="en-US" dirty="0"/>
               <a:t>Let’s build something together!</a:t>

</xml_diff>

<commit_message>
Tweak slides, tweak exercise 1 and exercise 4 READMEs.
</commit_message>
<xml_diff>
--- a/LearningAsWeGo-DecomposingDevEnvironmentsWithLando.pptx
+++ b/LearningAsWeGo-DecomposingDevEnvironmentsWithLando.pptx
@@ -285,7 +285,7 @@
           <a:p>
             <a:fld id="{1D896817-C553-DC40-BD68-E09EA78F3436}" type="datetimeFigureOut">
               <a:rPr lang="en-US" smtClean="0"/>
-              <a:t>3/9/21</a:t>
+              <a:t>3/19/21</a:t>
             </a:fld>
             <a:endParaRPr lang="en-US"/>
           </a:p>
@@ -1849,7 +1849,23 @@
           <a:p>
             <a:r>
               <a:rPr lang="en-US" dirty="0"/>
-              <a:t>Here’s a quick demo of Lando, to give you an idea of what working with it is like.</a:t>
+              <a:t>Here’s a quick demo of Lando, to give you an idea of what working with it is like. I will use the environment I created to work on </a:t>
+            </a:r>
+            <a:r>
+              <a:rPr lang="en-US" dirty="0" err="1"/>
+              <a:t>Jschol</a:t>
+            </a:r>
+            <a:r>
+              <a:rPr lang="en-US" dirty="0"/>
+              <a:t>, which is the main UI for </a:t>
+            </a:r>
+            <a:r>
+              <a:rPr lang="en-US" dirty="0" err="1"/>
+              <a:t>eScholarship</a:t>
+            </a:r>
+            <a:r>
+              <a:rPr lang="en-US" dirty="0"/>
+              <a:t>, CDL’s portal to IR and Journal content. </a:t>
             </a:r>
           </a:p>
         </p:txBody>
@@ -2021,10 +2037,403 @@
           <a:bodyPr/>
           <a:lstStyle/>
           <a:p>
+            <a:pPr marL="0" marR="0" lvl="0" indent="0" algn="l" defTabSz="914400" rtl="0" eaLnBrk="1" fontAlgn="auto" latinLnBrk="0" hangingPunct="1">
+              <a:lnSpc>
+                <a:spcPct val="100000"/>
+              </a:lnSpc>
+              <a:spcBef>
+                <a:spcPts val="0"/>
+              </a:spcBef>
+              <a:spcAft>
+                <a:spcPts val="0"/>
+              </a:spcAft>
+              <a:buClrTx/>
+              <a:buSzTx/>
+              <a:buFontTx/>
+              <a:buNone/>
+              <a:tabLst/>
+              <a:defRPr/>
+            </a:pPr>
             <a:r>
               <a:rPr lang="en-US" dirty="0"/>
               <a:t>A database is often the heart of our applications, and this is a great way to get a feel for how Lando works. You also end up with something you can use: a copy of your production data, running locally on your notebook. Where you can run whatever unsafe query or update your heart might desire.</a:t>
             </a:r>
+            <a:br>
+              <a:rPr lang="en-US" dirty="0"/>
+            </a:br>
+            <a:endParaRPr lang="en-US" dirty="0"/>
+          </a:p>
+          <a:p>
+            <a:pPr marL="0" marR="0" lvl="0" indent="0" algn="l" defTabSz="914400" rtl="0" eaLnBrk="1" fontAlgn="auto" latinLnBrk="0" hangingPunct="1">
+              <a:lnSpc>
+                <a:spcPct val="100000"/>
+              </a:lnSpc>
+              <a:spcBef>
+                <a:spcPts val="0"/>
+              </a:spcBef>
+              <a:spcAft>
+                <a:spcPts val="0"/>
+              </a:spcAft>
+              <a:buClrTx/>
+              <a:buSzTx/>
+              <a:buFontTx/>
+              <a:buNone/>
+              <a:tabLst/>
+              <a:defRPr/>
+            </a:pPr>
+            <a:r>
+              <a:rPr lang="en-US" dirty="0"/>
+              <a:t>Workshop link: https://</a:t>
+            </a:r>
+            <a:r>
+              <a:rPr lang="en-US" dirty="0" err="1"/>
+              <a:t>git.io</a:t>
+            </a:r>
+            <a:r>
+              <a:rPr lang="en-US" dirty="0"/>
+              <a:t>/</a:t>
+            </a:r>
+            <a:r>
+              <a:rPr lang="en-US" dirty="0" err="1"/>
+              <a:t>JqLaG</a:t>
+            </a:r>
+            <a:br>
+              <a:rPr lang="en-US" dirty="0"/>
+            </a:br>
+            <a:r>
+              <a:rPr lang="en-US" dirty="0"/>
+              <a:t>Exercise link: </a:t>
+            </a:r>
+            <a:r>
+              <a:rPr lang="en-US" sz="1200" dirty="0"/>
+              <a:t>https://</a:t>
+            </a:r>
+            <a:r>
+              <a:rPr lang="en-US" sz="1200" dirty="0" err="1"/>
+              <a:t>git.io</a:t>
+            </a:r>
+            <a:r>
+              <a:rPr lang="en-US" sz="1200" dirty="0"/>
+              <a:t>/Jm1Uv</a:t>
+            </a:r>
+          </a:p>
+          <a:p>
+            <a:pPr marL="0" marR="0" lvl="0" indent="0" algn="l" defTabSz="914400" rtl="0" eaLnBrk="1" fontAlgn="auto" latinLnBrk="0" hangingPunct="1">
+              <a:lnSpc>
+                <a:spcPct val="100000"/>
+              </a:lnSpc>
+              <a:spcBef>
+                <a:spcPts val="0"/>
+              </a:spcBef>
+              <a:spcAft>
+                <a:spcPts val="0"/>
+              </a:spcAft>
+              <a:buClrTx/>
+              <a:buSzTx/>
+              <a:buFontTx/>
+              <a:buNone/>
+              <a:tabLst/>
+              <a:defRPr/>
+            </a:pPr>
+            <a:endParaRPr lang="en-US" dirty="0"/>
+          </a:p>
+          <a:p>
+            <a:pPr marL="0" marR="0" lvl="0" indent="0" algn="l" defTabSz="914400" rtl="0" eaLnBrk="1" fontAlgn="auto" latinLnBrk="0" hangingPunct="1">
+              <a:lnSpc>
+                <a:spcPct val="100000"/>
+              </a:lnSpc>
+              <a:spcBef>
+                <a:spcPts val="0"/>
+              </a:spcBef>
+              <a:spcAft>
+                <a:spcPts val="0"/>
+              </a:spcAft>
+              <a:buClrTx/>
+              <a:buSzTx/>
+              <a:buFontTx/>
+              <a:buNone/>
+              <a:tabLst/>
+              <a:defRPr/>
+            </a:pPr>
+            <a:r>
+              <a:rPr lang="en-US" dirty="0"/>
+              <a:t>1. Download a sample database</a:t>
+            </a:r>
+          </a:p>
+          <a:p>
+            <a:pPr marL="0" marR="0" lvl="0" indent="0" algn="l" defTabSz="914400" rtl="0" eaLnBrk="1" fontAlgn="auto" latinLnBrk="0" hangingPunct="1">
+              <a:lnSpc>
+                <a:spcPct val="100000"/>
+              </a:lnSpc>
+              <a:spcBef>
+                <a:spcPts val="0"/>
+              </a:spcBef>
+              <a:spcAft>
+                <a:spcPts val="0"/>
+              </a:spcAft>
+              <a:buClrTx/>
+              <a:buSzTx/>
+              <a:buFontTx/>
+              <a:buNone/>
+              <a:tabLst/>
+              <a:defRPr/>
+            </a:pPr>
+            <a:r>
+              <a:rPr lang="en-US" dirty="0"/>
+              <a:t>2. </a:t>
+            </a:r>
+            <a:r>
+              <a:rPr lang="en-US" dirty="0" err="1"/>
+              <a:t>lando</a:t>
+            </a:r>
+            <a:r>
+              <a:rPr lang="en-US" dirty="0"/>
+              <a:t> </a:t>
+            </a:r>
+            <a:r>
+              <a:rPr lang="en-US" dirty="0" err="1"/>
+              <a:t>init</a:t>
+            </a:r>
+            <a:r>
+              <a:rPr lang="en-US" dirty="0"/>
+              <a:t> –full</a:t>
+            </a:r>
+          </a:p>
+          <a:p>
+            <a:pPr marL="0" marR="0" lvl="0" indent="0" algn="l" defTabSz="914400" rtl="0" eaLnBrk="1" fontAlgn="auto" latinLnBrk="0" hangingPunct="1">
+              <a:lnSpc>
+                <a:spcPct val="100000"/>
+              </a:lnSpc>
+              <a:spcBef>
+                <a:spcPts val="0"/>
+              </a:spcBef>
+              <a:spcAft>
+                <a:spcPts val="0"/>
+              </a:spcAft>
+              <a:buClrTx/>
+              <a:buSzTx/>
+              <a:buFontTx/>
+              <a:buNone/>
+              <a:tabLst/>
+              <a:defRPr/>
+            </a:pPr>
+            <a:r>
+              <a:rPr lang="en-US" dirty="0"/>
+              <a:t>3. Delete the PHP stuff</a:t>
+            </a:r>
+          </a:p>
+          <a:p>
+            <a:pPr marL="0" marR="0" lvl="0" indent="0" algn="l" defTabSz="914400" rtl="0" eaLnBrk="1" fontAlgn="auto" latinLnBrk="0" hangingPunct="1">
+              <a:lnSpc>
+                <a:spcPct val="100000"/>
+              </a:lnSpc>
+              <a:spcBef>
+                <a:spcPts val="0"/>
+              </a:spcBef>
+              <a:spcAft>
+                <a:spcPts val="0"/>
+              </a:spcAft>
+              <a:buClrTx/>
+              <a:buSzTx/>
+              <a:buFontTx/>
+              <a:buNone/>
+              <a:tabLst/>
+              <a:defRPr/>
+            </a:pPr>
+            <a:r>
+              <a:rPr lang="en-US" dirty="0"/>
+              <a:t>4. Change </a:t>
+            </a:r>
+            <a:r>
+              <a:rPr lang="en-US" dirty="0" err="1"/>
+              <a:t>portforward</a:t>
+            </a:r>
+            <a:r>
+              <a:rPr lang="en-US" dirty="0"/>
+              <a:t> to 3306</a:t>
+            </a:r>
+          </a:p>
+          <a:p>
+            <a:pPr marL="0" marR="0" lvl="0" indent="0" algn="l" defTabSz="914400" rtl="0" eaLnBrk="1" fontAlgn="auto" latinLnBrk="0" hangingPunct="1">
+              <a:lnSpc>
+                <a:spcPct val="100000"/>
+              </a:lnSpc>
+              <a:spcBef>
+                <a:spcPts val="0"/>
+              </a:spcBef>
+              <a:spcAft>
+                <a:spcPts val="0"/>
+              </a:spcAft>
+              <a:buClrTx/>
+              <a:buSzTx/>
+              <a:buFontTx/>
+              <a:buNone/>
+              <a:tabLst/>
+              <a:defRPr/>
+            </a:pPr>
+            <a:r>
+              <a:rPr lang="en-US" dirty="0"/>
+              <a:t>5. Lando </a:t>
+            </a:r>
+            <a:r>
+              <a:rPr lang="en-US" dirty="0" err="1"/>
+              <a:t>poweroff</a:t>
+            </a:r>
+            <a:endParaRPr lang="en-US" dirty="0"/>
+          </a:p>
+          <a:p>
+            <a:pPr marL="0" marR="0" lvl="0" indent="0" algn="l" defTabSz="914400" rtl="0" eaLnBrk="1" fontAlgn="auto" latinLnBrk="0" hangingPunct="1">
+              <a:lnSpc>
+                <a:spcPct val="100000"/>
+              </a:lnSpc>
+              <a:spcBef>
+                <a:spcPts val="0"/>
+              </a:spcBef>
+              <a:spcAft>
+                <a:spcPts val="0"/>
+              </a:spcAft>
+              <a:buClrTx/>
+              <a:buSzTx/>
+              <a:buFontTx/>
+              <a:buNone/>
+              <a:tabLst/>
+              <a:defRPr/>
+            </a:pPr>
+            <a:r>
+              <a:rPr lang="en-US" dirty="0"/>
+              <a:t>6. Lando rebuild</a:t>
+            </a:r>
+          </a:p>
+          <a:p>
+            <a:pPr marL="0" marR="0" lvl="0" indent="0" algn="l" defTabSz="914400" rtl="0" eaLnBrk="1" fontAlgn="auto" latinLnBrk="0" hangingPunct="1">
+              <a:lnSpc>
+                <a:spcPct val="100000"/>
+              </a:lnSpc>
+              <a:spcBef>
+                <a:spcPts val="0"/>
+              </a:spcBef>
+              <a:spcAft>
+                <a:spcPts val="0"/>
+              </a:spcAft>
+              <a:buClrTx/>
+              <a:buSzTx/>
+              <a:buFontTx/>
+              <a:buNone/>
+              <a:tabLst/>
+              <a:defRPr/>
+            </a:pPr>
+            <a:r>
+              <a:rPr lang="en-US" dirty="0"/>
+              <a:t>7. Lando </a:t>
+            </a:r>
+            <a:r>
+              <a:rPr lang="en-US" dirty="0" err="1"/>
+              <a:t>db</a:t>
+            </a:r>
+            <a:r>
+              <a:rPr lang="en-US" dirty="0"/>
+              <a:t>-import</a:t>
+            </a:r>
+          </a:p>
+          <a:p>
+            <a:pPr marL="0" marR="0" lvl="0" indent="0" algn="l" defTabSz="914400" rtl="0" eaLnBrk="1" fontAlgn="auto" latinLnBrk="0" hangingPunct="1">
+              <a:lnSpc>
+                <a:spcPct val="100000"/>
+              </a:lnSpc>
+              <a:spcBef>
+                <a:spcPts val="0"/>
+              </a:spcBef>
+              <a:spcAft>
+                <a:spcPts val="0"/>
+              </a:spcAft>
+              <a:buClrTx/>
+              <a:buSzTx/>
+              <a:buFontTx/>
+              <a:buNone/>
+              <a:tabLst/>
+              <a:defRPr/>
+            </a:pPr>
+            <a:r>
+              <a:rPr lang="en-US" dirty="0"/>
+              <a:t>8. Lando </a:t>
+            </a:r>
+            <a:r>
+              <a:rPr lang="en-US" dirty="0" err="1"/>
+              <a:t>mysql</a:t>
+            </a:r>
+            <a:endParaRPr lang="en-US" dirty="0"/>
+          </a:p>
+          <a:p>
+            <a:pPr marL="0" marR="0" lvl="0" indent="0" algn="l" defTabSz="914400" rtl="0" eaLnBrk="1" fontAlgn="auto" latinLnBrk="0" hangingPunct="1">
+              <a:lnSpc>
+                <a:spcPct val="100000"/>
+              </a:lnSpc>
+              <a:spcBef>
+                <a:spcPts val="0"/>
+              </a:spcBef>
+              <a:spcAft>
+                <a:spcPts val="0"/>
+              </a:spcAft>
+              <a:buClrTx/>
+              <a:buSzTx/>
+              <a:buFontTx/>
+              <a:buNone/>
+              <a:tabLst/>
+              <a:defRPr/>
+            </a:pPr>
+            <a:r>
+              <a:rPr lang="en-US" dirty="0"/>
+              <a:t>9. Destroy some stuff</a:t>
+            </a:r>
+          </a:p>
+          <a:p>
+            <a:pPr marL="0" marR="0" lvl="0" indent="0" algn="l" defTabSz="914400" rtl="0" eaLnBrk="1" fontAlgn="auto" latinLnBrk="0" hangingPunct="1">
+              <a:lnSpc>
+                <a:spcPct val="100000"/>
+              </a:lnSpc>
+              <a:spcBef>
+                <a:spcPts val="0"/>
+              </a:spcBef>
+              <a:spcAft>
+                <a:spcPts val="0"/>
+              </a:spcAft>
+              <a:buClrTx/>
+              <a:buSzTx/>
+              <a:buFontTx/>
+              <a:buNone/>
+              <a:tabLst/>
+              <a:defRPr/>
+            </a:pPr>
+            <a:r>
+              <a:rPr lang="en-US" dirty="0"/>
+              <a:t>10. Rebuild the environment</a:t>
+            </a:r>
+          </a:p>
+          <a:p>
+            <a:pPr marL="0" marR="0" lvl="0" indent="0" algn="l" defTabSz="914400" rtl="0" eaLnBrk="1" fontAlgn="auto" latinLnBrk="0" hangingPunct="1">
+              <a:lnSpc>
+                <a:spcPct val="100000"/>
+              </a:lnSpc>
+              <a:spcBef>
+                <a:spcPts val="0"/>
+              </a:spcBef>
+              <a:spcAft>
+                <a:spcPts val="0"/>
+              </a:spcAft>
+              <a:buClrTx/>
+              <a:buSzTx/>
+              <a:buFontTx/>
+              <a:buNone/>
+              <a:tabLst/>
+              <a:defRPr/>
+            </a:pPr>
+            <a:r>
+              <a:rPr lang="en-US" dirty="0"/>
+              <a:t>11. Extra Credit: add PhpMyAdmin</a:t>
+            </a:r>
+          </a:p>
+          <a:p>
+            <a:endParaRPr lang="en-US" dirty="0"/>
           </a:p>
         </p:txBody>
       </p:sp>
@@ -3871,7 +4280,7 @@
           <a:p>
             <a:fld id="{DC542904-3975-4E3E-BBB9-A828B1A3FA3D}" type="datetimeFigureOut">
               <a:rPr lang="en-US" smtClean="0"/>
-              <a:t>3/9/21</a:t>
+              <a:t>3/19/21</a:t>
             </a:fld>
             <a:endParaRPr lang="en-US"/>
           </a:p>
@@ -4079,7 +4488,7 @@
           <a:p>
             <a:fld id="{DC542904-3975-4E3E-BBB9-A828B1A3FA3D}" type="datetimeFigureOut">
               <a:rPr lang="en-US" smtClean="0"/>
-              <a:t>3/9/21</a:t>
+              <a:t>3/19/21</a:t>
             </a:fld>
             <a:endParaRPr lang="en-US"/>
           </a:p>
@@ -4287,7 +4696,7 @@
           <a:p>
             <a:fld id="{DC542904-3975-4E3E-BBB9-A828B1A3FA3D}" type="datetimeFigureOut">
               <a:rPr lang="en-US" smtClean="0"/>
-              <a:t>3/9/21</a:t>
+              <a:t>3/19/21</a:t>
             </a:fld>
             <a:endParaRPr lang="en-US"/>
           </a:p>
@@ -4562,7 +4971,7 @@
           <a:p>
             <a:fld id="{DC542904-3975-4E3E-BBB9-A828B1A3FA3D}" type="datetimeFigureOut">
               <a:rPr lang="en-US" smtClean="0"/>
-              <a:t>3/9/21</a:t>
+              <a:t>3/19/21</a:t>
             </a:fld>
             <a:endParaRPr lang="en-US"/>
           </a:p>
@@ -4832,7 +5241,7 @@
           <a:p>
             <a:fld id="{DC542904-3975-4E3E-BBB9-A828B1A3FA3D}" type="datetimeFigureOut">
               <a:rPr lang="en-US" smtClean="0"/>
-              <a:t>3/9/21</a:t>
+              <a:t>3/19/21</a:t>
             </a:fld>
             <a:endParaRPr lang="en-US"/>
           </a:p>
@@ -5244,7 +5653,7 @@
           <a:p>
             <a:fld id="{DC542904-3975-4E3E-BBB9-A828B1A3FA3D}" type="datetimeFigureOut">
               <a:rPr lang="en-US" smtClean="0"/>
-              <a:t>3/9/21</a:t>
+              <a:t>3/19/21</a:t>
             </a:fld>
             <a:endParaRPr lang="en-US"/>
           </a:p>
@@ -5390,7 +5799,7 @@
           <a:p>
             <a:fld id="{DC542904-3975-4E3E-BBB9-A828B1A3FA3D}" type="datetimeFigureOut">
               <a:rPr lang="en-US" smtClean="0"/>
-              <a:t>3/9/21</a:t>
+              <a:t>3/19/21</a:t>
             </a:fld>
             <a:endParaRPr lang="en-US"/>
           </a:p>
@@ -5503,7 +5912,7 @@
           <a:p>
             <a:fld id="{DC542904-3975-4E3E-BBB9-A828B1A3FA3D}" type="datetimeFigureOut">
               <a:rPr lang="en-US" smtClean="0"/>
-              <a:t>3/9/21</a:t>
+              <a:t>3/19/21</a:t>
             </a:fld>
             <a:endParaRPr lang="en-US"/>
           </a:p>
@@ -5816,7 +6225,7 @@
           <a:p>
             <a:fld id="{DC542904-3975-4E3E-BBB9-A828B1A3FA3D}" type="datetimeFigureOut">
               <a:rPr lang="en-US" smtClean="0"/>
-              <a:t>3/9/21</a:t>
+              <a:t>3/19/21</a:t>
             </a:fld>
             <a:endParaRPr lang="en-US"/>
           </a:p>
@@ -6106,7 +6515,7 @@
           <a:p>
             <a:fld id="{DC542904-3975-4E3E-BBB9-A828B1A3FA3D}" type="datetimeFigureOut">
               <a:rPr lang="en-US" smtClean="0"/>
-              <a:t>3/9/21</a:t>
+              <a:t>3/19/21</a:t>
             </a:fld>
             <a:endParaRPr lang="en-US"/>
           </a:p>
@@ -6356,7 +6765,7 @@
           <a:p>
             <a:fld id="{DC542904-3975-4E3E-BBB9-A828B1A3FA3D}" type="datetimeFigureOut">
               <a:rPr lang="en-US" smtClean="0"/>
-              <a:t>3/9/21</a:t>
+              <a:t>3/19/21</a:t>
             </a:fld>
             <a:endParaRPr lang="en-US"/>
           </a:p>
@@ -10356,6 +10765,21 @@
               <a:rPr lang="en-US" dirty="0"/>
               <a:t>Exercise 1: MySQL</a:t>
             </a:r>
+            <a:br>
+              <a:rPr lang="en-US" dirty="0"/>
+            </a:br>
+            <a:r>
+              <a:rPr lang="en-US" sz="4000" dirty="0"/>
+              <a:t>https://</a:t>
+            </a:r>
+            <a:r>
+              <a:rPr lang="en-US" sz="4000" dirty="0" err="1"/>
+              <a:t>git.io</a:t>
+            </a:r>
+            <a:r>
+              <a:rPr lang="en-US" sz="4000" dirty="0"/>
+              <a:t>/Jm1Uv</a:t>
+            </a:r>
           </a:p>
         </p:txBody>
       </p:sp>
@@ -10523,15 +10947,19 @@
           <a:p>
             <a:r>
               <a:rPr lang="en-US" dirty="0"/>
-              <a:t>Exercise 2: </a:t>
-            </a:r>
-            <a:r>
-              <a:rPr lang="en-US" dirty="0" err="1"/>
-              <a:t>Omeka</a:t>
-            </a:r>
-            <a:r>
-              <a:rPr lang="en-US" dirty="0"/>
-              <a:t>-S</a:t>
+              <a:t>Exercise 2: Omeka-S </a:t>
+            </a:r>
+            <a:r>
+              <a:rPr lang="en-US" sz="4000" dirty="0"/>
+              <a:t>https://</a:t>
+            </a:r>
+            <a:r>
+              <a:rPr lang="en-US" sz="4000" dirty="0" err="1"/>
+              <a:t>git.io</a:t>
+            </a:r>
+            <a:r>
+              <a:rPr lang="en-US" sz="4000" dirty="0"/>
+              <a:t>/Jm1Ub</a:t>
             </a:r>
           </a:p>
         </p:txBody>
@@ -10701,6 +11129,21 @@
             <a:r>
               <a:rPr lang="en-US" dirty="0"/>
               <a:t>Exercise 3: Django</a:t>
+            </a:r>
+            <a:br>
+              <a:rPr lang="en-US" dirty="0"/>
+            </a:br>
+            <a:r>
+              <a:rPr lang="en-US" sz="4000" dirty="0"/>
+              <a:t>https://</a:t>
+            </a:r>
+            <a:r>
+              <a:rPr lang="en-US" sz="4000" dirty="0" err="1"/>
+              <a:t>git.io</a:t>
+            </a:r>
+            <a:r>
+              <a:rPr lang="en-US" sz="4000" dirty="0"/>
+              <a:t>/Jm1T0</a:t>
             </a:r>
           </a:p>
         </p:txBody>

</xml_diff>

<commit_message>
removing package-lock.json, we don't need it. Updating slides with mention of Valkyrie
</commit_message>
<xml_diff>
--- a/LearningAsWeGo-DecomposingDevEnvironmentsWithLando.pptx
+++ b/LearningAsWeGo-DecomposingDevEnvironmentsWithLando.pptx
@@ -285,7 +285,7 @@
           <a:p>
             <a:fld id="{1D896817-C553-DC40-BD68-E09EA78F3436}" type="datetimeFigureOut">
               <a:rPr lang="en-US" smtClean="0"/>
-              <a:t>3/19/21</a:t>
+              <a:t>3/25/21</a:t>
             </a:fld>
             <a:endParaRPr lang="en-US"/>
           </a:p>
@@ -598,7 +598,23 @@
           <a:p>
             <a:r>
               <a:rPr lang="en-US" dirty="0"/>
-              <a:t>I promise I’m not going to fill this workshop with heavy quotes from computer science classics, but I *did* want to explain the title of the workshop a bit, because it’s important to me. ”Bringing Order to Chaos” is the title of the section from which I pulled this quote. [read quote] Smaller and smaller parts, and you need only comprehend each part, rather than everything at once.</a:t>
+              <a:t>Hi, thanks for coming to this workshop. My name is Hardy Pottinger, I am a Publishing Systems Developer with California Digital Library, and this workshop is called Learning as We Go, Decomposing Dev Environments with Lando. The link to all the workshop materials is there, the </a:t>
+            </a:r>
+            <a:r>
+              <a:rPr lang="en-US" dirty="0" err="1"/>
+              <a:t>git.io</a:t>
+            </a:r>
+            <a:r>
+              <a:rPr lang="en-US" dirty="0"/>
+              <a:t> </a:t>
+            </a:r>
+            <a:r>
+              <a:rPr lang="en-US" dirty="0" err="1"/>
+              <a:t>shortlink</a:t>
+            </a:r>
+            <a:r>
+              <a:rPr lang="en-US" dirty="0"/>
+              <a:t>. I’m not going to make you follow along with me while I demonstrate Lando, but if you want to do so, go there and follow the readmes. I hope you’ve already done so, because we have 3 hours today, and I plan to fill them.</a:t>
             </a:r>
           </a:p>
         </p:txBody>
@@ -620,7 +636,7 @@
           <a:p>
             <a:fld id="{07F65287-0258-BC43-8221-F86E5F96768A}" type="slidenum">
               <a:rPr lang="en-US" smtClean="0"/>
-              <a:t>2</a:t>
+              <a:t>1</a:t>
             </a:fld>
             <a:endParaRPr lang="en-US"/>
           </a:p>
@@ -629,7 +645,7 @@
     </p:spTree>
     <p:extLst>
       <p:ext uri="{BB962C8B-B14F-4D97-AF65-F5344CB8AC3E}">
-        <p14:creationId xmlns:p14="http://schemas.microsoft.com/office/powerpoint/2010/main" val="1418658710"/>
+        <p14:creationId xmlns:p14="http://schemas.microsoft.com/office/powerpoint/2010/main" val="2480187195"/>
       </p:ext>
     </p:extLst>
   </p:cSld>
@@ -685,15 +701,7 @@
           <a:p>
             <a:r>
               <a:rPr lang="en-US" dirty="0"/>
-              <a:t>I should admit right now that I’ve borrowed, these intro slides from the Lando folks, they have a Google drive full of slide decks. Like a lot of opensource projects, they have a ton of resources and docs. The best place to start reading about Lando is </a:t>
-            </a:r>
-            <a:r>
-              <a:rPr lang="en-US" dirty="0" err="1"/>
-              <a:t>docs.lando.dev</a:t>
-            </a:r>
-            <a:r>
-              <a:rPr lang="en-US" dirty="0"/>
-              <a:t>. “Stacks on Stacks on Racks” is their explanation of Lando. It starts with your operating system, which includes tech for containers, and then Docker running on that, and Docker Compose on top of Docker, and then Lando.</a:t>
+              <a:t>The Lando community declares Lando is a “per app, single config file, containerized everything, local dev tool.” Let’s break that down a bit.</a:t>
             </a:r>
           </a:p>
         </p:txBody>
@@ -715,7 +723,7 @@
           <a:p>
             <a:fld id="{07F65287-0258-BC43-8221-F86E5F96768A}" type="slidenum">
               <a:rPr lang="en-US" smtClean="0"/>
-              <a:t>11</a:t>
+              <a:t>10</a:t>
             </a:fld>
             <a:endParaRPr lang="en-US"/>
           </a:p>
@@ -724,7 +732,7 @@
     </p:spTree>
     <p:extLst>
       <p:ext uri="{BB962C8B-B14F-4D97-AF65-F5344CB8AC3E}">
-        <p14:creationId xmlns:p14="http://schemas.microsoft.com/office/powerpoint/2010/main" val="326291708"/>
+        <p14:creationId xmlns:p14="http://schemas.microsoft.com/office/powerpoint/2010/main" val="4055699967"/>
       </p:ext>
     </p:extLst>
   </p:cSld>
@@ -780,7 +788,15 @@
           <a:p>
             <a:r>
               <a:rPr lang="en-US" dirty="0"/>
-              <a:t>At its core, Lando prepackages docker images for various services and technologies. Here are a few.</a:t>
+              <a:t>I should admit right now that I’ve borrowed, these intro slides from the Lando folks, they have a Google drive full of slide decks. Like a lot of opensource projects, they have a ton of resources and docs. The best place to start reading about Lando is </a:t>
+            </a:r>
+            <a:r>
+              <a:rPr lang="en-US" dirty="0" err="1"/>
+              <a:t>docs.lando.dev</a:t>
+            </a:r>
+            <a:r>
+              <a:rPr lang="en-US" dirty="0"/>
+              <a:t>. “Stacks on Stacks on Racks” is their explanation of Lando. It starts with your operating system, which includes tech for containers, and then Docker running on that, and Docker Compose on top of Docker, and then Lando.</a:t>
             </a:r>
           </a:p>
         </p:txBody>
@@ -802,7 +818,7 @@
           <a:p>
             <a:fld id="{07F65287-0258-BC43-8221-F86E5F96768A}" type="slidenum">
               <a:rPr lang="en-US" smtClean="0"/>
-              <a:t>12</a:t>
+              <a:t>11</a:t>
             </a:fld>
             <a:endParaRPr lang="en-US"/>
           </a:p>
@@ -811,7 +827,7 @@
     </p:spTree>
     <p:extLst>
       <p:ext uri="{BB962C8B-B14F-4D97-AF65-F5344CB8AC3E}">
-        <p14:creationId xmlns:p14="http://schemas.microsoft.com/office/powerpoint/2010/main" val="1360150314"/>
+        <p14:creationId xmlns:p14="http://schemas.microsoft.com/office/powerpoint/2010/main" val="326291708"/>
       </p:ext>
     </p:extLst>
   </p:cSld>
@@ -867,7 +883,7 @@
           <a:p>
             <a:r>
               <a:rPr lang="en-US" dirty="0"/>
-              <a:t>And here are a few more. Each of these services is configurable, and you can swap in different ones (like use MySQL as a database, and then you can experiment using PostgreSQL instead)</a:t>
+              <a:t>At its core, Lando prepackages docker images for various services and technologies. Here are a few.</a:t>
             </a:r>
           </a:p>
         </p:txBody>
@@ -889,7 +905,7 @@
           <a:p>
             <a:fld id="{07F65287-0258-BC43-8221-F86E5F96768A}" type="slidenum">
               <a:rPr lang="en-US" smtClean="0"/>
-              <a:t>13</a:t>
+              <a:t>12</a:t>
             </a:fld>
             <a:endParaRPr lang="en-US"/>
           </a:p>
@@ -898,7 +914,7 @@
     </p:spTree>
     <p:extLst>
       <p:ext uri="{BB962C8B-B14F-4D97-AF65-F5344CB8AC3E}">
-        <p14:creationId xmlns:p14="http://schemas.microsoft.com/office/powerpoint/2010/main" val="2374417366"/>
+        <p14:creationId xmlns:p14="http://schemas.microsoft.com/office/powerpoint/2010/main" val="1360150314"/>
       </p:ext>
     </p:extLst>
   </p:cSld>
@@ -954,7 +970,7 @@
           <a:p>
             <a:r>
               <a:rPr lang="en-US" dirty="0"/>
-              <a:t>The Lando docs site makes a big deal about recipes, they’re flashy and can get you going quickly, but really, most of us are going to be working on stuff that is a bit more complicated than a Drupal site. (No offense, Drupal folks). We *will* use the LAMP recipe for Omeka, and if you have a PHP app like Omeka or OJS, a Lando recipe a very fast way to get to work.</a:t>
+              <a:t>And here are a few more. Each of these services is configurable, and you can swap in different ones (like use MySQL as a database, and then you can experiment using PostgreSQL instead)</a:t>
             </a:r>
           </a:p>
         </p:txBody>
@@ -976,7 +992,7 @@
           <a:p>
             <a:fld id="{07F65287-0258-BC43-8221-F86E5F96768A}" type="slidenum">
               <a:rPr lang="en-US" smtClean="0"/>
-              <a:t>14</a:t>
+              <a:t>13</a:t>
             </a:fld>
             <a:endParaRPr lang="en-US"/>
           </a:p>
@@ -985,7 +1001,7 @@
     </p:spTree>
     <p:extLst>
       <p:ext uri="{BB962C8B-B14F-4D97-AF65-F5344CB8AC3E}">
-        <p14:creationId xmlns:p14="http://schemas.microsoft.com/office/powerpoint/2010/main" val="1141383494"/>
+        <p14:creationId xmlns:p14="http://schemas.microsoft.com/office/powerpoint/2010/main" val="2374417366"/>
       </p:ext>
     </p:extLst>
   </p:cSld>
@@ -1041,15 +1057,7 @@
           <a:p>
             <a:r>
               <a:rPr lang="en-US" dirty="0"/>
-              <a:t>Installing is easy, just download the thing, click on the thing, agree to terms. If you already have Docker and Docker-Compose installed, you don’t need to reinstall </a:t>
-            </a:r>
-            <a:r>
-              <a:rPr lang="en-US" dirty="0" err="1"/>
-              <a:t>Lando’s</a:t>
-            </a:r>
-            <a:r>
-              <a:rPr lang="en-US" dirty="0"/>
-              <a:t> versions, but do verify that the versions you are running are at least the same as what Lando wants to install. If not, you may want to upgrade your docker setup.</a:t>
+              <a:t>The Lando docs site makes a big deal about recipes, they’re flashy and can get you going quickly, but really, most of us are going to be working on stuff that is a bit more complicated than a Drupal site. (No offense, Drupal folks). We *will* use the LAMP recipe for Omeka, and IF you have a PHP app like Omeka or OJS, a Lando recipe a very fast way to get to work.</a:t>
             </a:r>
           </a:p>
         </p:txBody>
@@ -1071,7 +1079,7 @@
           <a:p>
             <a:fld id="{07F65287-0258-BC43-8221-F86E5F96768A}" type="slidenum">
               <a:rPr lang="en-US" smtClean="0"/>
-              <a:t>15</a:t>
+              <a:t>14</a:t>
             </a:fld>
             <a:endParaRPr lang="en-US"/>
           </a:p>
@@ -1080,7 +1088,7 @@
     </p:spTree>
     <p:extLst>
       <p:ext uri="{BB962C8B-B14F-4D97-AF65-F5344CB8AC3E}">
-        <p14:creationId xmlns:p14="http://schemas.microsoft.com/office/powerpoint/2010/main" val="1223936442"/>
+        <p14:creationId xmlns:p14="http://schemas.microsoft.com/office/powerpoint/2010/main" val="1141383494"/>
       </p:ext>
     </p:extLst>
   </p:cSld>
@@ -1136,15 +1144,15 @@
           <a:p>
             <a:r>
               <a:rPr lang="en-US" dirty="0"/>
-              <a:t>The </a:t>
+              <a:t>Installing is easy, just download the thing, click on the thing, agree to terms. If you already have Docker and Docker-Compose installed, you don’t need to reinstall </a:t>
             </a:r>
             <a:r>
               <a:rPr lang="en-US" dirty="0" err="1"/>
-              <a:t>Landofile</a:t>
-            </a:r>
-            <a:r>
-              <a:rPr lang="en-US" dirty="0"/>
-              <a:t> is the heart of what tells Lando what to do. It goes into your project root, next to all of your source code.</a:t>
+              <a:t>Lando’s</a:t>
+            </a:r>
+            <a:r>
+              <a:rPr lang="en-US" dirty="0"/>
+              <a:t> versions, but do verify that the versions you are running are at least the same as what Lando wants to install. If not, you may want to upgrade your docker setup.</a:t>
             </a:r>
           </a:p>
         </p:txBody>
@@ -1166,7 +1174,7 @@
           <a:p>
             <a:fld id="{07F65287-0258-BC43-8221-F86E5F96768A}" type="slidenum">
               <a:rPr lang="en-US" smtClean="0"/>
-              <a:t>16</a:t>
+              <a:t>15</a:t>
             </a:fld>
             <a:endParaRPr lang="en-US"/>
           </a:p>
@@ -1175,7 +1183,7 @@
     </p:spTree>
     <p:extLst>
       <p:ext uri="{BB962C8B-B14F-4D97-AF65-F5344CB8AC3E}">
-        <p14:creationId xmlns:p14="http://schemas.microsoft.com/office/powerpoint/2010/main" val="3625839814"/>
+        <p14:creationId xmlns:p14="http://schemas.microsoft.com/office/powerpoint/2010/main" val="1223936442"/>
       </p:ext>
     </p:extLst>
   </p:cSld>
@@ -1231,7 +1239,7 @@
           <a:p>
             <a:r>
               <a:rPr lang="en-US" dirty="0"/>
-              <a:t>This is a sketch of a </a:t>
+              <a:t>The </a:t>
             </a:r>
             <a:r>
               <a:rPr lang="en-US" dirty="0" err="1"/>
@@ -1239,31 +1247,7 @@
             </a:r>
             <a:r>
               <a:rPr lang="en-US" dirty="0"/>
-              <a:t>. It’s not complete, but gives you an idea of what one looks like. It’s </a:t>
-            </a:r>
-            <a:r>
-              <a:rPr lang="en-US" dirty="0" err="1"/>
-              <a:t>yaml</a:t>
-            </a:r>
-            <a:r>
-              <a:rPr lang="en-US" dirty="0"/>
-              <a:t>, so, you know, </a:t>
-            </a:r>
-            <a:r>
-              <a:rPr lang="en-US" dirty="0" err="1"/>
-              <a:t>gotta</a:t>
-            </a:r>
-            <a:r>
-              <a:rPr lang="en-US" dirty="0"/>
-              <a:t> start with three dashes. We’ll dig into the details through the rest of this workshop, but some things I want you to remember: you can specify environment variables in env files, you can provide as many as you need. SSH key management is mostly automatic with Lando (it copies your SSH keys for you), but you can control which key gets used by specifying it in the </a:t>
-            </a:r>
-            <a:r>
-              <a:rPr lang="en-US" dirty="0" err="1"/>
-              <a:t>Landofile</a:t>
-            </a:r>
-            <a:r>
-              <a:rPr lang="en-US" dirty="0"/>
-              <a:t>. Then you have SERVICES and TOOLING. Services are the pieces you need to develop your application. Tooling defines how you’ll interact with those services on the command line. Tooling is probably the most fun aspect of working with Lando, as the feedback loop is instantaneous. As soon as you add a new tooling config, you can use it, no reboot, no rebuild. Just dream it, write it, use it. I am skipping a few things with this sketch, such as recipe configuration. You don’t NEED to use a recipe with Lando, but I’ll show you one now.</a:t>
+              <a:t> is the heart of what tells Lando what to do. It goes into your project root, next to all of your source code.</a:t>
             </a:r>
           </a:p>
         </p:txBody>
@@ -1285,7 +1269,7 @@
           <a:p>
             <a:fld id="{07F65287-0258-BC43-8221-F86E5F96768A}" type="slidenum">
               <a:rPr lang="en-US" smtClean="0"/>
-              <a:t>17</a:t>
+              <a:t>16</a:t>
             </a:fld>
             <a:endParaRPr lang="en-US"/>
           </a:p>
@@ -1294,7 +1278,7 @@
     </p:spTree>
     <p:extLst>
       <p:ext uri="{BB962C8B-B14F-4D97-AF65-F5344CB8AC3E}">
-        <p14:creationId xmlns:p14="http://schemas.microsoft.com/office/powerpoint/2010/main" val="2212794323"/>
+        <p14:creationId xmlns:p14="http://schemas.microsoft.com/office/powerpoint/2010/main" val="3625839814"/>
       </p:ext>
     </p:extLst>
   </p:cSld>
@@ -1350,7 +1334,7 @@
           <a:p>
             <a:r>
               <a:rPr lang="en-US" dirty="0"/>
-              <a:t>Here’s a quick look at a </a:t>
+              <a:t>This is a sketch of a </a:t>
             </a:r>
             <a:r>
               <a:rPr lang="en-US" dirty="0" err="1"/>
@@ -1358,7 +1342,31 @@
             </a:r>
             <a:r>
               <a:rPr lang="en-US" dirty="0"/>
-              <a:t> that uses a recipe: this uses the Lamp recipe, so you specify what version of PHP you want to use, and what DB you want to use, and everything is auto-configured by convention. If a Lamp stack is what your app needs, this will get you going.</a:t>
+              <a:t>. It’s not complete, but gives you an idea of what one looks like. It’s </a:t>
+            </a:r>
+            <a:r>
+              <a:rPr lang="en-US" dirty="0" err="1"/>
+              <a:t>yaml</a:t>
+            </a:r>
+            <a:r>
+              <a:rPr lang="en-US" dirty="0"/>
+              <a:t>, so, you know, </a:t>
+            </a:r>
+            <a:r>
+              <a:rPr lang="en-US" dirty="0" err="1"/>
+              <a:t>gotta</a:t>
+            </a:r>
+            <a:r>
+              <a:rPr lang="en-US" dirty="0"/>
+              <a:t> start with three dashes. We’ll dig into the details through the rest of this workshop, but some things I want you to remember: you can specify environment variables in env files, you can provide as many as you need. SSH key management is mostly automatic with Lando (it copies your SSH keys for you), but you can control which key gets used by specifying it in the </a:t>
+            </a:r>
+            <a:r>
+              <a:rPr lang="en-US" dirty="0" err="1"/>
+              <a:t>Landofile</a:t>
+            </a:r>
+            <a:r>
+              <a:rPr lang="en-US" dirty="0"/>
+              <a:t>. Then you have SERVICES and TOOLING. Services are the pieces you need to develop your application. Tooling defines how you’ll interact with those services on the command line. Tooling is probably the most fun aspect of working with Lando, as the feedback loop is instantaneous. As soon as you add a new tooling config, you can use it, no reboot, no rebuild. Just dream it, write it, use it. I am skipping a few things with this sketch, such as recipe configuration. You don’t NEED to use a recipe with Lando, but I’ll show you one now.</a:t>
             </a:r>
           </a:p>
         </p:txBody>
@@ -1380,7 +1388,7 @@
           <a:p>
             <a:fld id="{07F65287-0258-BC43-8221-F86E5F96768A}" type="slidenum">
               <a:rPr lang="en-US" smtClean="0"/>
-              <a:t>18</a:t>
+              <a:t>17</a:t>
             </a:fld>
             <a:endParaRPr lang="en-US"/>
           </a:p>
@@ -1389,7 +1397,7 @@
     </p:spTree>
     <p:extLst>
       <p:ext uri="{BB962C8B-B14F-4D97-AF65-F5344CB8AC3E}">
-        <p14:creationId xmlns:p14="http://schemas.microsoft.com/office/powerpoint/2010/main" val="3778597517"/>
+        <p14:creationId xmlns:p14="http://schemas.microsoft.com/office/powerpoint/2010/main" val="2212794323"/>
       </p:ext>
     </p:extLst>
   </p:cSld>
@@ -1445,7 +1453,7 @@
           <a:p>
             <a:r>
               <a:rPr lang="en-US" dirty="0"/>
-              <a:t>After you start up Lando with your </a:t>
+              <a:t>Here’s a quick look at a </a:t>
             </a:r>
             <a:r>
               <a:rPr lang="en-US" dirty="0" err="1"/>
@@ -1453,39 +1461,7 @@
             </a:r>
             <a:r>
               <a:rPr lang="en-US" dirty="0"/>
-              <a:t> in place, what happens? I made you a Lando cheat sheet, you should check that URL and print it out, keep it handy. Thanks to the magic of Docker mounts, your </a:t>
-            </a:r>
-            <a:r>
-              <a:rPr lang="en-US" dirty="0" err="1"/>
-              <a:t>project_root</a:t>
-            </a:r>
-            <a:r>
-              <a:rPr lang="en-US" dirty="0"/>
-              <a:t> folder is mounted as /app in every service container you define in your </a:t>
-            </a:r>
-            <a:r>
-              <a:rPr lang="en-US" dirty="0" err="1"/>
-              <a:t>Landofile</a:t>
-            </a:r>
-            <a:r>
-              <a:rPr lang="en-US" dirty="0"/>
-              <a:t>. It’s in the DB, in Solr, in your </a:t>
-            </a:r>
-            <a:r>
-              <a:rPr lang="en-US" dirty="0" err="1"/>
-              <a:t>Appserver</a:t>
-            </a:r>
-            <a:r>
-              <a:rPr lang="en-US" dirty="0"/>
-              <a:t>. This is for convenience. And it *is* convenient, knowing where your application code is. So, I want you to have this mental model ready for later. Your </a:t>
-            </a:r>
-            <a:r>
-              <a:rPr lang="en-US" dirty="0" err="1"/>
-              <a:t>project_root</a:t>
-            </a:r>
-            <a:r>
-              <a:rPr lang="en-US" dirty="0"/>
-              <a:t> is at /app.</a:t>
+              <a:t> that uses a recipe: this uses the Lamp recipe, so you specify what version of PHP you want to use, and what DB you want to use, and everything is auto-configured by convention. If a Lamp stack is what your app needs, this will get you going.</a:t>
             </a:r>
           </a:p>
         </p:txBody>
@@ -1507,7 +1483,7 @@
           <a:p>
             <a:fld id="{07F65287-0258-BC43-8221-F86E5F96768A}" type="slidenum">
               <a:rPr lang="en-US" smtClean="0"/>
-              <a:t>19</a:t>
+              <a:t>18</a:t>
             </a:fld>
             <a:endParaRPr lang="en-US"/>
           </a:p>
@@ -1516,7 +1492,7 @@
     </p:spTree>
     <p:extLst>
       <p:ext uri="{BB962C8B-B14F-4D97-AF65-F5344CB8AC3E}">
-        <p14:creationId xmlns:p14="http://schemas.microsoft.com/office/powerpoint/2010/main" val="1022956409"/>
+        <p14:creationId xmlns:p14="http://schemas.microsoft.com/office/powerpoint/2010/main" val="3778597517"/>
       </p:ext>
     </p:extLst>
   </p:cSld>
@@ -1572,7 +1548,7 @@
           <a:p>
             <a:r>
               <a:rPr lang="en-US" dirty="0"/>
-              <a:t>Here’s my name dropping slide. The first two are cheating a bit, I wrote those files. I just found out that Princeton uses Lando for a project. And there’s the link to every </a:t>
+              <a:t>After you start up Lando with your </a:t>
             </a:r>
             <a:r>
               <a:rPr lang="en-US" dirty="0" err="1"/>
@@ -1580,15 +1556,39 @@
             </a:r>
             <a:r>
               <a:rPr lang="en-US" dirty="0"/>
-              <a:t> in </a:t>
+              <a:t> in place, what happens? I made you a Lando cheat sheet, you should check that URL and print it out, keep it handy. Thanks to the magic of Docker mounts, your </a:t>
             </a:r>
             <a:r>
               <a:rPr lang="en-US" dirty="0" err="1"/>
-              <a:t>Github</a:t>
-            </a:r>
-            <a:r>
-              <a:rPr lang="en-US" dirty="0"/>
-              <a:t>, if you want to explore more.</a:t>
+              <a:t>project_root</a:t>
+            </a:r>
+            <a:r>
+              <a:rPr lang="en-US" dirty="0"/>
+              <a:t> folder is mounted as /app in every service container you define in your </a:t>
+            </a:r>
+            <a:r>
+              <a:rPr lang="en-US" dirty="0" err="1"/>
+              <a:t>Landofile</a:t>
+            </a:r>
+            <a:r>
+              <a:rPr lang="en-US" dirty="0"/>
+              <a:t>. It’s in the DB, in Solr, in your </a:t>
+            </a:r>
+            <a:r>
+              <a:rPr lang="en-US" dirty="0" err="1"/>
+              <a:t>Appserver</a:t>
+            </a:r>
+            <a:r>
+              <a:rPr lang="en-US" dirty="0"/>
+              <a:t>. This is for convenience. And it *is* convenient, knowing where your application code is. So, I want you to have this mental model ready for later. Your </a:t>
+            </a:r>
+            <a:r>
+              <a:rPr lang="en-US" dirty="0" err="1"/>
+              <a:t>project_root</a:t>
+            </a:r>
+            <a:r>
+              <a:rPr lang="en-US" dirty="0"/>
+              <a:t> is at /app.</a:t>
             </a:r>
           </a:p>
         </p:txBody>
@@ -1610,7 +1610,7 @@
           <a:p>
             <a:fld id="{07F65287-0258-BC43-8221-F86E5F96768A}" type="slidenum">
               <a:rPr lang="en-US" smtClean="0"/>
-              <a:t>20</a:t>
+              <a:t>19</a:t>
             </a:fld>
             <a:endParaRPr lang="en-US"/>
           </a:p>
@@ -1619,7 +1619,7 @@
     </p:spTree>
     <p:extLst>
       <p:ext uri="{BB962C8B-B14F-4D97-AF65-F5344CB8AC3E}">
-        <p14:creationId xmlns:p14="http://schemas.microsoft.com/office/powerpoint/2010/main" val="2825404227"/>
+        <p14:creationId xmlns:p14="http://schemas.microsoft.com/office/powerpoint/2010/main" val="1022956409"/>
       </p:ext>
     </p:extLst>
   </p:cSld>
@@ -1675,7 +1675,7 @@
           <a:p>
             <a:r>
               <a:rPr lang="en-US" dirty="0"/>
-              <a:t>What kind of chaos are we talking about? With dev environments, these are the options I’ve seen in use for various projects. On the left of the yarn, we have more ordered options, on the right, less so. I’m biased, so I put Lando at the base of the ordered side.</a:t>
+              <a:t>I promise I’m not going to fill this workshop with heavy quotes from computer science classics, but I *did* want to explain the title of the workshop a bit, because it’s important to me. ”Bringing Order to Chaos” is the title of the section from which I pulled this quote. “When designing a complex software system, it is essential to decompose it into smaller and smaller parts, each of which we may then refine independently... To understand any given level of a system, we need only comprehend a few parts (rather than all parts) at once.” Smaller and smaller parts, and you need only comprehend each part, rather than everything at once.</a:t>
             </a:r>
           </a:p>
         </p:txBody>
@@ -1697,7 +1697,7 @@
           <a:p>
             <a:fld id="{07F65287-0258-BC43-8221-F86E5F96768A}" type="slidenum">
               <a:rPr lang="en-US" smtClean="0"/>
-              <a:t>3</a:t>
+              <a:t>2</a:t>
             </a:fld>
             <a:endParaRPr lang="en-US"/>
           </a:p>
@@ -1706,7 +1706,7 @@
     </p:spTree>
     <p:extLst>
       <p:ext uri="{BB962C8B-B14F-4D97-AF65-F5344CB8AC3E}">
-        <p14:creationId xmlns:p14="http://schemas.microsoft.com/office/powerpoint/2010/main" val="1892846666"/>
+        <p14:creationId xmlns:p14="http://schemas.microsoft.com/office/powerpoint/2010/main" val="1418658710"/>
       </p:ext>
     </p:extLst>
   </p:cSld>
@@ -1762,7 +1762,23 @@
           <a:p>
             <a:r>
               <a:rPr lang="en-US" dirty="0"/>
-              <a:t>OK, before I do a demo of Lando, any questions? Do we need a quick break?</a:t>
+              <a:t>Here’s my name-dropping slide. The first two are cheating a bit, *I* wrote those files. I just found out that Princeton uses Lando for a project. The Valkyrie project uses Lando. And there’s the link to every </a:t>
+            </a:r>
+            <a:r>
+              <a:rPr lang="en-US" dirty="0" err="1"/>
+              <a:t>Landofile</a:t>
+            </a:r>
+            <a:r>
+              <a:rPr lang="en-US" dirty="0"/>
+              <a:t> in </a:t>
+            </a:r>
+            <a:r>
+              <a:rPr lang="en-US" dirty="0" err="1"/>
+              <a:t>Github</a:t>
+            </a:r>
+            <a:r>
+              <a:rPr lang="en-US" dirty="0"/>
+              <a:t>, if you want to explore more.</a:t>
             </a:r>
           </a:p>
         </p:txBody>
@@ -1784,7 +1800,7 @@
           <a:p>
             <a:fld id="{07F65287-0258-BC43-8221-F86E5F96768A}" type="slidenum">
               <a:rPr lang="en-US" smtClean="0"/>
-              <a:t>21</a:t>
+              <a:t>20</a:t>
             </a:fld>
             <a:endParaRPr lang="en-US"/>
           </a:p>
@@ -1793,7 +1809,7 @@
     </p:spTree>
     <p:extLst>
       <p:ext uri="{BB962C8B-B14F-4D97-AF65-F5344CB8AC3E}">
-        <p14:creationId xmlns:p14="http://schemas.microsoft.com/office/powerpoint/2010/main" val="1324921279"/>
+        <p14:creationId xmlns:p14="http://schemas.microsoft.com/office/powerpoint/2010/main" val="2825404227"/>
       </p:ext>
     </p:extLst>
   </p:cSld>
@@ -1849,23 +1865,7 @@
           <a:p>
             <a:r>
               <a:rPr lang="en-US" dirty="0"/>
-              <a:t>Here’s a quick demo of Lando, to give you an idea of what working with it is like. I will use the environment I created to work on </a:t>
-            </a:r>
-            <a:r>
-              <a:rPr lang="en-US" dirty="0" err="1"/>
-              <a:t>Jschol</a:t>
-            </a:r>
-            <a:r>
-              <a:rPr lang="en-US" dirty="0"/>
-              <a:t>, which is the main UI for </a:t>
-            </a:r>
-            <a:r>
-              <a:rPr lang="en-US" dirty="0" err="1"/>
-              <a:t>eScholarship</a:t>
-            </a:r>
-            <a:r>
-              <a:rPr lang="en-US" dirty="0"/>
-              <a:t>, CDL’s portal to IR and Journal content. </a:t>
+              <a:t>OK, before I do a demo of Lando, any questions? Do we need a quick break?</a:t>
             </a:r>
           </a:p>
         </p:txBody>
@@ -1887,7 +1887,7 @@
           <a:p>
             <a:fld id="{07F65287-0258-BC43-8221-F86E5F96768A}" type="slidenum">
               <a:rPr lang="en-US" smtClean="0"/>
-              <a:t>22</a:t>
+              <a:t>21</a:t>
             </a:fld>
             <a:endParaRPr lang="en-US"/>
           </a:p>
@@ -1896,7 +1896,7 @@
     </p:spTree>
     <p:extLst>
       <p:ext uri="{BB962C8B-B14F-4D97-AF65-F5344CB8AC3E}">
-        <p14:creationId xmlns:p14="http://schemas.microsoft.com/office/powerpoint/2010/main" val="453976422"/>
+        <p14:creationId xmlns:p14="http://schemas.microsoft.com/office/powerpoint/2010/main" val="1324921279"/>
       </p:ext>
     </p:extLst>
   </p:cSld>
@@ -1952,7 +1952,23 @@
           <a:p>
             <a:r>
               <a:rPr lang="en-US" dirty="0"/>
-              <a:t>Any questions? Do we need a break before we start working on stuff together?</a:t>
+              <a:t>Here’s a quick demo of Lando, to give you an idea of what working with it is like. I will use the environment I created to work on </a:t>
+            </a:r>
+            <a:r>
+              <a:rPr lang="en-US" dirty="0" err="1"/>
+              <a:t>Jschol</a:t>
+            </a:r>
+            <a:r>
+              <a:rPr lang="en-US" dirty="0"/>
+              <a:t>, which is the main UI for </a:t>
+            </a:r>
+            <a:r>
+              <a:rPr lang="en-US" dirty="0" err="1"/>
+              <a:t>eScholarship</a:t>
+            </a:r>
+            <a:r>
+              <a:rPr lang="en-US" dirty="0"/>
+              <a:t>, CDL’s portal to IR and Journal content. </a:t>
             </a:r>
           </a:p>
         </p:txBody>
@@ -1974,7 +1990,7 @@
           <a:p>
             <a:fld id="{07F65287-0258-BC43-8221-F86E5F96768A}" type="slidenum">
               <a:rPr lang="en-US" smtClean="0"/>
-              <a:t>23</a:t>
+              <a:t>22</a:t>
             </a:fld>
             <a:endParaRPr lang="en-US"/>
           </a:p>
@@ -1983,7 +1999,7 @@
     </p:spTree>
     <p:extLst>
       <p:ext uri="{BB962C8B-B14F-4D97-AF65-F5344CB8AC3E}">
-        <p14:creationId xmlns:p14="http://schemas.microsoft.com/office/powerpoint/2010/main" val="3378653353"/>
+        <p14:creationId xmlns:p14="http://schemas.microsoft.com/office/powerpoint/2010/main" val="453976422"/>
       </p:ext>
     </p:extLst>
   </p:cSld>
@@ -2037,403 +2053,10 @@
           <a:bodyPr/>
           <a:lstStyle/>
           <a:p>
-            <a:pPr marL="0" marR="0" lvl="0" indent="0" algn="l" defTabSz="914400" rtl="0" eaLnBrk="1" fontAlgn="auto" latinLnBrk="0" hangingPunct="1">
-              <a:lnSpc>
-                <a:spcPct val="100000"/>
-              </a:lnSpc>
-              <a:spcBef>
-                <a:spcPts val="0"/>
-              </a:spcBef>
-              <a:spcAft>
-                <a:spcPts val="0"/>
-              </a:spcAft>
-              <a:buClrTx/>
-              <a:buSzTx/>
-              <a:buFontTx/>
-              <a:buNone/>
-              <a:tabLst/>
-              <a:defRPr/>
-            </a:pPr>
-            <a:r>
-              <a:rPr lang="en-US" dirty="0"/>
-              <a:t>A database is often the heart of our applications, and this is a great way to get a feel for how Lando works. You also end up with something you can use: a copy of your production data, running locally on your notebook. Where you can run whatever unsafe query or update your heart might desire.</a:t>
-            </a:r>
-            <a:br>
-              <a:rPr lang="en-US" dirty="0"/>
-            </a:br>
-            <a:endParaRPr lang="en-US" dirty="0"/>
-          </a:p>
-          <a:p>
-            <a:pPr marL="0" marR="0" lvl="0" indent="0" algn="l" defTabSz="914400" rtl="0" eaLnBrk="1" fontAlgn="auto" latinLnBrk="0" hangingPunct="1">
-              <a:lnSpc>
-                <a:spcPct val="100000"/>
-              </a:lnSpc>
-              <a:spcBef>
-                <a:spcPts val="0"/>
-              </a:spcBef>
-              <a:spcAft>
-                <a:spcPts val="0"/>
-              </a:spcAft>
-              <a:buClrTx/>
-              <a:buSzTx/>
-              <a:buFontTx/>
-              <a:buNone/>
-              <a:tabLst/>
-              <a:defRPr/>
-            </a:pPr>
-            <a:r>
-              <a:rPr lang="en-US" dirty="0"/>
-              <a:t>Workshop link: https://</a:t>
-            </a:r>
-            <a:r>
-              <a:rPr lang="en-US" dirty="0" err="1"/>
-              <a:t>git.io</a:t>
-            </a:r>
-            <a:r>
-              <a:rPr lang="en-US" dirty="0"/>
-              <a:t>/</a:t>
-            </a:r>
-            <a:r>
-              <a:rPr lang="en-US" dirty="0" err="1"/>
-              <a:t>JqLaG</a:t>
-            </a:r>
-            <a:br>
-              <a:rPr lang="en-US" dirty="0"/>
-            </a:br>
-            <a:r>
-              <a:rPr lang="en-US" dirty="0"/>
-              <a:t>Exercise link: </a:t>
-            </a:r>
-            <a:r>
-              <a:rPr lang="en-US" sz="1200" dirty="0"/>
-              <a:t>https://</a:t>
-            </a:r>
-            <a:r>
-              <a:rPr lang="en-US" sz="1200" dirty="0" err="1"/>
-              <a:t>git.io</a:t>
-            </a:r>
-            <a:r>
-              <a:rPr lang="en-US" sz="1200" dirty="0"/>
-              <a:t>/Jm1Uv</a:t>
-            </a:r>
-          </a:p>
-          <a:p>
-            <a:pPr marL="0" marR="0" lvl="0" indent="0" algn="l" defTabSz="914400" rtl="0" eaLnBrk="1" fontAlgn="auto" latinLnBrk="0" hangingPunct="1">
-              <a:lnSpc>
-                <a:spcPct val="100000"/>
-              </a:lnSpc>
-              <a:spcBef>
-                <a:spcPts val="0"/>
-              </a:spcBef>
-              <a:spcAft>
-                <a:spcPts val="0"/>
-              </a:spcAft>
-              <a:buClrTx/>
-              <a:buSzTx/>
-              <a:buFontTx/>
-              <a:buNone/>
-              <a:tabLst/>
-              <a:defRPr/>
-            </a:pPr>
-            <a:endParaRPr lang="en-US" dirty="0"/>
-          </a:p>
-          <a:p>
-            <a:pPr marL="0" marR="0" lvl="0" indent="0" algn="l" defTabSz="914400" rtl="0" eaLnBrk="1" fontAlgn="auto" latinLnBrk="0" hangingPunct="1">
-              <a:lnSpc>
-                <a:spcPct val="100000"/>
-              </a:lnSpc>
-              <a:spcBef>
-                <a:spcPts val="0"/>
-              </a:spcBef>
-              <a:spcAft>
-                <a:spcPts val="0"/>
-              </a:spcAft>
-              <a:buClrTx/>
-              <a:buSzTx/>
-              <a:buFontTx/>
-              <a:buNone/>
-              <a:tabLst/>
-              <a:defRPr/>
-            </a:pPr>
-            <a:r>
-              <a:rPr lang="en-US" dirty="0"/>
-              <a:t>1. Download a sample database</a:t>
-            </a:r>
-          </a:p>
-          <a:p>
-            <a:pPr marL="0" marR="0" lvl="0" indent="0" algn="l" defTabSz="914400" rtl="0" eaLnBrk="1" fontAlgn="auto" latinLnBrk="0" hangingPunct="1">
-              <a:lnSpc>
-                <a:spcPct val="100000"/>
-              </a:lnSpc>
-              <a:spcBef>
-                <a:spcPts val="0"/>
-              </a:spcBef>
-              <a:spcAft>
-                <a:spcPts val="0"/>
-              </a:spcAft>
-              <a:buClrTx/>
-              <a:buSzTx/>
-              <a:buFontTx/>
-              <a:buNone/>
-              <a:tabLst/>
-              <a:defRPr/>
-            </a:pPr>
-            <a:r>
-              <a:rPr lang="en-US" dirty="0"/>
-              <a:t>2. </a:t>
-            </a:r>
-            <a:r>
-              <a:rPr lang="en-US" dirty="0" err="1"/>
-              <a:t>lando</a:t>
-            </a:r>
-            <a:r>
-              <a:rPr lang="en-US" dirty="0"/>
-              <a:t> </a:t>
-            </a:r>
-            <a:r>
-              <a:rPr lang="en-US" dirty="0" err="1"/>
-              <a:t>init</a:t>
-            </a:r>
-            <a:r>
-              <a:rPr lang="en-US" dirty="0"/>
-              <a:t> –full</a:t>
-            </a:r>
-          </a:p>
-          <a:p>
-            <a:pPr marL="0" marR="0" lvl="0" indent="0" algn="l" defTabSz="914400" rtl="0" eaLnBrk="1" fontAlgn="auto" latinLnBrk="0" hangingPunct="1">
-              <a:lnSpc>
-                <a:spcPct val="100000"/>
-              </a:lnSpc>
-              <a:spcBef>
-                <a:spcPts val="0"/>
-              </a:spcBef>
-              <a:spcAft>
-                <a:spcPts val="0"/>
-              </a:spcAft>
-              <a:buClrTx/>
-              <a:buSzTx/>
-              <a:buFontTx/>
-              <a:buNone/>
-              <a:tabLst/>
-              <a:defRPr/>
-            </a:pPr>
-            <a:r>
-              <a:rPr lang="en-US" dirty="0"/>
-              <a:t>3. Delete the PHP stuff</a:t>
-            </a:r>
-          </a:p>
-          <a:p>
-            <a:pPr marL="0" marR="0" lvl="0" indent="0" algn="l" defTabSz="914400" rtl="0" eaLnBrk="1" fontAlgn="auto" latinLnBrk="0" hangingPunct="1">
-              <a:lnSpc>
-                <a:spcPct val="100000"/>
-              </a:lnSpc>
-              <a:spcBef>
-                <a:spcPts val="0"/>
-              </a:spcBef>
-              <a:spcAft>
-                <a:spcPts val="0"/>
-              </a:spcAft>
-              <a:buClrTx/>
-              <a:buSzTx/>
-              <a:buFontTx/>
-              <a:buNone/>
-              <a:tabLst/>
-              <a:defRPr/>
-            </a:pPr>
-            <a:r>
-              <a:rPr lang="en-US" dirty="0"/>
-              <a:t>4. Change </a:t>
-            </a:r>
-            <a:r>
-              <a:rPr lang="en-US" dirty="0" err="1"/>
-              <a:t>portforward</a:t>
-            </a:r>
-            <a:r>
-              <a:rPr lang="en-US" dirty="0"/>
-              <a:t> to 3306</a:t>
-            </a:r>
-          </a:p>
-          <a:p>
-            <a:pPr marL="0" marR="0" lvl="0" indent="0" algn="l" defTabSz="914400" rtl="0" eaLnBrk="1" fontAlgn="auto" latinLnBrk="0" hangingPunct="1">
-              <a:lnSpc>
-                <a:spcPct val="100000"/>
-              </a:lnSpc>
-              <a:spcBef>
-                <a:spcPts val="0"/>
-              </a:spcBef>
-              <a:spcAft>
-                <a:spcPts val="0"/>
-              </a:spcAft>
-              <a:buClrTx/>
-              <a:buSzTx/>
-              <a:buFontTx/>
-              <a:buNone/>
-              <a:tabLst/>
-              <a:defRPr/>
-            </a:pPr>
-            <a:r>
-              <a:rPr lang="en-US" dirty="0"/>
-              <a:t>5. Lando </a:t>
-            </a:r>
-            <a:r>
-              <a:rPr lang="en-US" dirty="0" err="1"/>
-              <a:t>poweroff</a:t>
-            </a:r>
-            <a:endParaRPr lang="en-US" dirty="0"/>
-          </a:p>
-          <a:p>
-            <a:pPr marL="0" marR="0" lvl="0" indent="0" algn="l" defTabSz="914400" rtl="0" eaLnBrk="1" fontAlgn="auto" latinLnBrk="0" hangingPunct="1">
-              <a:lnSpc>
-                <a:spcPct val="100000"/>
-              </a:lnSpc>
-              <a:spcBef>
-                <a:spcPts val="0"/>
-              </a:spcBef>
-              <a:spcAft>
-                <a:spcPts val="0"/>
-              </a:spcAft>
-              <a:buClrTx/>
-              <a:buSzTx/>
-              <a:buFontTx/>
-              <a:buNone/>
-              <a:tabLst/>
-              <a:defRPr/>
-            </a:pPr>
-            <a:r>
-              <a:rPr lang="en-US" dirty="0"/>
-              <a:t>6. Lando rebuild</a:t>
-            </a:r>
-          </a:p>
-          <a:p>
-            <a:pPr marL="0" marR="0" lvl="0" indent="0" algn="l" defTabSz="914400" rtl="0" eaLnBrk="1" fontAlgn="auto" latinLnBrk="0" hangingPunct="1">
-              <a:lnSpc>
-                <a:spcPct val="100000"/>
-              </a:lnSpc>
-              <a:spcBef>
-                <a:spcPts val="0"/>
-              </a:spcBef>
-              <a:spcAft>
-                <a:spcPts val="0"/>
-              </a:spcAft>
-              <a:buClrTx/>
-              <a:buSzTx/>
-              <a:buFontTx/>
-              <a:buNone/>
-              <a:tabLst/>
-              <a:defRPr/>
-            </a:pPr>
-            <a:r>
-              <a:rPr lang="en-US" dirty="0"/>
-              <a:t>7. Lando </a:t>
-            </a:r>
-            <a:r>
-              <a:rPr lang="en-US" dirty="0" err="1"/>
-              <a:t>db</a:t>
-            </a:r>
-            <a:r>
-              <a:rPr lang="en-US" dirty="0"/>
-              <a:t>-import</a:t>
-            </a:r>
-          </a:p>
-          <a:p>
-            <a:pPr marL="0" marR="0" lvl="0" indent="0" algn="l" defTabSz="914400" rtl="0" eaLnBrk="1" fontAlgn="auto" latinLnBrk="0" hangingPunct="1">
-              <a:lnSpc>
-                <a:spcPct val="100000"/>
-              </a:lnSpc>
-              <a:spcBef>
-                <a:spcPts val="0"/>
-              </a:spcBef>
-              <a:spcAft>
-                <a:spcPts val="0"/>
-              </a:spcAft>
-              <a:buClrTx/>
-              <a:buSzTx/>
-              <a:buFontTx/>
-              <a:buNone/>
-              <a:tabLst/>
-              <a:defRPr/>
-            </a:pPr>
-            <a:r>
-              <a:rPr lang="en-US" dirty="0"/>
-              <a:t>8. Lando </a:t>
-            </a:r>
-            <a:r>
-              <a:rPr lang="en-US" dirty="0" err="1"/>
-              <a:t>mysql</a:t>
-            </a:r>
-            <a:endParaRPr lang="en-US" dirty="0"/>
-          </a:p>
-          <a:p>
-            <a:pPr marL="0" marR="0" lvl="0" indent="0" algn="l" defTabSz="914400" rtl="0" eaLnBrk="1" fontAlgn="auto" latinLnBrk="0" hangingPunct="1">
-              <a:lnSpc>
-                <a:spcPct val="100000"/>
-              </a:lnSpc>
-              <a:spcBef>
-                <a:spcPts val="0"/>
-              </a:spcBef>
-              <a:spcAft>
-                <a:spcPts val="0"/>
-              </a:spcAft>
-              <a:buClrTx/>
-              <a:buSzTx/>
-              <a:buFontTx/>
-              <a:buNone/>
-              <a:tabLst/>
-              <a:defRPr/>
-            </a:pPr>
-            <a:r>
-              <a:rPr lang="en-US" dirty="0"/>
-              <a:t>9. Destroy some stuff</a:t>
-            </a:r>
-          </a:p>
-          <a:p>
-            <a:pPr marL="0" marR="0" lvl="0" indent="0" algn="l" defTabSz="914400" rtl="0" eaLnBrk="1" fontAlgn="auto" latinLnBrk="0" hangingPunct="1">
-              <a:lnSpc>
-                <a:spcPct val="100000"/>
-              </a:lnSpc>
-              <a:spcBef>
-                <a:spcPts val="0"/>
-              </a:spcBef>
-              <a:spcAft>
-                <a:spcPts val="0"/>
-              </a:spcAft>
-              <a:buClrTx/>
-              <a:buSzTx/>
-              <a:buFontTx/>
-              <a:buNone/>
-              <a:tabLst/>
-              <a:defRPr/>
-            </a:pPr>
-            <a:r>
-              <a:rPr lang="en-US" dirty="0"/>
-              <a:t>10. Rebuild the environment</a:t>
-            </a:r>
-          </a:p>
-          <a:p>
-            <a:pPr marL="0" marR="0" lvl="0" indent="0" algn="l" defTabSz="914400" rtl="0" eaLnBrk="1" fontAlgn="auto" latinLnBrk="0" hangingPunct="1">
-              <a:lnSpc>
-                <a:spcPct val="100000"/>
-              </a:lnSpc>
-              <a:spcBef>
-                <a:spcPts val="0"/>
-              </a:spcBef>
-              <a:spcAft>
-                <a:spcPts val="0"/>
-              </a:spcAft>
-              <a:buClrTx/>
-              <a:buSzTx/>
-              <a:buFontTx/>
-              <a:buNone/>
-              <a:tabLst/>
-              <a:defRPr/>
-            </a:pPr>
-            <a:r>
-              <a:rPr lang="en-US" dirty="0"/>
-              <a:t>11. Extra Credit: add PhpMyAdmin</a:t>
-            </a:r>
-          </a:p>
-          <a:p>
-            <a:endParaRPr lang="en-US" dirty="0"/>
+            <a:r>
+              <a:rPr lang="en-US" dirty="0"/>
+              <a:t>Any questions? Do we need a break before we start working on stuff together?</a:t>
+            </a:r>
           </a:p>
         </p:txBody>
       </p:sp>
@@ -2454,7 +2077,7 @@
           <a:p>
             <a:fld id="{07F65287-0258-BC43-8221-F86E5F96768A}" type="slidenum">
               <a:rPr lang="en-US" smtClean="0"/>
-              <a:t>24</a:t>
+              <a:t>23</a:t>
             </a:fld>
             <a:endParaRPr lang="en-US"/>
           </a:p>
@@ -2463,7 +2086,7 @@
     </p:spTree>
     <p:extLst>
       <p:ext uri="{BB962C8B-B14F-4D97-AF65-F5344CB8AC3E}">
-        <p14:creationId xmlns:p14="http://schemas.microsoft.com/office/powerpoint/2010/main" val="1904307631"/>
+        <p14:creationId xmlns:p14="http://schemas.microsoft.com/office/powerpoint/2010/main" val="3378653353"/>
       </p:ext>
     </p:extLst>
   </p:cSld>
@@ -2517,10 +2140,403 @@
           <a:bodyPr/>
           <a:lstStyle/>
           <a:p>
-            <a:r>
-              <a:rPr lang="en-US" dirty="0"/>
-              <a:t>Any questions? Do we need a quick break?</a:t>
-            </a:r>
+            <a:pPr marL="0" marR="0" lvl="0" indent="0" algn="l" defTabSz="914400" rtl="0" eaLnBrk="1" fontAlgn="auto" latinLnBrk="0" hangingPunct="1">
+              <a:lnSpc>
+                <a:spcPct val="100000"/>
+              </a:lnSpc>
+              <a:spcBef>
+                <a:spcPts val="0"/>
+              </a:spcBef>
+              <a:spcAft>
+                <a:spcPts val="0"/>
+              </a:spcAft>
+              <a:buClrTx/>
+              <a:buSzTx/>
+              <a:buFontTx/>
+              <a:buNone/>
+              <a:tabLst/>
+              <a:defRPr/>
+            </a:pPr>
+            <a:r>
+              <a:rPr lang="en-US" dirty="0"/>
+              <a:t>A database is often the heart of our applications, and this is a great way to get a feel for how Lando works. You also end up with something you can use: a copy of your production data, running locally on your notebook. Where you can run whatever unsafe query or update your heart might desire.</a:t>
+            </a:r>
+            <a:br>
+              <a:rPr lang="en-US" dirty="0"/>
+            </a:br>
+            <a:endParaRPr lang="en-US" dirty="0"/>
+          </a:p>
+          <a:p>
+            <a:pPr marL="0" marR="0" lvl="0" indent="0" algn="l" defTabSz="914400" rtl="0" eaLnBrk="1" fontAlgn="auto" latinLnBrk="0" hangingPunct="1">
+              <a:lnSpc>
+                <a:spcPct val="100000"/>
+              </a:lnSpc>
+              <a:spcBef>
+                <a:spcPts val="0"/>
+              </a:spcBef>
+              <a:spcAft>
+                <a:spcPts val="0"/>
+              </a:spcAft>
+              <a:buClrTx/>
+              <a:buSzTx/>
+              <a:buFontTx/>
+              <a:buNone/>
+              <a:tabLst/>
+              <a:defRPr/>
+            </a:pPr>
+            <a:r>
+              <a:rPr lang="en-US" dirty="0"/>
+              <a:t>Workshop link: https://</a:t>
+            </a:r>
+            <a:r>
+              <a:rPr lang="en-US" dirty="0" err="1"/>
+              <a:t>git.io</a:t>
+            </a:r>
+            <a:r>
+              <a:rPr lang="en-US" dirty="0"/>
+              <a:t>/</a:t>
+            </a:r>
+            <a:r>
+              <a:rPr lang="en-US" dirty="0" err="1"/>
+              <a:t>JqLaG</a:t>
+            </a:r>
+            <a:br>
+              <a:rPr lang="en-US" dirty="0"/>
+            </a:br>
+            <a:r>
+              <a:rPr lang="en-US" dirty="0"/>
+              <a:t>Exercise link: </a:t>
+            </a:r>
+            <a:r>
+              <a:rPr lang="en-US" sz="1200" dirty="0"/>
+              <a:t>https://</a:t>
+            </a:r>
+            <a:r>
+              <a:rPr lang="en-US" sz="1200" dirty="0" err="1"/>
+              <a:t>git.io</a:t>
+            </a:r>
+            <a:r>
+              <a:rPr lang="en-US" sz="1200" dirty="0"/>
+              <a:t>/Jm1Uv</a:t>
+            </a:r>
+          </a:p>
+          <a:p>
+            <a:pPr marL="0" marR="0" lvl="0" indent="0" algn="l" defTabSz="914400" rtl="0" eaLnBrk="1" fontAlgn="auto" latinLnBrk="0" hangingPunct="1">
+              <a:lnSpc>
+                <a:spcPct val="100000"/>
+              </a:lnSpc>
+              <a:spcBef>
+                <a:spcPts val="0"/>
+              </a:spcBef>
+              <a:spcAft>
+                <a:spcPts val="0"/>
+              </a:spcAft>
+              <a:buClrTx/>
+              <a:buSzTx/>
+              <a:buFontTx/>
+              <a:buNone/>
+              <a:tabLst/>
+              <a:defRPr/>
+            </a:pPr>
+            <a:endParaRPr lang="en-US" dirty="0"/>
+          </a:p>
+          <a:p>
+            <a:pPr marL="0" marR="0" lvl="0" indent="0" algn="l" defTabSz="914400" rtl="0" eaLnBrk="1" fontAlgn="auto" latinLnBrk="0" hangingPunct="1">
+              <a:lnSpc>
+                <a:spcPct val="100000"/>
+              </a:lnSpc>
+              <a:spcBef>
+                <a:spcPts val="0"/>
+              </a:spcBef>
+              <a:spcAft>
+                <a:spcPts val="0"/>
+              </a:spcAft>
+              <a:buClrTx/>
+              <a:buSzTx/>
+              <a:buFontTx/>
+              <a:buNone/>
+              <a:tabLst/>
+              <a:defRPr/>
+            </a:pPr>
+            <a:r>
+              <a:rPr lang="en-US" dirty="0"/>
+              <a:t>1. Download a sample database</a:t>
+            </a:r>
+          </a:p>
+          <a:p>
+            <a:pPr marL="0" marR="0" lvl="0" indent="0" algn="l" defTabSz="914400" rtl="0" eaLnBrk="1" fontAlgn="auto" latinLnBrk="0" hangingPunct="1">
+              <a:lnSpc>
+                <a:spcPct val="100000"/>
+              </a:lnSpc>
+              <a:spcBef>
+                <a:spcPts val="0"/>
+              </a:spcBef>
+              <a:spcAft>
+                <a:spcPts val="0"/>
+              </a:spcAft>
+              <a:buClrTx/>
+              <a:buSzTx/>
+              <a:buFontTx/>
+              <a:buNone/>
+              <a:tabLst/>
+              <a:defRPr/>
+            </a:pPr>
+            <a:r>
+              <a:rPr lang="en-US" dirty="0"/>
+              <a:t>2. </a:t>
+            </a:r>
+            <a:r>
+              <a:rPr lang="en-US" dirty="0" err="1"/>
+              <a:t>lando</a:t>
+            </a:r>
+            <a:r>
+              <a:rPr lang="en-US" dirty="0"/>
+              <a:t> </a:t>
+            </a:r>
+            <a:r>
+              <a:rPr lang="en-US" dirty="0" err="1"/>
+              <a:t>init</a:t>
+            </a:r>
+            <a:r>
+              <a:rPr lang="en-US" dirty="0"/>
+              <a:t> –full</a:t>
+            </a:r>
+          </a:p>
+          <a:p>
+            <a:pPr marL="0" marR="0" lvl="0" indent="0" algn="l" defTabSz="914400" rtl="0" eaLnBrk="1" fontAlgn="auto" latinLnBrk="0" hangingPunct="1">
+              <a:lnSpc>
+                <a:spcPct val="100000"/>
+              </a:lnSpc>
+              <a:spcBef>
+                <a:spcPts val="0"/>
+              </a:spcBef>
+              <a:spcAft>
+                <a:spcPts val="0"/>
+              </a:spcAft>
+              <a:buClrTx/>
+              <a:buSzTx/>
+              <a:buFontTx/>
+              <a:buNone/>
+              <a:tabLst/>
+              <a:defRPr/>
+            </a:pPr>
+            <a:r>
+              <a:rPr lang="en-US" dirty="0"/>
+              <a:t>3. Delete the PHP stuff</a:t>
+            </a:r>
+          </a:p>
+          <a:p>
+            <a:pPr marL="0" marR="0" lvl="0" indent="0" algn="l" defTabSz="914400" rtl="0" eaLnBrk="1" fontAlgn="auto" latinLnBrk="0" hangingPunct="1">
+              <a:lnSpc>
+                <a:spcPct val="100000"/>
+              </a:lnSpc>
+              <a:spcBef>
+                <a:spcPts val="0"/>
+              </a:spcBef>
+              <a:spcAft>
+                <a:spcPts val="0"/>
+              </a:spcAft>
+              <a:buClrTx/>
+              <a:buSzTx/>
+              <a:buFontTx/>
+              <a:buNone/>
+              <a:tabLst/>
+              <a:defRPr/>
+            </a:pPr>
+            <a:r>
+              <a:rPr lang="en-US" dirty="0"/>
+              <a:t>4. Change </a:t>
+            </a:r>
+            <a:r>
+              <a:rPr lang="en-US" dirty="0" err="1"/>
+              <a:t>portforward</a:t>
+            </a:r>
+            <a:r>
+              <a:rPr lang="en-US" dirty="0"/>
+              <a:t> to 3306</a:t>
+            </a:r>
+          </a:p>
+          <a:p>
+            <a:pPr marL="0" marR="0" lvl="0" indent="0" algn="l" defTabSz="914400" rtl="0" eaLnBrk="1" fontAlgn="auto" latinLnBrk="0" hangingPunct="1">
+              <a:lnSpc>
+                <a:spcPct val="100000"/>
+              </a:lnSpc>
+              <a:spcBef>
+                <a:spcPts val="0"/>
+              </a:spcBef>
+              <a:spcAft>
+                <a:spcPts val="0"/>
+              </a:spcAft>
+              <a:buClrTx/>
+              <a:buSzTx/>
+              <a:buFontTx/>
+              <a:buNone/>
+              <a:tabLst/>
+              <a:defRPr/>
+            </a:pPr>
+            <a:r>
+              <a:rPr lang="en-US" dirty="0"/>
+              <a:t>5. Lando </a:t>
+            </a:r>
+            <a:r>
+              <a:rPr lang="en-US" dirty="0" err="1"/>
+              <a:t>poweroff</a:t>
+            </a:r>
+            <a:endParaRPr lang="en-US" dirty="0"/>
+          </a:p>
+          <a:p>
+            <a:pPr marL="0" marR="0" lvl="0" indent="0" algn="l" defTabSz="914400" rtl="0" eaLnBrk="1" fontAlgn="auto" latinLnBrk="0" hangingPunct="1">
+              <a:lnSpc>
+                <a:spcPct val="100000"/>
+              </a:lnSpc>
+              <a:spcBef>
+                <a:spcPts val="0"/>
+              </a:spcBef>
+              <a:spcAft>
+                <a:spcPts val="0"/>
+              </a:spcAft>
+              <a:buClrTx/>
+              <a:buSzTx/>
+              <a:buFontTx/>
+              <a:buNone/>
+              <a:tabLst/>
+              <a:defRPr/>
+            </a:pPr>
+            <a:r>
+              <a:rPr lang="en-US" dirty="0"/>
+              <a:t>6. Lando rebuild</a:t>
+            </a:r>
+          </a:p>
+          <a:p>
+            <a:pPr marL="0" marR="0" lvl="0" indent="0" algn="l" defTabSz="914400" rtl="0" eaLnBrk="1" fontAlgn="auto" latinLnBrk="0" hangingPunct="1">
+              <a:lnSpc>
+                <a:spcPct val="100000"/>
+              </a:lnSpc>
+              <a:spcBef>
+                <a:spcPts val="0"/>
+              </a:spcBef>
+              <a:spcAft>
+                <a:spcPts val="0"/>
+              </a:spcAft>
+              <a:buClrTx/>
+              <a:buSzTx/>
+              <a:buFontTx/>
+              <a:buNone/>
+              <a:tabLst/>
+              <a:defRPr/>
+            </a:pPr>
+            <a:r>
+              <a:rPr lang="en-US" dirty="0"/>
+              <a:t>7. Lando </a:t>
+            </a:r>
+            <a:r>
+              <a:rPr lang="en-US" dirty="0" err="1"/>
+              <a:t>db</a:t>
+            </a:r>
+            <a:r>
+              <a:rPr lang="en-US" dirty="0"/>
+              <a:t>-import</a:t>
+            </a:r>
+          </a:p>
+          <a:p>
+            <a:pPr marL="0" marR="0" lvl="0" indent="0" algn="l" defTabSz="914400" rtl="0" eaLnBrk="1" fontAlgn="auto" latinLnBrk="0" hangingPunct="1">
+              <a:lnSpc>
+                <a:spcPct val="100000"/>
+              </a:lnSpc>
+              <a:spcBef>
+                <a:spcPts val="0"/>
+              </a:spcBef>
+              <a:spcAft>
+                <a:spcPts val="0"/>
+              </a:spcAft>
+              <a:buClrTx/>
+              <a:buSzTx/>
+              <a:buFontTx/>
+              <a:buNone/>
+              <a:tabLst/>
+              <a:defRPr/>
+            </a:pPr>
+            <a:r>
+              <a:rPr lang="en-US" dirty="0"/>
+              <a:t>8. Lando </a:t>
+            </a:r>
+            <a:r>
+              <a:rPr lang="en-US" dirty="0" err="1"/>
+              <a:t>mysql</a:t>
+            </a:r>
+            <a:endParaRPr lang="en-US" dirty="0"/>
+          </a:p>
+          <a:p>
+            <a:pPr marL="0" marR="0" lvl="0" indent="0" algn="l" defTabSz="914400" rtl="0" eaLnBrk="1" fontAlgn="auto" latinLnBrk="0" hangingPunct="1">
+              <a:lnSpc>
+                <a:spcPct val="100000"/>
+              </a:lnSpc>
+              <a:spcBef>
+                <a:spcPts val="0"/>
+              </a:spcBef>
+              <a:spcAft>
+                <a:spcPts val="0"/>
+              </a:spcAft>
+              <a:buClrTx/>
+              <a:buSzTx/>
+              <a:buFontTx/>
+              <a:buNone/>
+              <a:tabLst/>
+              <a:defRPr/>
+            </a:pPr>
+            <a:r>
+              <a:rPr lang="en-US" dirty="0"/>
+              <a:t>9. Destroy some stuff</a:t>
+            </a:r>
+          </a:p>
+          <a:p>
+            <a:pPr marL="0" marR="0" lvl="0" indent="0" algn="l" defTabSz="914400" rtl="0" eaLnBrk="1" fontAlgn="auto" latinLnBrk="0" hangingPunct="1">
+              <a:lnSpc>
+                <a:spcPct val="100000"/>
+              </a:lnSpc>
+              <a:spcBef>
+                <a:spcPts val="0"/>
+              </a:spcBef>
+              <a:spcAft>
+                <a:spcPts val="0"/>
+              </a:spcAft>
+              <a:buClrTx/>
+              <a:buSzTx/>
+              <a:buFontTx/>
+              <a:buNone/>
+              <a:tabLst/>
+              <a:defRPr/>
+            </a:pPr>
+            <a:r>
+              <a:rPr lang="en-US" dirty="0"/>
+              <a:t>10. Rebuild the environment</a:t>
+            </a:r>
+          </a:p>
+          <a:p>
+            <a:pPr marL="0" marR="0" lvl="0" indent="0" algn="l" defTabSz="914400" rtl="0" eaLnBrk="1" fontAlgn="auto" latinLnBrk="0" hangingPunct="1">
+              <a:lnSpc>
+                <a:spcPct val="100000"/>
+              </a:lnSpc>
+              <a:spcBef>
+                <a:spcPts val="0"/>
+              </a:spcBef>
+              <a:spcAft>
+                <a:spcPts val="0"/>
+              </a:spcAft>
+              <a:buClrTx/>
+              <a:buSzTx/>
+              <a:buFontTx/>
+              <a:buNone/>
+              <a:tabLst/>
+              <a:defRPr/>
+            </a:pPr>
+            <a:r>
+              <a:rPr lang="en-US" dirty="0"/>
+              <a:t>11. Extra Credit: add PhpMyAdmin</a:t>
+            </a:r>
+          </a:p>
+          <a:p>
+            <a:endParaRPr lang="en-US" dirty="0"/>
           </a:p>
         </p:txBody>
       </p:sp>
@@ -2541,7 +2557,7 @@
           <a:p>
             <a:fld id="{07F65287-0258-BC43-8221-F86E5F96768A}" type="slidenum">
               <a:rPr lang="en-US" smtClean="0"/>
-              <a:t>25</a:t>
+              <a:t>24</a:t>
             </a:fld>
             <a:endParaRPr lang="en-US"/>
           </a:p>
@@ -2550,7 +2566,7 @@
     </p:spTree>
     <p:extLst>
       <p:ext uri="{BB962C8B-B14F-4D97-AF65-F5344CB8AC3E}">
-        <p14:creationId xmlns:p14="http://schemas.microsoft.com/office/powerpoint/2010/main" val="491364371"/>
+        <p14:creationId xmlns:p14="http://schemas.microsoft.com/office/powerpoint/2010/main" val="1904307631"/>
       </p:ext>
     </p:extLst>
   </p:cSld>
@@ -2606,15 +2622,7 @@
           <a:p>
             <a:r>
               <a:rPr lang="en-US" dirty="0"/>
-              <a:t>Oh, cool, now we get to use a recipe. And, if you’ve never used </a:t>
-            </a:r>
-            <a:r>
-              <a:rPr lang="en-US" dirty="0" err="1"/>
-              <a:t>Omeka</a:t>
-            </a:r>
-            <a:r>
-              <a:rPr lang="en-US" dirty="0"/>
-              <a:t>-S, it’s pretty cool. I think you’ll like it. I hope we don’t lose you to it. Stay with us, there’s more we want to do today.</a:t>
+              <a:t>Any questions? Do we need a quick break?</a:t>
             </a:r>
           </a:p>
         </p:txBody>
@@ -2636,7 +2644,7 @@
           <a:p>
             <a:fld id="{07F65287-0258-BC43-8221-F86E5F96768A}" type="slidenum">
               <a:rPr lang="en-US" smtClean="0"/>
-              <a:t>26</a:t>
+              <a:t>25</a:t>
             </a:fld>
             <a:endParaRPr lang="en-US"/>
           </a:p>
@@ -2645,7 +2653,7 @@
     </p:spTree>
     <p:extLst>
       <p:ext uri="{BB962C8B-B14F-4D97-AF65-F5344CB8AC3E}">
-        <p14:creationId xmlns:p14="http://schemas.microsoft.com/office/powerpoint/2010/main" val="1753263772"/>
+        <p14:creationId xmlns:p14="http://schemas.microsoft.com/office/powerpoint/2010/main" val="491364371"/>
       </p:ext>
     </p:extLst>
   </p:cSld>
@@ -2701,7 +2709,15 @@
           <a:p>
             <a:r>
               <a:rPr lang="en-US" dirty="0"/>
-              <a:t>Any questions? Do we need a quick break?</a:t>
+              <a:t>Oh, cool, now we get to use a recipe. And, if you’ve never used </a:t>
+            </a:r>
+            <a:r>
+              <a:rPr lang="en-US" dirty="0" err="1"/>
+              <a:t>Omeka</a:t>
+            </a:r>
+            <a:r>
+              <a:rPr lang="en-US" dirty="0"/>
+              <a:t>-S, it’s pretty cool. I think you’ll like it. I hope we don’t lose you to it. Stay with us, there’s more we want to do today.</a:t>
             </a:r>
           </a:p>
         </p:txBody>
@@ -2723,7 +2739,7 @@
           <a:p>
             <a:fld id="{07F65287-0258-BC43-8221-F86E5F96768A}" type="slidenum">
               <a:rPr lang="en-US" smtClean="0"/>
-              <a:t>27</a:t>
+              <a:t>26</a:t>
             </a:fld>
             <a:endParaRPr lang="en-US"/>
           </a:p>
@@ -2732,7 +2748,7 @@
     </p:spTree>
     <p:extLst>
       <p:ext uri="{BB962C8B-B14F-4D97-AF65-F5344CB8AC3E}">
-        <p14:creationId xmlns:p14="http://schemas.microsoft.com/office/powerpoint/2010/main" val="1642885866"/>
+        <p14:creationId xmlns:p14="http://schemas.microsoft.com/office/powerpoint/2010/main" val="1753263772"/>
       </p:ext>
     </p:extLst>
   </p:cSld>
@@ -2788,7 +2804,7 @@
           <a:p>
             <a:r>
               <a:rPr lang="en-US" dirty="0"/>
-              <a:t>OK, final workspace I have prepared, let’s get Django running. And maybe, if we have time, we can try to start up a debugger.</a:t>
+              <a:t>Any questions? Do we need a quick break?</a:t>
             </a:r>
           </a:p>
         </p:txBody>
@@ -2810,7 +2826,7 @@
           <a:p>
             <a:fld id="{07F65287-0258-BC43-8221-F86E5F96768A}" type="slidenum">
               <a:rPr lang="en-US" smtClean="0"/>
-              <a:t>28</a:t>
+              <a:t>27</a:t>
             </a:fld>
             <a:endParaRPr lang="en-US"/>
           </a:p>
@@ -2819,7 +2835,7 @@
     </p:spTree>
     <p:extLst>
       <p:ext uri="{BB962C8B-B14F-4D97-AF65-F5344CB8AC3E}">
-        <p14:creationId xmlns:p14="http://schemas.microsoft.com/office/powerpoint/2010/main" val="3704286337"/>
+        <p14:creationId xmlns:p14="http://schemas.microsoft.com/office/powerpoint/2010/main" val="1642885866"/>
       </p:ext>
     </p:extLst>
   </p:cSld>
@@ -2875,7 +2891,7 @@
           <a:p>
             <a:r>
               <a:rPr lang="en-US" dirty="0"/>
-              <a:t>Any questions? Do we need a quick break?</a:t>
+              <a:t>OK, final workspace I have prepared, let’s get Django running. And maybe, if we have time, we can try to start up a debugger.</a:t>
             </a:r>
           </a:p>
         </p:txBody>
@@ -2897,7 +2913,7 @@
           <a:p>
             <a:fld id="{07F65287-0258-BC43-8221-F86E5F96768A}" type="slidenum">
               <a:rPr lang="en-US" smtClean="0"/>
-              <a:t>29</a:t>
+              <a:t>28</a:t>
             </a:fld>
             <a:endParaRPr lang="en-US"/>
           </a:p>
@@ -2906,7 +2922,7 @@
     </p:spTree>
     <p:extLst>
       <p:ext uri="{BB962C8B-B14F-4D97-AF65-F5344CB8AC3E}">
-        <p14:creationId xmlns:p14="http://schemas.microsoft.com/office/powerpoint/2010/main" val="925748264"/>
+        <p14:creationId xmlns:p14="http://schemas.microsoft.com/office/powerpoint/2010/main" val="3704286337"/>
       </p:ext>
     </p:extLst>
   </p:cSld>
@@ -2962,7 +2978,7 @@
           <a:p>
             <a:r>
               <a:rPr lang="en-US" dirty="0"/>
-              <a:t>OK, this is going to be fun. I have an idea of what you all will suggest we build together, but let’s figure that out first. Then let’s build it.</a:t>
+              <a:t>Any questions? Do we need a quick break?</a:t>
             </a:r>
           </a:p>
         </p:txBody>
@@ -2984,7 +3000,7 @@
           <a:p>
             <a:fld id="{07F65287-0258-BC43-8221-F86E5F96768A}" type="slidenum">
               <a:rPr lang="en-US" smtClean="0"/>
-              <a:t>30</a:t>
+              <a:t>29</a:t>
             </a:fld>
             <a:endParaRPr lang="en-US"/>
           </a:p>
@@ -2993,7 +3009,7 @@
     </p:spTree>
     <p:extLst>
       <p:ext uri="{BB962C8B-B14F-4D97-AF65-F5344CB8AC3E}">
-        <p14:creationId xmlns:p14="http://schemas.microsoft.com/office/powerpoint/2010/main" val="3304442387"/>
+        <p14:creationId xmlns:p14="http://schemas.microsoft.com/office/powerpoint/2010/main" val="925748264"/>
       </p:ext>
     </p:extLst>
   </p:cSld>
@@ -3049,7 +3065,7 @@
           <a:p>
             <a:r>
               <a:rPr lang="en-US" dirty="0"/>
-              <a:t>Here are the parts of this workshop. For the first 30 minutes, we’ll go through this introduction, then we’ll take a quick break, and come back for 4 exercises. Don’t panic, you don’t need to follow along with any of the typing, you can just kick back and watch. I hope you’ll still get something out of this without typing commands.</a:t>
+              <a:t>What kind of chaos are we talking about? With dev environments, these are the options I’ve seen in use for various projects. On the left of the yarn, we have more ordered options, on the right, less so. I’m biased, so I put Lando at the base of the ordered side.</a:t>
             </a:r>
           </a:p>
         </p:txBody>
@@ -3071,7 +3087,7 @@
           <a:p>
             <a:fld id="{07F65287-0258-BC43-8221-F86E5F96768A}" type="slidenum">
               <a:rPr lang="en-US" smtClean="0"/>
-              <a:t>4</a:t>
+              <a:t>3</a:t>
             </a:fld>
             <a:endParaRPr lang="en-US"/>
           </a:p>
@@ -3080,7 +3096,7 @@
     </p:spTree>
     <p:extLst>
       <p:ext uri="{BB962C8B-B14F-4D97-AF65-F5344CB8AC3E}">
-        <p14:creationId xmlns:p14="http://schemas.microsoft.com/office/powerpoint/2010/main" val="1174533777"/>
+        <p14:creationId xmlns:p14="http://schemas.microsoft.com/office/powerpoint/2010/main" val="1892846666"/>
       </p:ext>
     </p:extLst>
   </p:cSld>
@@ -3136,7 +3152,7 @@
           <a:p>
             <a:r>
               <a:rPr lang="en-US" dirty="0"/>
-              <a:t>Now that we’ve built a database, Omeka-S and Django dev environments, if you want to explore more, here are some things to check out. I haven’t tried the frontend tooling that Lando makes available, but it looks cool. I especially like that you can just slap on these front-end toolsets like grunt and gulp, to any other dev environment. And other places to play are, if you want to work offline, you can experiment with the proxy configuration options. Or if you want to automate more things, check out the Events configuration. Or, if you want to use Lando as a piece of your great Docker empire, check out the Compose/custom service. You *can* use your custom Docker images. It’ll just take more work on your part.</a:t>
+              <a:t>OK, this is going to be fun. I have an idea of what you all will suggest we build together, but let’s figure that out first. Then let’s build it.</a:t>
             </a:r>
           </a:p>
         </p:txBody>
@@ -3158,7 +3174,7 @@
           <a:p>
             <a:fld id="{07F65287-0258-BC43-8221-F86E5F96768A}" type="slidenum">
               <a:rPr lang="en-US" smtClean="0"/>
-              <a:t>31</a:t>
+              <a:t>30</a:t>
             </a:fld>
             <a:endParaRPr lang="en-US"/>
           </a:p>
@@ -3167,7 +3183,7 @@
     </p:spTree>
     <p:extLst>
       <p:ext uri="{BB962C8B-B14F-4D97-AF65-F5344CB8AC3E}">
-        <p14:creationId xmlns:p14="http://schemas.microsoft.com/office/powerpoint/2010/main" val="1309255926"/>
+        <p14:creationId xmlns:p14="http://schemas.microsoft.com/office/powerpoint/2010/main" val="3304442387"/>
       </p:ext>
     </p:extLst>
   </p:cSld>
@@ -3223,6 +3239,93 @@
           <a:p>
             <a:r>
               <a:rPr lang="en-US" dirty="0"/>
+              <a:t>Now that we’ve built a database, Omeka-S and Django dev environments, if you want to explore more, here are some things to check out. I haven’t tried the frontend tooling that Lando makes available, but it looks cool. I especially like that you can just slap on these front-end toolsets like grunt and gulp, to any other dev environment. And other places to play are, if you want to work offline, you can experiment with the proxy configuration options. Or if you want to automate more things, check out the Events configuration. Or, if you want to use Lando as a piece of your great Docker empire, check out the Compose/custom service. You *can* use your custom Docker images. It’ll just take more work on your part.</a:t>
+            </a:r>
+          </a:p>
+        </p:txBody>
+      </p:sp>
+      <p:sp>
+        <p:nvSpPr>
+          <p:cNvPr id="4" name="Slide Number Placeholder 3"/>
+          <p:cNvSpPr>
+            <a:spLocks noGrp="1"/>
+          </p:cNvSpPr>
+          <p:nvPr>
+            <p:ph type="sldNum" sz="quarter" idx="5"/>
+          </p:nvPr>
+        </p:nvSpPr>
+        <p:spPr/>
+        <p:txBody>
+          <a:bodyPr/>
+          <a:lstStyle/>
+          <a:p>
+            <a:fld id="{07F65287-0258-BC43-8221-F86E5F96768A}" type="slidenum">
+              <a:rPr lang="en-US" smtClean="0"/>
+              <a:t>31</a:t>
+            </a:fld>
+            <a:endParaRPr lang="en-US"/>
+          </a:p>
+        </p:txBody>
+      </p:sp>
+    </p:spTree>
+    <p:extLst>
+      <p:ext uri="{BB962C8B-B14F-4D97-AF65-F5344CB8AC3E}">
+        <p14:creationId xmlns:p14="http://schemas.microsoft.com/office/powerpoint/2010/main" val="1309255926"/>
+      </p:ext>
+    </p:extLst>
+  </p:cSld>
+  <p:clrMapOvr>
+    <a:masterClrMapping/>
+  </p:clrMapOvr>
+</p:notes>
+</file>
+
+<file path=ppt/notesSlides/notesSlide32.xml><?xml version="1.0" encoding="utf-8"?>
+<p:notes xmlns:a="http://schemas.openxmlformats.org/drawingml/2006/main" xmlns:r="http://schemas.openxmlformats.org/officeDocument/2006/relationships" xmlns:p="http://schemas.openxmlformats.org/presentationml/2006/main">
+  <p:cSld>
+    <p:spTree>
+      <p:nvGrpSpPr>
+        <p:cNvPr id="1" name=""/>
+        <p:cNvGrpSpPr/>
+        <p:nvPr/>
+      </p:nvGrpSpPr>
+      <p:grpSpPr>
+        <a:xfrm>
+          <a:off x="0" y="0"/>
+          <a:ext cx="0" cy="0"/>
+          <a:chOff x="0" y="0"/>
+          <a:chExt cx="0" cy="0"/>
+        </a:xfrm>
+      </p:grpSpPr>
+      <p:sp>
+        <p:nvSpPr>
+          <p:cNvPr id="2" name="Slide Image Placeholder 1"/>
+          <p:cNvSpPr>
+            <a:spLocks noGrp="1" noRot="1" noChangeAspect="1"/>
+          </p:cNvSpPr>
+          <p:nvPr>
+            <p:ph type="sldImg"/>
+          </p:nvPr>
+        </p:nvSpPr>
+        <p:spPr/>
+      </p:sp>
+      <p:sp>
+        <p:nvSpPr>
+          <p:cNvPr id="3" name="Notes Placeholder 2"/>
+          <p:cNvSpPr>
+            <a:spLocks noGrp="1"/>
+          </p:cNvSpPr>
+          <p:nvPr>
+            <p:ph type="body" idx="1"/>
+          </p:nvPr>
+        </p:nvSpPr>
+        <p:spPr/>
+        <p:txBody>
+          <a:bodyPr/>
+          <a:lstStyle/>
+          <a:p>
+            <a:r>
+              <a:rPr lang="en-US" dirty="0"/>
               <a:t>Any questions?</a:t>
             </a:r>
           </a:p>
@@ -3264,7 +3367,7 @@
 </p:notes>
 </file>
 
-<file path=ppt/notesSlides/notesSlide32.xml><?xml version="1.0" encoding="utf-8"?>
+<file path=ppt/notesSlides/notesSlide33.xml><?xml version="1.0" encoding="utf-8"?>
 <p:notes xmlns:a="http://schemas.openxmlformats.org/drawingml/2006/main" xmlns:r="http://schemas.openxmlformats.org/officeDocument/2006/relationships" xmlns:p="http://schemas.openxmlformats.org/presentationml/2006/main">
   <p:cSld>
     <p:spTree>
@@ -3397,7 +3500,7 @@
           <a:p>
             <a:r>
               <a:rPr lang="en-US" dirty="0"/>
-              <a:t>We aren’t going to dive deeply into Docker, because we don’t need to, we just need to keep in mind that Docker is what enables Lando to help us build a development environment. The most important part to know is that Docker is software that helps us organize our project environments into the parts we need. Like a database and an app server.</a:t>
+              <a:t>Here are the parts of this workshop. For the first 30 minutes, we’ll go through this introduction, then we’ll take a quick break, and come back for 4 exercises. Don’t panic, you don’t need to follow along with any of the typing, you can just kick back and watch. I hope you’ll still get something out of this without typing commands.</a:t>
             </a:r>
           </a:p>
         </p:txBody>
@@ -3419,7 +3522,7 @@
           <a:p>
             <a:fld id="{07F65287-0258-BC43-8221-F86E5F96768A}" type="slidenum">
               <a:rPr lang="en-US" smtClean="0"/>
-              <a:t>5</a:t>
+              <a:t>4</a:t>
             </a:fld>
             <a:endParaRPr lang="en-US"/>
           </a:p>
@@ -3428,7 +3531,7 @@
     </p:spTree>
     <p:extLst>
       <p:ext uri="{BB962C8B-B14F-4D97-AF65-F5344CB8AC3E}">
-        <p14:creationId xmlns:p14="http://schemas.microsoft.com/office/powerpoint/2010/main" val="3064967801"/>
+        <p14:creationId xmlns:p14="http://schemas.microsoft.com/office/powerpoint/2010/main" val="1174533777"/>
       </p:ext>
     </p:extLst>
   </p:cSld>
@@ -3484,7 +3587,7 @@
           <a:p>
             <a:r>
               <a:rPr lang="en-US" dirty="0"/>
-              <a:t>I don’t want to complain about Docker too much, and please don’t take offense if you’ve already invested the time in developing and using a Docker workflow. I want to honor that work and level of commitment, but getting a development environment running, so we can do some work, should not require that level of commitment. Awesome and Awful. You get building blocks, and it runs on most anything. But, it’s complicated, and hard.</a:t>
+              <a:t>We aren’t going to dive deeply into Docker, because we don’t need to, we just need to keep in mind that Docker is what enables Lando to help us build a development environment. The most important part to know is that Docker is software that helps us organize our project environments into the parts we need. Like a database and an app server.</a:t>
             </a:r>
           </a:p>
         </p:txBody>
@@ -3506,7 +3609,7 @@
           <a:p>
             <a:fld id="{07F65287-0258-BC43-8221-F86E5F96768A}" type="slidenum">
               <a:rPr lang="en-US" smtClean="0"/>
-              <a:t>6</a:t>
+              <a:t>5</a:t>
             </a:fld>
             <a:endParaRPr lang="en-US"/>
           </a:p>
@@ -3515,7 +3618,7 @@
     </p:spTree>
     <p:extLst>
       <p:ext uri="{BB962C8B-B14F-4D97-AF65-F5344CB8AC3E}">
-        <p14:creationId xmlns:p14="http://schemas.microsoft.com/office/powerpoint/2010/main" val="1056243610"/>
+        <p14:creationId xmlns:p14="http://schemas.microsoft.com/office/powerpoint/2010/main" val="3064967801"/>
       </p:ext>
     </p:extLst>
   </p:cSld>
@@ -3569,144 +3672,9 @@
           <a:bodyPr/>
           <a:lstStyle/>
           <a:p>
-            <a:pPr marL="0" marR="0" lvl="0" indent="0" algn="l" defTabSz="914400" rtl="0" eaLnBrk="1" fontAlgn="auto" latinLnBrk="0" hangingPunct="1">
-              <a:lnSpc>
-                <a:spcPct val="100000"/>
-              </a:lnSpc>
-              <a:spcBef>
-                <a:spcPts val="0"/>
-              </a:spcBef>
-              <a:spcAft>
-                <a:spcPts val="0"/>
-              </a:spcAft>
-              <a:buClrTx/>
-              <a:buSzTx/>
-              <a:buFontTx/>
-              <a:buNone/>
-              <a:tabLst/>
-              <a:defRPr/>
-            </a:pPr>
-            <a:r>
-              <a:rPr lang="en-US" dirty="0"/>
-              <a:t>This is a famous cathedral in Barcelona, </a:t>
-            </a:r>
-            <a:r>
-              <a:rPr lang="en-US" sz="1200" b="0" i="0" kern="1200" dirty="0">
-                <a:solidFill>
-                  <a:schemeClr val="tx1"/>
-                </a:solidFill>
-                <a:effectLst/>
-                <a:latin typeface="+mn-lt"/>
-                <a:ea typeface="+mn-ea"/>
-                <a:cs typeface="+mn-cs"/>
-              </a:rPr>
-              <a:t>Sagrada </a:t>
-            </a:r>
-            <a:r>
-              <a:rPr lang="en-US" sz="1200" b="0" i="0" kern="1200" dirty="0" err="1">
-                <a:solidFill>
-                  <a:schemeClr val="tx1"/>
-                </a:solidFill>
-                <a:effectLst/>
-                <a:latin typeface="+mn-lt"/>
-                <a:ea typeface="+mn-ea"/>
-                <a:cs typeface="+mn-cs"/>
-              </a:rPr>
-              <a:t>Família</a:t>
-            </a:r>
-            <a:r>
-              <a:rPr lang="en-US" sz="1200" b="0" i="0" kern="1200" dirty="0">
-                <a:solidFill>
-                  <a:schemeClr val="tx1"/>
-                </a:solidFill>
-                <a:effectLst/>
-                <a:latin typeface="+mn-lt"/>
-                <a:ea typeface="+mn-ea"/>
-                <a:cs typeface="+mn-cs"/>
-              </a:rPr>
-              <a:t> ('Basilica of the Holy Family’), by Antoni </a:t>
-            </a:r>
-            <a:r>
-              <a:rPr lang="en-US" sz="1200" b="0" i="0" kern="1200" dirty="0" err="1">
-                <a:solidFill>
-                  <a:schemeClr val="tx1"/>
-                </a:solidFill>
-                <a:effectLst/>
-                <a:latin typeface="+mn-lt"/>
-                <a:ea typeface="+mn-ea"/>
-                <a:cs typeface="+mn-cs"/>
-              </a:rPr>
-              <a:t>Gaudí</a:t>
-            </a:r>
-            <a:r>
-              <a:rPr lang="en-US" sz="1200" b="0" i="0" kern="1200" dirty="0">
-                <a:solidFill>
-                  <a:schemeClr val="tx1"/>
-                </a:solidFill>
-                <a:effectLst/>
-                <a:latin typeface="+mn-lt"/>
-                <a:ea typeface="+mn-ea"/>
-                <a:cs typeface="+mn-cs"/>
-              </a:rPr>
-              <a:t>, it began construction in March of 1882. It’s still not done. I have a picture of this cathedral on my office wall, as a reminder that Perfect may not be attainable, and as a visual reminder of what the quest for perfection can look like.</a:t>
-            </a:r>
-            <a:br>
-              <a:rPr lang="en-US" sz="1200" b="0" i="0" kern="1200" dirty="0">
-                <a:solidFill>
-                  <a:schemeClr val="tx1"/>
-                </a:solidFill>
-                <a:effectLst/>
-                <a:latin typeface="+mn-lt"/>
-                <a:ea typeface="+mn-ea"/>
-                <a:cs typeface="+mn-cs"/>
-              </a:rPr>
-            </a:br>
-            <a:br>
-              <a:rPr lang="en-US" sz="1200" b="0" i="0" kern="1200" dirty="0">
-                <a:solidFill>
-                  <a:schemeClr val="tx1"/>
-                </a:solidFill>
-                <a:effectLst/>
-                <a:latin typeface="+mn-lt"/>
-                <a:ea typeface="+mn-ea"/>
-                <a:cs typeface="+mn-cs"/>
-              </a:rPr>
-            </a:br>
-            <a:r>
-              <a:rPr lang="en-US" sz="1200" b="0" i="0" kern="1200" dirty="0">
-                <a:solidFill>
-                  <a:schemeClr val="tx1"/>
-                </a:solidFill>
-                <a:effectLst/>
-                <a:latin typeface="+mn-lt"/>
-                <a:ea typeface="+mn-ea"/>
-                <a:cs typeface="+mn-cs"/>
-              </a:rPr>
-              <a:t>I have this picture in these slides to say, Docker can be used to build huge and beautiful </a:t>
-            </a:r>
-            <a:r>
-              <a:rPr lang="en-US" sz="1200" b="0" i="0" kern="1200" dirty="0" err="1">
-                <a:solidFill>
-                  <a:schemeClr val="tx1"/>
-                </a:solidFill>
-                <a:effectLst/>
-                <a:latin typeface="+mn-lt"/>
-                <a:ea typeface="+mn-ea"/>
-                <a:cs typeface="+mn-cs"/>
-              </a:rPr>
-              <a:t>worklfows</a:t>
-            </a:r>
-            <a:r>
-              <a:rPr lang="en-US" sz="1200" b="0" i="0" kern="1200" dirty="0">
-                <a:solidFill>
-                  <a:schemeClr val="tx1"/>
-                </a:solidFill>
-                <a:effectLst/>
-                <a:latin typeface="+mn-lt"/>
-                <a:ea typeface="+mn-ea"/>
-                <a:cs typeface="+mn-cs"/>
-              </a:rPr>
-              <a:t>. We won’t be doing anything like that today. We are going to be building dev environments, so we can get to work.</a:t>
+            <a:r>
+              <a:rPr lang="en-US" dirty="0"/>
+              <a:t>I don’t want to complain about Docker too much, and please don’t take offense if you’ve already invested the time in developing and using a Docker workflow. I want to honor that work and level of commitment, but getting a development environment running, so we can do some work, should not require that level of commitment. Awesome and Awful. You get building blocks, and it runs on most anything. But, it’s complicated, and hard.</a:t>
             </a:r>
           </a:p>
         </p:txBody>
@@ -3728,7 +3696,7 @@
           <a:p>
             <a:fld id="{07F65287-0258-BC43-8221-F86E5F96768A}" type="slidenum">
               <a:rPr lang="en-US" smtClean="0"/>
-              <a:t>7</a:t>
+              <a:t>6</a:t>
             </a:fld>
             <a:endParaRPr lang="en-US"/>
           </a:p>
@@ -3737,7 +3705,7 @@
     </p:spTree>
     <p:extLst>
       <p:ext uri="{BB962C8B-B14F-4D97-AF65-F5344CB8AC3E}">
-        <p14:creationId xmlns:p14="http://schemas.microsoft.com/office/powerpoint/2010/main" val="2374772773"/>
+        <p14:creationId xmlns:p14="http://schemas.microsoft.com/office/powerpoint/2010/main" val="1056243610"/>
       </p:ext>
     </p:extLst>
   </p:cSld>
@@ -3791,9 +3759,144 @@
           <a:bodyPr/>
           <a:lstStyle/>
           <a:p>
-            <a:r>
-              <a:rPr lang="en-US" dirty="0"/>
-              <a:t>The main Lando page makes it very clear that Docker containers built by Lando are not to be used in production. This warning applies to almost any community-supported container you might pull down from Docker Hub: they are built for other reasons, mostly for developer convenience. For example: the official Tomcat containers from Apache all run as root. You do not want to run Tomcat as root. In a development environment, it’s fine, you know, whatever, let’s just get cracking. But you want your production site to be secure.</a:t>
+            <a:pPr marL="0" marR="0" lvl="0" indent="0" algn="l" defTabSz="914400" rtl="0" eaLnBrk="1" fontAlgn="auto" latinLnBrk="0" hangingPunct="1">
+              <a:lnSpc>
+                <a:spcPct val="100000"/>
+              </a:lnSpc>
+              <a:spcBef>
+                <a:spcPts val="0"/>
+              </a:spcBef>
+              <a:spcAft>
+                <a:spcPts val="0"/>
+              </a:spcAft>
+              <a:buClrTx/>
+              <a:buSzTx/>
+              <a:buFontTx/>
+              <a:buNone/>
+              <a:tabLst/>
+              <a:defRPr/>
+            </a:pPr>
+            <a:r>
+              <a:rPr lang="en-US" dirty="0"/>
+              <a:t>This is a famous cathedral in Barcelona, </a:t>
+            </a:r>
+            <a:r>
+              <a:rPr lang="en-US" sz="1200" b="0" i="0" kern="1200" dirty="0">
+                <a:solidFill>
+                  <a:schemeClr val="tx1"/>
+                </a:solidFill>
+                <a:effectLst/>
+                <a:latin typeface="+mn-lt"/>
+                <a:ea typeface="+mn-ea"/>
+                <a:cs typeface="+mn-cs"/>
+              </a:rPr>
+              <a:t>Sagrada </a:t>
+            </a:r>
+            <a:r>
+              <a:rPr lang="en-US" sz="1200" b="0" i="0" kern="1200" dirty="0" err="1">
+                <a:solidFill>
+                  <a:schemeClr val="tx1"/>
+                </a:solidFill>
+                <a:effectLst/>
+                <a:latin typeface="+mn-lt"/>
+                <a:ea typeface="+mn-ea"/>
+                <a:cs typeface="+mn-cs"/>
+              </a:rPr>
+              <a:t>Família</a:t>
+            </a:r>
+            <a:r>
+              <a:rPr lang="en-US" sz="1200" b="0" i="0" kern="1200" dirty="0">
+                <a:solidFill>
+                  <a:schemeClr val="tx1"/>
+                </a:solidFill>
+                <a:effectLst/>
+                <a:latin typeface="+mn-lt"/>
+                <a:ea typeface="+mn-ea"/>
+                <a:cs typeface="+mn-cs"/>
+              </a:rPr>
+              <a:t> ('Basilica of the Holy Family’), by Antoni </a:t>
+            </a:r>
+            <a:r>
+              <a:rPr lang="en-US" sz="1200" b="0" i="0" kern="1200" dirty="0" err="1">
+                <a:solidFill>
+                  <a:schemeClr val="tx1"/>
+                </a:solidFill>
+                <a:effectLst/>
+                <a:latin typeface="+mn-lt"/>
+                <a:ea typeface="+mn-ea"/>
+                <a:cs typeface="+mn-cs"/>
+              </a:rPr>
+              <a:t>Gaudí</a:t>
+            </a:r>
+            <a:r>
+              <a:rPr lang="en-US" sz="1200" b="0" i="0" kern="1200" dirty="0">
+                <a:solidFill>
+                  <a:schemeClr val="tx1"/>
+                </a:solidFill>
+                <a:effectLst/>
+                <a:latin typeface="+mn-lt"/>
+                <a:ea typeface="+mn-ea"/>
+                <a:cs typeface="+mn-cs"/>
+              </a:rPr>
+              <a:t>, it began construction in March of 1882. It’s still not done. I have a picture of this cathedral on my office wall, as a reminder that Perfect may not be attainable, and as a visual reminder of what the quest for perfection can look like.</a:t>
+            </a:r>
+            <a:br>
+              <a:rPr lang="en-US" sz="1200" b="0" i="0" kern="1200" dirty="0">
+                <a:solidFill>
+                  <a:schemeClr val="tx1"/>
+                </a:solidFill>
+                <a:effectLst/>
+                <a:latin typeface="+mn-lt"/>
+                <a:ea typeface="+mn-ea"/>
+                <a:cs typeface="+mn-cs"/>
+              </a:rPr>
+            </a:br>
+            <a:br>
+              <a:rPr lang="en-US" sz="1200" b="0" i="0" kern="1200" dirty="0">
+                <a:solidFill>
+                  <a:schemeClr val="tx1"/>
+                </a:solidFill>
+                <a:effectLst/>
+                <a:latin typeface="+mn-lt"/>
+                <a:ea typeface="+mn-ea"/>
+                <a:cs typeface="+mn-cs"/>
+              </a:rPr>
+            </a:br>
+            <a:r>
+              <a:rPr lang="en-US" sz="1200" b="0" i="0" kern="1200" dirty="0">
+                <a:solidFill>
+                  <a:schemeClr val="tx1"/>
+                </a:solidFill>
+                <a:effectLst/>
+                <a:latin typeface="+mn-lt"/>
+                <a:ea typeface="+mn-ea"/>
+                <a:cs typeface="+mn-cs"/>
+              </a:rPr>
+              <a:t>I have this picture in these slides to say, Docker can be used to build huge and beautiful </a:t>
+            </a:r>
+            <a:r>
+              <a:rPr lang="en-US" sz="1200" b="0" i="0" kern="1200" dirty="0" err="1">
+                <a:solidFill>
+                  <a:schemeClr val="tx1"/>
+                </a:solidFill>
+                <a:effectLst/>
+                <a:latin typeface="+mn-lt"/>
+                <a:ea typeface="+mn-ea"/>
+                <a:cs typeface="+mn-cs"/>
+              </a:rPr>
+              <a:t>worklfows</a:t>
+            </a:r>
+            <a:r>
+              <a:rPr lang="en-US" sz="1200" b="0" i="0" kern="1200" dirty="0">
+                <a:solidFill>
+                  <a:schemeClr val="tx1"/>
+                </a:solidFill>
+                <a:effectLst/>
+                <a:latin typeface="+mn-lt"/>
+                <a:ea typeface="+mn-ea"/>
+                <a:cs typeface="+mn-cs"/>
+              </a:rPr>
+              <a:t>. We won’t be doing anything like that today. We are going to be building dev environments, so we can get to work.</a:t>
             </a:r>
           </a:p>
         </p:txBody>
@@ -3815,7 +3918,7 @@
           <a:p>
             <a:fld id="{07F65287-0258-BC43-8221-F86E5F96768A}" type="slidenum">
               <a:rPr lang="en-US" smtClean="0"/>
-              <a:t>8</a:t>
+              <a:t>7</a:t>
             </a:fld>
             <a:endParaRPr lang="en-US"/>
           </a:p>
@@ -3824,7 +3927,7 @@
     </p:spTree>
     <p:extLst>
       <p:ext uri="{BB962C8B-B14F-4D97-AF65-F5344CB8AC3E}">
-        <p14:creationId xmlns:p14="http://schemas.microsoft.com/office/powerpoint/2010/main" val="1344439785"/>
+        <p14:creationId xmlns:p14="http://schemas.microsoft.com/office/powerpoint/2010/main" val="2374772773"/>
       </p:ext>
     </p:extLst>
   </p:cSld>
@@ -3880,7 +3983,7 @@
           <a:p>
             <a:r>
               <a:rPr lang="en-US" dirty="0"/>
-              <a:t>If you can’t have a perfect workflow, using the same containers in dev as prod, why bother? Honestly, it’s scope creep. I’m here to talk about making some dev environments. You can work on your perfect ideal workflow on your own time. Let’s get to work.</a:t>
+              <a:t>The main Lando page makes it very clear that Docker containers built by Lando are not to be used in production. This warning applies to almost any community-supported container you might pull down from Docker Hub: they are built for other reasons, mostly for developer convenience. For example: the official Tomcat containers from Apache all run as root. You do not want to run Tomcat as root. In a development environment, it’s fine, you know, whatever, let’s just get cracking. But you want your production site to be secure.</a:t>
             </a:r>
           </a:p>
         </p:txBody>
@@ -3902,7 +4005,7 @@
           <a:p>
             <a:fld id="{07F65287-0258-BC43-8221-F86E5F96768A}" type="slidenum">
               <a:rPr lang="en-US" smtClean="0"/>
-              <a:t>9</a:t>
+              <a:t>8</a:t>
             </a:fld>
             <a:endParaRPr lang="en-US"/>
           </a:p>
@@ -3911,7 +4014,7 @@
     </p:spTree>
     <p:extLst>
       <p:ext uri="{BB962C8B-B14F-4D97-AF65-F5344CB8AC3E}">
-        <p14:creationId xmlns:p14="http://schemas.microsoft.com/office/powerpoint/2010/main" val="1769581732"/>
+        <p14:creationId xmlns:p14="http://schemas.microsoft.com/office/powerpoint/2010/main" val="1344439785"/>
       </p:ext>
     </p:extLst>
   </p:cSld>
@@ -3967,7 +4070,7 @@
           <a:p>
             <a:r>
               <a:rPr lang="en-US" dirty="0"/>
-              <a:t>The Lando community declares Lando is a “per app, single config file, containerized everything, local dev tool.” Let’s break that down a bit.</a:t>
+              <a:t>If you can’t have a perfect workflow, using the same containers in dev as prod, why bother? Honestly, it’s scope creep. I’m here to talk about making some dev environments. You can work on your perfect ideal workflow on your own time. Let’s get to work.</a:t>
             </a:r>
           </a:p>
         </p:txBody>
@@ -3989,7 +4092,7 @@
           <a:p>
             <a:fld id="{07F65287-0258-BC43-8221-F86E5F96768A}" type="slidenum">
               <a:rPr lang="en-US" smtClean="0"/>
-              <a:t>10</a:t>
+              <a:t>9</a:t>
             </a:fld>
             <a:endParaRPr lang="en-US"/>
           </a:p>
@@ -3998,7 +4101,7 @@
     </p:spTree>
     <p:extLst>
       <p:ext uri="{BB962C8B-B14F-4D97-AF65-F5344CB8AC3E}">
-        <p14:creationId xmlns:p14="http://schemas.microsoft.com/office/powerpoint/2010/main" val="4055699967"/>
+        <p14:creationId xmlns:p14="http://schemas.microsoft.com/office/powerpoint/2010/main" val="1769581732"/>
       </p:ext>
     </p:extLst>
   </p:cSld>
@@ -4280,7 +4383,7 @@
           <a:p>
             <a:fld id="{DC542904-3975-4E3E-BBB9-A828B1A3FA3D}" type="datetimeFigureOut">
               <a:rPr lang="en-US" smtClean="0"/>
-              <a:t>3/19/21</a:t>
+              <a:t>3/25/21</a:t>
             </a:fld>
             <a:endParaRPr lang="en-US"/>
           </a:p>
@@ -4488,7 +4591,7 @@
           <a:p>
             <a:fld id="{DC542904-3975-4E3E-BBB9-A828B1A3FA3D}" type="datetimeFigureOut">
               <a:rPr lang="en-US" smtClean="0"/>
-              <a:t>3/19/21</a:t>
+              <a:t>3/25/21</a:t>
             </a:fld>
             <a:endParaRPr lang="en-US"/>
           </a:p>
@@ -4696,7 +4799,7 @@
           <a:p>
             <a:fld id="{DC542904-3975-4E3E-BBB9-A828B1A3FA3D}" type="datetimeFigureOut">
               <a:rPr lang="en-US" smtClean="0"/>
-              <a:t>3/19/21</a:t>
+              <a:t>3/25/21</a:t>
             </a:fld>
             <a:endParaRPr lang="en-US"/>
           </a:p>
@@ -4971,7 +5074,7 @@
           <a:p>
             <a:fld id="{DC542904-3975-4E3E-BBB9-A828B1A3FA3D}" type="datetimeFigureOut">
               <a:rPr lang="en-US" smtClean="0"/>
-              <a:t>3/19/21</a:t>
+              <a:t>3/25/21</a:t>
             </a:fld>
             <a:endParaRPr lang="en-US"/>
           </a:p>
@@ -5241,7 +5344,7 @@
           <a:p>
             <a:fld id="{DC542904-3975-4E3E-BBB9-A828B1A3FA3D}" type="datetimeFigureOut">
               <a:rPr lang="en-US" smtClean="0"/>
-              <a:t>3/19/21</a:t>
+              <a:t>3/25/21</a:t>
             </a:fld>
             <a:endParaRPr lang="en-US"/>
           </a:p>
@@ -5653,7 +5756,7 @@
           <a:p>
             <a:fld id="{DC542904-3975-4E3E-BBB9-A828B1A3FA3D}" type="datetimeFigureOut">
               <a:rPr lang="en-US" smtClean="0"/>
-              <a:t>3/19/21</a:t>
+              <a:t>3/25/21</a:t>
             </a:fld>
             <a:endParaRPr lang="en-US"/>
           </a:p>
@@ -5799,7 +5902,7 @@
           <a:p>
             <a:fld id="{DC542904-3975-4E3E-BBB9-A828B1A3FA3D}" type="datetimeFigureOut">
               <a:rPr lang="en-US" smtClean="0"/>
-              <a:t>3/19/21</a:t>
+              <a:t>3/25/21</a:t>
             </a:fld>
             <a:endParaRPr lang="en-US"/>
           </a:p>
@@ -5912,7 +6015,7 @@
           <a:p>
             <a:fld id="{DC542904-3975-4E3E-BBB9-A828B1A3FA3D}" type="datetimeFigureOut">
               <a:rPr lang="en-US" smtClean="0"/>
-              <a:t>3/19/21</a:t>
+              <a:t>3/25/21</a:t>
             </a:fld>
             <a:endParaRPr lang="en-US"/>
           </a:p>
@@ -6225,7 +6328,7 @@
           <a:p>
             <a:fld id="{DC542904-3975-4E3E-BBB9-A828B1A3FA3D}" type="datetimeFigureOut">
               <a:rPr lang="en-US" smtClean="0"/>
-              <a:t>3/19/21</a:t>
+              <a:t>3/25/21</a:t>
             </a:fld>
             <a:endParaRPr lang="en-US"/>
           </a:p>
@@ -6515,7 +6618,7 @@
           <a:p>
             <a:fld id="{DC542904-3975-4E3E-BBB9-A828B1A3FA3D}" type="datetimeFigureOut">
               <a:rPr lang="en-US" smtClean="0"/>
-              <a:t>3/19/21</a:t>
+              <a:t>3/25/21</a:t>
             </a:fld>
             <a:endParaRPr lang="en-US"/>
           </a:p>
@@ -6765,7 +6868,7 @@
           <a:p>
             <a:fld id="{DC542904-3975-4E3E-BBB9-A828B1A3FA3D}" type="datetimeFigureOut">
               <a:rPr lang="en-US" smtClean="0"/>
-              <a:t>3/19/21</a:t>
+              <a:t>3/25/21</a:t>
             </a:fld>
             <a:endParaRPr lang="en-US"/>
           </a:p>
@@ -7251,7 +7354,7 @@
           <a:p>
             <a:r>
               <a:rPr lang="en-US" dirty="0">
-                <a:hlinkClick r:id="rId2"/>
+                <a:hlinkClick r:id="rId3"/>
               </a:rPr>
               <a:t>hardy.pottinger@ucop.edu</a:t>
             </a:r>
@@ -7317,7 +7420,7 @@
           <p:nvPr/>
         </p:nvPicPr>
         <p:blipFill>
-          <a:blip r:embed="rId3"/>
+          <a:blip r:embed="rId4"/>
           <a:stretch>
             <a:fillRect/>
           </a:stretch>
@@ -7347,7 +7450,7 @@
           <p:nvPr/>
         </p:nvPicPr>
         <p:blipFill>
-          <a:blip r:embed="rId4">
+          <a:blip r:embed="rId5">
             <a:extLst>
               <a:ext uri="{28A0092B-C50C-407E-A947-70E740481C1C}">
                 <a14:useLocalDpi xmlns:a14="http://schemas.microsoft.com/office/drawing/2010/main" val="0"/>
@@ -7413,7 +7516,7 @@
             </a:r>
             <a:r>
               <a:rPr lang="en-US" u="sng" dirty="0">
-                <a:hlinkClick r:id="rId5"/>
+                <a:hlinkClick r:id="rId6"/>
               </a:rPr>
               <a:t>Creative Commons Attribution 4.0 International License</a:t>
             </a:r>
@@ -10377,10 +10480,15 @@
             <p:ph idx="1"/>
           </p:nvPr>
         </p:nvSpPr>
-        <p:spPr/>
+        <p:spPr>
+          <a:xfrm>
+            <a:off x="379379" y="1393902"/>
+            <a:ext cx="10437778" cy="3936855"/>
+          </a:xfrm>
+        </p:spPr>
         <p:txBody>
           <a:bodyPr>
-            <a:normAutofit lnSpcReduction="10000"/>
+            <a:normAutofit fontScale="92500" lnSpcReduction="10000"/>
           </a:bodyPr>
           <a:lstStyle/>
           <a:p>
@@ -10420,10 +10528,9 @@
               <a:rPr lang="en-US" b="1" dirty="0"/>
               <a:t>Princeton</a:t>
             </a:r>
-            <a:r>
-              <a:rPr lang="en-US" dirty="0"/>
-              <a:t> </a:t>
-            </a:r>
+            <a:br>
+              <a:rPr lang="en-US" dirty="0"/>
+            </a:br>
             <a:r>
               <a:rPr lang="en-US" dirty="0">
                 <a:hlinkClick r:id="rId5"/>
@@ -10435,6 +10542,22 @@
           <a:p>
             <a:r>
               <a:rPr lang="en-US" b="1" dirty="0"/>
+              <a:t>Valkyrie</a:t>
+            </a:r>
+            <a:br>
+              <a:rPr lang="en-US" dirty="0"/>
+            </a:br>
+            <a:r>
+              <a:rPr lang="en-US" dirty="0">
+                <a:hlinkClick r:id="rId6"/>
+              </a:rPr>
+              <a:t>https://github.com/samvera/valkyrie/blob/master/.lando.yml</a:t>
+            </a:r>
+            <a:endParaRPr lang="en-US" dirty="0"/>
+          </a:p>
+          <a:p>
+            <a:r>
+              <a:rPr lang="en-US" b="1" dirty="0"/>
               <a:t>Every </a:t>
             </a:r>
             <a:r>
@@ -10450,7 +10573,7 @@
             </a:br>
             <a:r>
               <a:rPr lang="en-US" dirty="0">
-                <a:hlinkClick r:id="rId6"/>
+                <a:hlinkClick r:id="rId7"/>
               </a:rPr>
               <a:t>https://github.com/search?q=filename%3A.lando.yml&amp;type=Code</a:t>
             </a:r>

</xml_diff>

<commit_message>
Add break time and recording reminders to slide deck, add draft Hyrax example
</commit_message>
<xml_diff>
--- a/LearningAsWeGo-DecomposingDevEnvironmentsWithLando.pptx
+++ b/LearningAsWeGo-DecomposingDevEnvironmentsWithLando.pptx
@@ -598,7 +598,16 @@
           <a:p>
             <a:r>
               <a:rPr lang="en-US" dirty="0"/>
-              <a:t>Hi, thanks for coming to this workshop. My name is Hardy Pottinger, I am a Publishing Systems Developer with California Digital Library, and this workshop is called Learning as We Go, Decomposing Dev Environments with Lando. The link to all the workshop materials is there, the </a:t>
+              <a:t>Hi, before we get too far along, I thought I’d point out that this workshop is being recorded. Thanks to everyone for coming to this workshop, and to everyone working behind the scenes to make it a success, I appreciate it. </a:t>
+            </a:r>
+          </a:p>
+          <a:p>
+            <a:endParaRPr lang="en-US" dirty="0"/>
+          </a:p>
+          <a:p>
+            <a:r>
+              <a:rPr lang="en-US" dirty="0"/>
+              <a:t>My name is Hardy Pottinger, I am a Publishing Systems Developer with California Digital Library, and this workshop is called Learning as We Go, Decomposing Dev Environments with Lando. The link to all the workshop materials is on this slide, the </a:t>
             </a:r>
             <a:r>
               <a:rPr lang="en-US" dirty="0" err="1"/>
@@ -614,7 +623,7 @@
             </a:r>
             <a:r>
               <a:rPr lang="en-US" dirty="0"/>
-              <a:t>. I’m not going to make you follow along with me while I demonstrate Lando, but if you want to do so, go there and follow the readmes. I hope you’ve already done so, because we have 3 hours today, and I plan to fill them.</a:t>
+              <a:t>. I’m not going to make you follow along with me while I demonstrate Lando, but if you want to do so, go there and follow the readmes. I hope you have already done so, because we have 3 hours today, and I plan to fill them.</a:t>
             </a:r>
           </a:p>
         </p:txBody>
@@ -2053,10 +2062,30 @@
           <a:bodyPr/>
           <a:lstStyle/>
           <a:p>
-            <a:r>
-              <a:rPr lang="en-US" dirty="0"/>
-              <a:t>Any questions? Do we need a break before we start working on stuff together?</a:t>
-            </a:r>
+            <a:pPr marL="0" marR="0" lvl="0" indent="0" algn="l" defTabSz="914400" rtl="0" eaLnBrk="1" fontAlgn="auto" latinLnBrk="0" hangingPunct="1">
+              <a:lnSpc>
+                <a:spcPct val="100000"/>
+              </a:lnSpc>
+              <a:spcBef>
+                <a:spcPts val="0"/>
+              </a:spcBef>
+              <a:spcAft>
+                <a:spcPts val="0"/>
+              </a:spcAft>
+              <a:buClrTx/>
+              <a:buSzTx/>
+              <a:buFontTx/>
+              <a:buNone/>
+              <a:tabLst/>
+              <a:defRPr/>
+            </a:pPr>
+            <a:r>
+              <a:rPr lang="en-US" dirty="0"/>
+              <a:t>Any questions? Do we need a break before we start working on stuff together? Meet back here in 5 minutes.</a:t>
+            </a:r>
+          </a:p>
+          <a:p>
+            <a:endParaRPr lang="en-US" dirty="0"/>
           </a:p>
         </p:txBody>
       </p:sp>
@@ -2622,7 +2651,7 @@
           <a:p>
             <a:r>
               <a:rPr lang="en-US" dirty="0"/>
-              <a:t>Any questions? Do we need a quick break?</a:t>
+              <a:t>Any questions? Do we need a quick break? Meet back here in 5 minutes.</a:t>
             </a:r>
           </a:p>
         </p:txBody>
@@ -2804,7 +2833,7 @@
           <a:p>
             <a:r>
               <a:rPr lang="en-US" dirty="0"/>
-              <a:t>Any questions? Do we need a quick break?</a:t>
+              <a:t>Any questions? Do we need a quick break? Meet back here in 5 minutes.</a:t>
             </a:r>
           </a:p>
         </p:txBody>
@@ -2978,7 +3007,7 @@
           <a:p>
             <a:r>
               <a:rPr lang="en-US" dirty="0"/>
-              <a:t>Any questions? Do we need a quick break?</a:t>
+              <a:t>Any questions? Do we need a quick break? Meet back here in 5 minutes.</a:t>
             </a:r>
           </a:p>
         </p:txBody>
@@ -10803,8 +10832,13 @@
           <a:p>
             <a:r>
               <a:rPr lang="en-US" dirty="0"/>
-              <a:t>Questions?</a:t>
-            </a:r>
+              <a:t>Questions? </a:t>
+            </a:r>
+            <a:r>
+              <a:rPr lang="en-US"/>
+              <a:t>Break?</a:t>
+            </a:r>
+            <a:endParaRPr lang="en-US" dirty="0"/>
           </a:p>
         </p:txBody>
       </p:sp>
@@ -10987,7 +11021,7 @@
           <a:p>
             <a:r>
               <a:rPr lang="en-US" dirty="0"/>
-              <a:t>Questions?</a:t>
+              <a:t>Questions? Break?</a:t>
             </a:r>
           </a:p>
         </p:txBody>
@@ -11168,7 +11202,7 @@
           <a:p>
             <a:r>
               <a:rPr lang="en-US" dirty="0"/>
-              <a:t>Questions?</a:t>
+              <a:t>Questions? Break?</a:t>
             </a:r>
           </a:p>
         </p:txBody>
@@ -11349,7 +11383,7 @@
           <a:p>
             <a:r>
               <a:rPr lang="en-US" dirty="0"/>
-              <a:t>Questions?</a:t>
+              <a:t>Questions? Break?</a:t>
             </a:r>
           </a:p>
         </p:txBody>
@@ -12641,6 +12675,45 @@
             <a:r>
               <a:rPr lang="en-US" dirty="0"/>
               <a:t>about 140 minutes of building stuff</a:t>
+            </a:r>
+          </a:p>
+        </p:txBody>
+      </p:sp>
+      <p:sp>
+        <p:nvSpPr>
+          <p:cNvPr id="8" name="TextBox 7">
+            <a:extLst>
+              <a:ext uri="{FF2B5EF4-FFF2-40B4-BE49-F238E27FC236}">
+                <a16:creationId xmlns:a16="http://schemas.microsoft.com/office/drawing/2014/main" id="{87454543-3B40-3745-90D2-98DFFDDEA401}"/>
+              </a:ext>
+            </a:extLst>
+          </p:cNvPr>
+          <p:cNvSpPr txBox="1"/>
+          <p:nvPr/>
+        </p:nvSpPr>
+        <p:spPr>
+          <a:xfrm>
+            <a:off x="6233532" y="2899317"/>
+            <a:ext cx="3963264" cy="369332"/>
+          </a:xfrm>
+          <a:prstGeom prst="rect">
+            <a:avLst/>
+          </a:prstGeom>
+          <a:noFill/>
+        </p:spPr>
+        <p:txBody>
+          <a:bodyPr wrap="none" rtlCol="0">
+            <a:spAutoFit/>
+          </a:bodyPr>
+          <a:lstStyle/>
+          <a:p>
+            <a:r>
+              <a:rPr lang="en-US" dirty="0">
+                <a:solidFill>
+                  <a:srgbClr val="FF0000"/>
+                </a:solidFill>
+              </a:rPr>
+              <a:t>[5-minute breaks between each section]</a:t>
             </a:r>
           </a:p>
         </p:txBody>

</xml_diff>